<commit_message>
add support for tamaño carta
</commit_message>
<xml_diff>
--- a/cotizaciones/cotización_Test1.pptx
+++ b/cotizaciones/cotización_Test1.pptx
@@ -1,20 +1,19 @@
 
 <file path=ppt/presentation.xml><?xml version="1.0" encoding="utf-8"?>
-<p:presentation xmlns:a="http://schemas.openxmlformats.org/drawingml/2006/main" xmlns:r="http://schemas.openxmlformats.org/officeDocument/2006/relationships" xmlns:p="http://schemas.openxmlformats.org/presentationml/2006/main" saveSubsetFonts="1" autoCompressPictures="0">
+<p:presentation xmlns:a="http://schemas.openxmlformats.org/drawingml/2006/main" xmlns:r="http://schemas.openxmlformats.org/officeDocument/2006/relationships" xmlns:p="http://schemas.openxmlformats.org/presentationml/2006/main" saveSubsetFonts="1">
   <p:sldMasterIdLst>
     <p:sldMasterId id="2147483648" r:id="rId1"/>
   </p:sldMasterIdLst>
   <p:sldIdLst>
-    <p:sldId id="256" r:id="rId7"/>
-    <p:sldId id="257" r:id="rId8"/>
+    <p:sldId id="256" r:id="rId6"/>
   </p:sldIdLst>
-  <p:sldSz cx="9144000" cy="6858000" type="screen4x3"/>
+  <p:sldSz cx="6858000" cy="9144000" type="letter"/>
   <p:notesSz cx="6858000" cy="9144000"/>
   <p:defaultTextStyle>
     <a:defPPr>
-      <a:defRPr lang="en-US"/>
+      <a:defRPr lang="es-CO"/>
     </a:defPPr>
-    <a:lvl1pPr marL="0" algn="l" defTabSz="457200" rtl="0" eaLnBrk="1" latinLnBrk="0" hangingPunct="1">
+    <a:lvl1pPr marL="0" algn="l" defTabSz="914400" rtl="0" eaLnBrk="1" latinLnBrk="0" hangingPunct="1">
       <a:defRPr sz="1800" kern="1200">
         <a:solidFill>
           <a:schemeClr val="tx1"/>
@@ -24,7 +23,7 @@
         <a:cs typeface="+mn-cs"/>
       </a:defRPr>
     </a:lvl1pPr>
-    <a:lvl2pPr marL="457200" algn="l" defTabSz="457200" rtl="0" eaLnBrk="1" latinLnBrk="0" hangingPunct="1">
+    <a:lvl2pPr marL="457200" algn="l" defTabSz="914400" rtl="0" eaLnBrk="1" latinLnBrk="0" hangingPunct="1">
       <a:defRPr sz="1800" kern="1200">
         <a:solidFill>
           <a:schemeClr val="tx1"/>
@@ -34,7 +33,7 @@
         <a:cs typeface="+mn-cs"/>
       </a:defRPr>
     </a:lvl2pPr>
-    <a:lvl3pPr marL="914400" algn="l" defTabSz="457200" rtl="0" eaLnBrk="1" latinLnBrk="0" hangingPunct="1">
+    <a:lvl3pPr marL="914400" algn="l" defTabSz="914400" rtl="0" eaLnBrk="1" latinLnBrk="0" hangingPunct="1">
       <a:defRPr sz="1800" kern="1200">
         <a:solidFill>
           <a:schemeClr val="tx1"/>
@@ -44,7 +43,7 @@
         <a:cs typeface="+mn-cs"/>
       </a:defRPr>
     </a:lvl3pPr>
-    <a:lvl4pPr marL="1371600" algn="l" defTabSz="457200" rtl="0" eaLnBrk="1" latinLnBrk="0" hangingPunct="1">
+    <a:lvl4pPr marL="1371600" algn="l" defTabSz="914400" rtl="0" eaLnBrk="1" latinLnBrk="0" hangingPunct="1">
       <a:defRPr sz="1800" kern="1200">
         <a:solidFill>
           <a:schemeClr val="tx1"/>
@@ -54,7 +53,7 @@
         <a:cs typeface="+mn-cs"/>
       </a:defRPr>
     </a:lvl4pPr>
-    <a:lvl5pPr marL="1828800" algn="l" defTabSz="457200" rtl="0" eaLnBrk="1" latinLnBrk="0" hangingPunct="1">
+    <a:lvl5pPr marL="1828800" algn="l" defTabSz="914400" rtl="0" eaLnBrk="1" latinLnBrk="0" hangingPunct="1">
       <a:defRPr sz="1800" kern="1200">
         <a:solidFill>
           <a:schemeClr val="tx1"/>
@@ -64,7 +63,7 @@
         <a:cs typeface="+mn-cs"/>
       </a:defRPr>
     </a:lvl5pPr>
-    <a:lvl6pPr marL="2286000" algn="l" defTabSz="457200" rtl="0" eaLnBrk="1" latinLnBrk="0" hangingPunct="1">
+    <a:lvl6pPr marL="2286000" algn="l" defTabSz="914400" rtl="0" eaLnBrk="1" latinLnBrk="0" hangingPunct="1">
       <a:defRPr sz="1800" kern="1200">
         <a:solidFill>
           <a:schemeClr val="tx1"/>
@@ -74,7 +73,7 @@
         <a:cs typeface="+mn-cs"/>
       </a:defRPr>
     </a:lvl6pPr>
-    <a:lvl7pPr marL="2743200" algn="l" defTabSz="457200" rtl="0" eaLnBrk="1" latinLnBrk="0" hangingPunct="1">
+    <a:lvl7pPr marL="2743200" algn="l" defTabSz="914400" rtl="0" eaLnBrk="1" latinLnBrk="0" hangingPunct="1">
       <a:defRPr sz="1800" kern="1200">
         <a:solidFill>
           <a:schemeClr val="tx1"/>
@@ -84,7 +83,7 @@
         <a:cs typeface="+mn-cs"/>
       </a:defRPr>
     </a:lvl7pPr>
-    <a:lvl8pPr marL="3200400" algn="l" defTabSz="457200" rtl="0" eaLnBrk="1" latinLnBrk="0" hangingPunct="1">
+    <a:lvl8pPr marL="3200400" algn="l" defTabSz="914400" rtl="0" eaLnBrk="1" latinLnBrk="0" hangingPunct="1">
       <a:defRPr sz="1800" kern="1200">
         <a:solidFill>
           <a:schemeClr val="tx1"/>
@@ -94,7 +93,7 @@
         <a:cs typeface="+mn-cs"/>
       </a:defRPr>
     </a:lvl8pPr>
-    <a:lvl9pPr marL="3657600" algn="l" defTabSz="457200" rtl="0" eaLnBrk="1" latinLnBrk="0" hangingPunct="1">
+    <a:lvl9pPr marL="3657600" algn="l" defTabSz="914400" rtl="0" eaLnBrk="1" latinLnBrk="0" hangingPunct="1">
       <a:defRPr sz="1800" kern="1200">
         <a:solidFill>
           <a:schemeClr val="tx1"/>
@@ -110,7 +109,7 @@
 
 <file path=ppt/slideLayouts/slideLayout1.xml><?xml version="1.0" encoding="utf-8"?>
 <p:sldLayout xmlns:a="http://schemas.openxmlformats.org/drawingml/2006/main" xmlns:r="http://schemas.openxmlformats.org/officeDocument/2006/relationships" xmlns:p="http://schemas.openxmlformats.org/presentationml/2006/main" type="title" preserve="1">
-  <p:cSld name="Title Slide">
+  <p:cSld name="Diapositiva de título">
     <p:spTree>
       <p:nvGrpSpPr>
         <p:cNvPr id="1" name=""/>
@@ -127,7 +126,7 @@
       </p:grpSpPr>
       <p:sp>
         <p:nvSpPr>
-          <p:cNvPr id="2" name="Title 1"/>
+          <p:cNvPr id="2" name="Título 1"/>
           <p:cNvSpPr>
             <a:spLocks noGrp="1"/>
           </p:cNvSpPr>
@@ -137,25 +136,29 @@
         </p:nvSpPr>
         <p:spPr>
           <a:xfrm>
-            <a:off x="685800" y="2130425"/>
-            <a:ext cx="7772400" cy="1470025"/>
+            <a:off x="857250" y="1496484"/>
+            <a:ext cx="5143500" cy="3183467"/>
           </a:xfrm>
         </p:spPr>
         <p:txBody>
-          <a:bodyPr/>
-          <a:lstStyle/>
-          <a:p>
-            <a:r>
-              <a:rPr lang="en-US" smtClean="0"/>
-              <a:t>Click to edit Master title style</a:t>
-            </a:r>
-            <a:endParaRPr lang="en-US"/>
-          </a:p>
-        </p:txBody>
-      </p:sp>
-      <p:sp>
-        <p:nvSpPr>
-          <p:cNvPr id="3" name="Subtitle 2"/>
+          <a:bodyPr anchor="b"/>
+          <a:lstStyle>
+            <a:lvl1pPr algn="ctr">
+              <a:defRPr sz="3375"/>
+            </a:lvl1pPr>
+          </a:lstStyle>
+          <a:p>
+            <a:r>
+              <a:rPr lang="es-ES" smtClean="0"/>
+              <a:t>Haga clic para modificar el estilo de título del patrón</a:t>
+            </a:r>
+            <a:endParaRPr lang="es-CO"/>
+          </a:p>
+        </p:txBody>
+      </p:sp>
+      <p:sp>
+        <p:nvSpPr>
+          <p:cNvPr id="3" name="Subtítulo 2"/>
           <p:cNvSpPr>
             <a:spLocks noGrp="1"/>
           </p:cNvSpPr>
@@ -165,8 +168,8 @@
         </p:nvSpPr>
         <p:spPr>
           <a:xfrm>
-            <a:off x="1371600" y="3886200"/>
-            <a:ext cx="6400800" cy="1752600"/>
+            <a:off x="857250" y="4802717"/>
+            <a:ext cx="5143500" cy="2207683"/>
           </a:xfrm>
         </p:spPr>
         <p:txBody>
@@ -174,107 +177,53 @@
           <a:lstStyle>
             <a:lvl1pPr marL="0" indent="0" algn="ctr">
               <a:buNone/>
-              <a:defRPr>
-                <a:solidFill>
-                  <a:schemeClr val="tx1">
-                    <a:tint val="75000"/>
-                  </a:schemeClr>
-                </a:solidFill>
-              </a:defRPr>
+              <a:defRPr sz="1350"/>
             </a:lvl1pPr>
-            <a:lvl2pPr marL="457200" indent="0" algn="ctr">
-              <a:buNone/>
-              <a:defRPr>
-                <a:solidFill>
-                  <a:schemeClr val="tx1">
-                    <a:tint val="75000"/>
-                  </a:schemeClr>
-                </a:solidFill>
-              </a:defRPr>
+            <a:lvl2pPr marL="257175" indent="0" algn="ctr">
+              <a:buNone/>
+              <a:defRPr sz="1125"/>
             </a:lvl2pPr>
-            <a:lvl3pPr marL="914400" indent="0" algn="ctr">
-              <a:buNone/>
-              <a:defRPr>
-                <a:solidFill>
-                  <a:schemeClr val="tx1">
-                    <a:tint val="75000"/>
-                  </a:schemeClr>
-                </a:solidFill>
-              </a:defRPr>
+            <a:lvl3pPr marL="514350" indent="0" algn="ctr">
+              <a:buNone/>
+              <a:defRPr sz="1013"/>
             </a:lvl3pPr>
-            <a:lvl4pPr marL="1371600" indent="0" algn="ctr">
-              <a:buNone/>
-              <a:defRPr>
-                <a:solidFill>
-                  <a:schemeClr val="tx1">
-                    <a:tint val="75000"/>
-                  </a:schemeClr>
-                </a:solidFill>
-              </a:defRPr>
+            <a:lvl4pPr marL="771525" indent="0" algn="ctr">
+              <a:buNone/>
+              <a:defRPr sz="900"/>
             </a:lvl4pPr>
-            <a:lvl5pPr marL="1828800" indent="0" algn="ctr">
-              <a:buNone/>
-              <a:defRPr>
-                <a:solidFill>
-                  <a:schemeClr val="tx1">
-                    <a:tint val="75000"/>
-                  </a:schemeClr>
-                </a:solidFill>
-              </a:defRPr>
+            <a:lvl5pPr marL="1028700" indent="0" algn="ctr">
+              <a:buNone/>
+              <a:defRPr sz="900"/>
             </a:lvl5pPr>
-            <a:lvl6pPr marL="2286000" indent="0" algn="ctr">
-              <a:buNone/>
-              <a:defRPr>
-                <a:solidFill>
-                  <a:schemeClr val="tx1">
-                    <a:tint val="75000"/>
-                  </a:schemeClr>
-                </a:solidFill>
-              </a:defRPr>
+            <a:lvl6pPr marL="1285875" indent="0" algn="ctr">
+              <a:buNone/>
+              <a:defRPr sz="900"/>
             </a:lvl6pPr>
-            <a:lvl7pPr marL="2743200" indent="0" algn="ctr">
-              <a:buNone/>
-              <a:defRPr>
-                <a:solidFill>
-                  <a:schemeClr val="tx1">
-                    <a:tint val="75000"/>
-                  </a:schemeClr>
-                </a:solidFill>
-              </a:defRPr>
+            <a:lvl7pPr marL="1543050" indent="0" algn="ctr">
+              <a:buNone/>
+              <a:defRPr sz="900"/>
             </a:lvl7pPr>
-            <a:lvl8pPr marL="3200400" indent="0" algn="ctr">
-              <a:buNone/>
-              <a:defRPr>
-                <a:solidFill>
-                  <a:schemeClr val="tx1">
-                    <a:tint val="75000"/>
-                  </a:schemeClr>
-                </a:solidFill>
-              </a:defRPr>
+            <a:lvl8pPr marL="1800225" indent="0" algn="ctr">
+              <a:buNone/>
+              <a:defRPr sz="900"/>
             </a:lvl8pPr>
-            <a:lvl9pPr marL="3657600" indent="0" algn="ctr">
-              <a:buNone/>
-              <a:defRPr>
-                <a:solidFill>
-                  <a:schemeClr val="tx1">
-                    <a:tint val="75000"/>
-                  </a:schemeClr>
-                </a:solidFill>
-              </a:defRPr>
+            <a:lvl9pPr marL="2057400" indent="0" algn="ctr">
+              <a:buNone/>
+              <a:defRPr sz="900"/>
             </a:lvl9pPr>
           </a:lstStyle>
           <a:p>
             <a:r>
-              <a:rPr lang="en-US" smtClean="0"/>
-              <a:t>Click to edit Master subtitle style</a:t>
-            </a:r>
-            <a:endParaRPr lang="en-US"/>
-          </a:p>
-        </p:txBody>
-      </p:sp>
-      <p:sp>
-        <p:nvSpPr>
-          <p:cNvPr id="4" name="Date Placeholder 3"/>
+              <a:rPr lang="es-ES" smtClean="0"/>
+              <a:t>Haga clic para modificar el estilo de subtítulo del patrón</a:t>
+            </a:r>
+            <a:endParaRPr lang="es-CO"/>
+          </a:p>
+        </p:txBody>
+      </p:sp>
+      <p:sp>
+        <p:nvSpPr>
+          <p:cNvPr id="4" name="Marcador de fecha 3"/>
           <p:cNvSpPr>
             <a:spLocks noGrp="1"/>
           </p:cNvSpPr>
@@ -287,17 +236,17 @@
           <a:bodyPr/>
           <a:lstStyle/>
           <a:p>
-            <a:fld id="{5BCAD085-E8A6-8845-BD4E-CB4CCA059FC4}" type="datetimeFigureOut">
-              <a:rPr lang="en-US" smtClean="0"/>
-              <a:t>1/27/13</a:t>
+            <a:fld id="{3B2E3770-A23A-4173-BFB4-C5E21B224C77}" type="datetimeFigureOut">
+              <a:rPr lang="es-CO" smtClean="0"/>
+              <a:t>13/09/2021</a:t>
             </a:fld>
-            <a:endParaRPr lang="en-US"/>
-          </a:p>
-        </p:txBody>
-      </p:sp>
-      <p:sp>
-        <p:nvSpPr>
-          <p:cNvPr id="5" name="Footer Placeholder 4"/>
+            <a:endParaRPr lang="es-CO"/>
+          </a:p>
+        </p:txBody>
+      </p:sp>
+      <p:sp>
+        <p:nvSpPr>
+          <p:cNvPr id="5" name="Marcador de pie de página 4"/>
           <p:cNvSpPr>
             <a:spLocks noGrp="1"/>
           </p:cNvSpPr>
@@ -310,13 +259,13 @@
           <a:bodyPr/>
           <a:lstStyle/>
           <a:p>
-            <a:endParaRPr lang="en-US"/>
-          </a:p>
-        </p:txBody>
-      </p:sp>
-      <p:sp>
-        <p:nvSpPr>
-          <p:cNvPr id="6" name="Slide Number Placeholder 5"/>
+            <a:endParaRPr lang="es-CO"/>
+          </a:p>
+        </p:txBody>
+      </p:sp>
+      <p:sp>
+        <p:nvSpPr>
+          <p:cNvPr id="6" name="Marcador de número de diapositiva 5"/>
           <p:cNvSpPr>
             <a:spLocks noGrp="1"/>
           </p:cNvSpPr>
@@ -329,18 +278,18 @@
           <a:bodyPr/>
           <a:lstStyle/>
           <a:p>
-            <a:fld id="{C1FF6DA9-008F-8B48-92A6-B652298478BF}" type="slidenum">
-              <a:rPr lang="en-US" smtClean="0"/>
-              <a:t>‹#›</a:t>
+            <a:fld id="{3117F2EE-F53C-4EC3-A699-49251ACBC68D}" type="slidenum">
+              <a:rPr lang="es-CO" smtClean="0"/>
+              <a:t>‹Nº›</a:t>
             </a:fld>
-            <a:endParaRPr lang="en-US"/>
+            <a:endParaRPr lang="es-CO"/>
           </a:p>
         </p:txBody>
       </p:sp>
     </p:spTree>
     <p:extLst>
       <p:ext uri="{BB962C8B-B14F-4D97-AF65-F5344CB8AC3E}">
-        <p14:creationId xmlns:p14="http://schemas.microsoft.com/office/powerpoint/2010/main" val="3168075583"/>
+        <p14:creationId xmlns:p14="http://schemas.microsoft.com/office/powerpoint/2010/main" val="2313429109"/>
       </p:ext>
     </p:extLst>
   </p:cSld>
@@ -352,7 +301,7 @@
 
 <file path=ppt/slideLayouts/slideLayout10.xml><?xml version="1.0" encoding="utf-8"?>
 <p:sldLayout xmlns:a="http://schemas.openxmlformats.org/drawingml/2006/main" xmlns:r="http://schemas.openxmlformats.org/officeDocument/2006/relationships" xmlns:p="http://schemas.openxmlformats.org/presentationml/2006/main" type="vertTx" preserve="1">
-  <p:cSld name="Title and Vertical Text">
+  <p:cSld name="Título y texto vertical">
     <p:spTree>
       <p:nvGrpSpPr>
         <p:cNvPr id="1" name=""/>
@@ -369,7 +318,7 @@
       </p:grpSpPr>
       <p:sp>
         <p:nvSpPr>
-          <p:cNvPr id="2" name="Title 1"/>
+          <p:cNvPr id="2" name="Título 1"/>
           <p:cNvSpPr>
             <a:spLocks noGrp="1"/>
           </p:cNvSpPr>
@@ -383,16 +332,16 @@
           <a:lstStyle/>
           <a:p>
             <a:r>
-              <a:rPr lang="en-US" smtClean="0"/>
-              <a:t>Click to edit Master title style</a:t>
-            </a:r>
-            <a:endParaRPr lang="en-US"/>
-          </a:p>
-        </p:txBody>
-      </p:sp>
-      <p:sp>
-        <p:nvSpPr>
-          <p:cNvPr id="3" name="Vertical Text Placeholder 2"/>
+              <a:rPr lang="es-ES" smtClean="0"/>
+              <a:t>Haga clic para modificar el estilo de título del patrón</a:t>
+            </a:r>
+            <a:endParaRPr lang="es-CO"/>
+          </a:p>
+        </p:txBody>
+      </p:sp>
+      <p:sp>
+        <p:nvSpPr>
+          <p:cNvPr id="3" name="Marcador de texto vertical 2"/>
           <p:cNvSpPr>
             <a:spLocks noGrp="1"/>
           </p:cNvSpPr>
@@ -407,44 +356,44 @@
           <a:p>
             <a:pPr lvl="0"/>
             <a:r>
-              <a:rPr lang="en-US" smtClean="0"/>
-              <a:t>Click to edit Master text styles</a:t>
+              <a:rPr lang="es-ES" smtClean="0"/>
+              <a:t>Haga clic para modificar el estilo de texto del patrón</a:t>
             </a:r>
           </a:p>
           <a:p>
             <a:pPr lvl="1"/>
             <a:r>
-              <a:rPr lang="en-US" smtClean="0"/>
-              <a:t>Second level</a:t>
+              <a:rPr lang="es-ES" smtClean="0"/>
+              <a:t>Segundo nivel</a:t>
             </a:r>
           </a:p>
           <a:p>
             <a:pPr lvl="2"/>
             <a:r>
-              <a:rPr lang="en-US" smtClean="0"/>
-              <a:t>Third level</a:t>
+              <a:rPr lang="es-ES" smtClean="0"/>
+              <a:t>Tercer nivel</a:t>
             </a:r>
           </a:p>
           <a:p>
             <a:pPr lvl="3"/>
             <a:r>
-              <a:rPr lang="en-US" smtClean="0"/>
-              <a:t>Fourth level</a:t>
+              <a:rPr lang="es-ES" smtClean="0"/>
+              <a:t>Cuarto nivel</a:t>
             </a:r>
           </a:p>
           <a:p>
             <a:pPr lvl="4"/>
             <a:r>
-              <a:rPr lang="en-US" smtClean="0"/>
-              <a:t>Fifth level</a:t>
-            </a:r>
-            <a:endParaRPr lang="en-US"/>
-          </a:p>
-        </p:txBody>
-      </p:sp>
-      <p:sp>
-        <p:nvSpPr>
-          <p:cNvPr id="4" name="Date Placeholder 3"/>
+              <a:rPr lang="es-ES" smtClean="0"/>
+              <a:t>Quinto nivel</a:t>
+            </a:r>
+            <a:endParaRPr lang="es-CO"/>
+          </a:p>
+        </p:txBody>
+      </p:sp>
+      <p:sp>
+        <p:nvSpPr>
+          <p:cNvPr id="4" name="Marcador de fecha 3"/>
           <p:cNvSpPr>
             <a:spLocks noGrp="1"/>
           </p:cNvSpPr>
@@ -457,17 +406,17 @@
           <a:bodyPr/>
           <a:lstStyle/>
           <a:p>
-            <a:fld id="{5BCAD085-E8A6-8845-BD4E-CB4CCA059FC4}" type="datetimeFigureOut">
-              <a:rPr lang="en-US" smtClean="0"/>
-              <a:t>1/27/13</a:t>
+            <a:fld id="{3B2E3770-A23A-4173-BFB4-C5E21B224C77}" type="datetimeFigureOut">
+              <a:rPr lang="es-CO" smtClean="0"/>
+              <a:t>13/09/2021</a:t>
             </a:fld>
-            <a:endParaRPr lang="en-US"/>
-          </a:p>
-        </p:txBody>
-      </p:sp>
-      <p:sp>
-        <p:nvSpPr>
-          <p:cNvPr id="5" name="Footer Placeholder 4"/>
+            <a:endParaRPr lang="es-CO"/>
+          </a:p>
+        </p:txBody>
+      </p:sp>
+      <p:sp>
+        <p:nvSpPr>
+          <p:cNvPr id="5" name="Marcador de pie de página 4"/>
           <p:cNvSpPr>
             <a:spLocks noGrp="1"/>
           </p:cNvSpPr>
@@ -480,13 +429,13 @@
           <a:bodyPr/>
           <a:lstStyle/>
           <a:p>
-            <a:endParaRPr lang="en-US"/>
-          </a:p>
-        </p:txBody>
-      </p:sp>
-      <p:sp>
-        <p:nvSpPr>
-          <p:cNvPr id="6" name="Slide Number Placeholder 5"/>
+            <a:endParaRPr lang="es-CO"/>
+          </a:p>
+        </p:txBody>
+      </p:sp>
+      <p:sp>
+        <p:nvSpPr>
+          <p:cNvPr id="6" name="Marcador de número de diapositiva 5"/>
           <p:cNvSpPr>
             <a:spLocks noGrp="1"/>
           </p:cNvSpPr>
@@ -499,18 +448,18 @@
           <a:bodyPr/>
           <a:lstStyle/>
           <a:p>
-            <a:fld id="{C1FF6DA9-008F-8B48-92A6-B652298478BF}" type="slidenum">
-              <a:rPr lang="en-US" smtClean="0"/>
-              <a:t>‹#›</a:t>
+            <a:fld id="{3117F2EE-F53C-4EC3-A699-49251ACBC68D}" type="slidenum">
+              <a:rPr lang="es-CO" smtClean="0"/>
+              <a:t>‹Nº›</a:t>
             </a:fld>
-            <a:endParaRPr lang="en-US"/>
+            <a:endParaRPr lang="es-CO"/>
           </a:p>
         </p:txBody>
       </p:sp>
     </p:spTree>
     <p:extLst>
       <p:ext uri="{BB962C8B-B14F-4D97-AF65-F5344CB8AC3E}">
-        <p14:creationId xmlns:p14="http://schemas.microsoft.com/office/powerpoint/2010/main" val="2910927964"/>
+        <p14:creationId xmlns:p14="http://schemas.microsoft.com/office/powerpoint/2010/main" val="3112260963"/>
       </p:ext>
     </p:extLst>
   </p:cSld>
@@ -522,7 +471,7 @@
 
 <file path=ppt/slideLayouts/slideLayout11.xml><?xml version="1.0" encoding="utf-8"?>
 <p:sldLayout xmlns:a="http://schemas.openxmlformats.org/drawingml/2006/main" xmlns:r="http://schemas.openxmlformats.org/officeDocument/2006/relationships" xmlns:p="http://schemas.openxmlformats.org/presentationml/2006/main" type="vertTitleAndTx" preserve="1">
-  <p:cSld name="Vertical Title and Text">
+  <p:cSld name="Título vertical y texto">
     <p:spTree>
       <p:nvGrpSpPr>
         <p:cNvPr id="1" name=""/>
@@ -539,7 +488,7 @@
       </p:grpSpPr>
       <p:sp>
         <p:nvSpPr>
-          <p:cNvPr id="2" name="Vertical Title 1"/>
+          <p:cNvPr id="2" name="Título vertical 1"/>
           <p:cNvSpPr>
             <a:spLocks noGrp="1"/>
           </p:cNvSpPr>
@@ -549,8 +498,8 @@
         </p:nvSpPr>
         <p:spPr>
           <a:xfrm>
-            <a:off x="6629400" y="274638"/>
-            <a:ext cx="2057400" cy="5851525"/>
+            <a:off x="2761060" y="649818"/>
+            <a:ext cx="831354" cy="10331449"/>
           </a:xfrm>
         </p:spPr>
         <p:txBody>
@@ -558,16 +507,16 @@
           <a:lstStyle/>
           <a:p>
             <a:r>
-              <a:rPr lang="en-US" smtClean="0"/>
-              <a:t>Click to edit Master title style</a:t>
-            </a:r>
-            <a:endParaRPr lang="en-US"/>
-          </a:p>
-        </p:txBody>
-      </p:sp>
-      <p:sp>
-        <p:nvSpPr>
-          <p:cNvPr id="3" name="Vertical Text Placeholder 2"/>
+              <a:rPr lang="es-ES" smtClean="0"/>
+              <a:t>Haga clic para modificar el estilo de título del patrón</a:t>
+            </a:r>
+            <a:endParaRPr lang="es-CO"/>
+          </a:p>
+        </p:txBody>
+      </p:sp>
+      <p:sp>
+        <p:nvSpPr>
+          <p:cNvPr id="3" name="Marcador de texto vertical 2"/>
           <p:cNvSpPr>
             <a:spLocks noGrp="1"/>
           </p:cNvSpPr>
@@ -577,8 +526,8 @@
         </p:nvSpPr>
         <p:spPr>
           <a:xfrm>
-            <a:off x="457200" y="274638"/>
-            <a:ext cx="6019800" cy="5851525"/>
+            <a:off x="265212" y="649818"/>
+            <a:ext cx="2410122" cy="10331449"/>
           </a:xfrm>
         </p:spPr>
         <p:txBody>
@@ -587,44 +536,44 @@
           <a:p>
             <a:pPr lvl="0"/>
             <a:r>
-              <a:rPr lang="en-US" smtClean="0"/>
-              <a:t>Click to edit Master text styles</a:t>
+              <a:rPr lang="es-ES" smtClean="0"/>
+              <a:t>Haga clic para modificar el estilo de texto del patrón</a:t>
             </a:r>
           </a:p>
           <a:p>
             <a:pPr lvl="1"/>
             <a:r>
-              <a:rPr lang="en-US" smtClean="0"/>
-              <a:t>Second level</a:t>
+              <a:rPr lang="es-ES" smtClean="0"/>
+              <a:t>Segundo nivel</a:t>
             </a:r>
           </a:p>
           <a:p>
             <a:pPr lvl="2"/>
             <a:r>
-              <a:rPr lang="en-US" smtClean="0"/>
-              <a:t>Third level</a:t>
+              <a:rPr lang="es-ES" smtClean="0"/>
+              <a:t>Tercer nivel</a:t>
             </a:r>
           </a:p>
           <a:p>
             <a:pPr lvl="3"/>
             <a:r>
-              <a:rPr lang="en-US" smtClean="0"/>
-              <a:t>Fourth level</a:t>
+              <a:rPr lang="es-ES" smtClean="0"/>
+              <a:t>Cuarto nivel</a:t>
             </a:r>
           </a:p>
           <a:p>
             <a:pPr lvl="4"/>
             <a:r>
-              <a:rPr lang="en-US" smtClean="0"/>
-              <a:t>Fifth level</a:t>
-            </a:r>
-            <a:endParaRPr lang="en-US"/>
-          </a:p>
-        </p:txBody>
-      </p:sp>
-      <p:sp>
-        <p:nvSpPr>
-          <p:cNvPr id="4" name="Date Placeholder 3"/>
+              <a:rPr lang="es-ES" smtClean="0"/>
+              <a:t>Quinto nivel</a:t>
+            </a:r>
+            <a:endParaRPr lang="es-CO"/>
+          </a:p>
+        </p:txBody>
+      </p:sp>
+      <p:sp>
+        <p:nvSpPr>
+          <p:cNvPr id="4" name="Marcador de fecha 3"/>
           <p:cNvSpPr>
             <a:spLocks noGrp="1"/>
           </p:cNvSpPr>
@@ -637,17 +586,17 @@
           <a:bodyPr/>
           <a:lstStyle/>
           <a:p>
-            <a:fld id="{5BCAD085-E8A6-8845-BD4E-CB4CCA059FC4}" type="datetimeFigureOut">
-              <a:rPr lang="en-US" smtClean="0"/>
-              <a:t>1/27/13</a:t>
+            <a:fld id="{3B2E3770-A23A-4173-BFB4-C5E21B224C77}" type="datetimeFigureOut">
+              <a:rPr lang="es-CO" smtClean="0"/>
+              <a:t>13/09/2021</a:t>
             </a:fld>
-            <a:endParaRPr lang="en-US"/>
-          </a:p>
-        </p:txBody>
-      </p:sp>
-      <p:sp>
-        <p:nvSpPr>
-          <p:cNvPr id="5" name="Footer Placeholder 4"/>
+            <a:endParaRPr lang="es-CO"/>
+          </a:p>
+        </p:txBody>
+      </p:sp>
+      <p:sp>
+        <p:nvSpPr>
+          <p:cNvPr id="5" name="Marcador de pie de página 4"/>
           <p:cNvSpPr>
             <a:spLocks noGrp="1"/>
           </p:cNvSpPr>
@@ -660,13 +609,13 @@
           <a:bodyPr/>
           <a:lstStyle/>
           <a:p>
-            <a:endParaRPr lang="en-US"/>
-          </a:p>
-        </p:txBody>
-      </p:sp>
-      <p:sp>
-        <p:nvSpPr>
-          <p:cNvPr id="6" name="Slide Number Placeholder 5"/>
+            <a:endParaRPr lang="es-CO"/>
+          </a:p>
+        </p:txBody>
+      </p:sp>
+      <p:sp>
+        <p:nvSpPr>
+          <p:cNvPr id="6" name="Marcador de número de diapositiva 5"/>
           <p:cNvSpPr>
             <a:spLocks noGrp="1"/>
           </p:cNvSpPr>
@@ -679,18 +628,18 @@
           <a:bodyPr/>
           <a:lstStyle/>
           <a:p>
-            <a:fld id="{C1FF6DA9-008F-8B48-92A6-B652298478BF}" type="slidenum">
-              <a:rPr lang="en-US" smtClean="0"/>
-              <a:t>‹#›</a:t>
+            <a:fld id="{3117F2EE-F53C-4EC3-A699-49251ACBC68D}" type="slidenum">
+              <a:rPr lang="es-CO" smtClean="0"/>
+              <a:t>‹Nº›</a:t>
             </a:fld>
-            <a:endParaRPr lang="en-US"/>
+            <a:endParaRPr lang="es-CO"/>
           </a:p>
         </p:txBody>
       </p:sp>
     </p:spTree>
     <p:extLst>
       <p:ext uri="{BB962C8B-B14F-4D97-AF65-F5344CB8AC3E}">
-        <p14:creationId xmlns:p14="http://schemas.microsoft.com/office/powerpoint/2010/main" val="3612223792"/>
+        <p14:creationId xmlns:p14="http://schemas.microsoft.com/office/powerpoint/2010/main" val="421735155"/>
       </p:ext>
     </p:extLst>
   </p:cSld>
@@ -702,7 +651,7 @@
 
 <file path=ppt/slideLayouts/slideLayout2.xml><?xml version="1.0" encoding="utf-8"?>
 <p:sldLayout xmlns:a="http://schemas.openxmlformats.org/drawingml/2006/main" xmlns:r="http://schemas.openxmlformats.org/officeDocument/2006/relationships" xmlns:p="http://schemas.openxmlformats.org/presentationml/2006/main" type="obj" preserve="1">
-  <p:cSld name="Title and Content">
+  <p:cSld name="Título y objetos">
     <p:spTree>
       <p:nvGrpSpPr>
         <p:cNvPr id="1" name=""/>
@@ -719,7 +668,7 @@
       </p:grpSpPr>
       <p:sp>
         <p:nvSpPr>
-          <p:cNvPr id="2" name="Title 1"/>
+          <p:cNvPr id="2" name="Título 1"/>
           <p:cNvSpPr>
             <a:spLocks noGrp="1"/>
           </p:cNvSpPr>
@@ -733,16 +682,16 @@
           <a:lstStyle/>
           <a:p>
             <a:r>
-              <a:rPr lang="en-US" smtClean="0"/>
-              <a:t>Click to edit Master title style</a:t>
-            </a:r>
-            <a:endParaRPr lang="en-US"/>
-          </a:p>
-        </p:txBody>
-      </p:sp>
-      <p:sp>
-        <p:nvSpPr>
-          <p:cNvPr id="3" name="Content Placeholder 2"/>
+              <a:rPr lang="es-ES" smtClean="0"/>
+              <a:t>Haga clic para modificar el estilo de título del patrón</a:t>
+            </a:r>
+            <a:endParaRPr lang="es-CO"/>
+          </a:p>
+        </p:txBody>
+      </p:sp>
+      <p:sp>
+        <p:nvSpPr>
+          <p:cNvPr id="3" name="Marcador de contenido 2"/>
           <p:cNvSpPr>
             <a:spLocks noGrp="1"/>
           </p:cNvSpPr>
@@ -757,44 +706,44 @@
           <a:p>
             <a:pPr lvl="0"/>
             <a:r>
-              <a:rPr lang="en-US" smtClean="0"/>
-              <a:t>Click to edit Master text styles</a:t>
+              <a:rPr lang="es-ES" smtClean="0"/>
+              <a:t>Haga clic para modificar el estilo de texto del patrón</a:t>
             </a:r>
           </a:p>
           <a:p>
             <a:pPr lvl="1"/>
             <a:r>
-              <a:rPr lang="en-US" smtClean="0"/>
-              <a:t>Second level</a:t>
+              <a:rPr lang="es-ES" smtClean="0"/>
+              <a:t>Segundo nivel</a:t>
             </a:r>
           </a:p>
           <a:p>
             <a:pPr lvl="2"/>
             <a:r>
-              <a:rPr lang="en-US" smtClean="0"/>
-              <a:t>Third level</a:t>
+              <a:rPr lang="es-ES" smtClean="0"/>
+              <a:t>Tercer nivel</a:t>
             </a:r>
           </a:p>
           <a:p>
             <a:pPr lvl="3"/>
             <a:r>
-              <a:rPr lang="en-US" smtClean="0"/>
-              <a:t>Fourth level</a:t>
+              <a:rPr lang="es-ES" smtClean="0"/>
+              <a:t>Cuarto nivel</a:t>
             </a:r>
           </a:p>
           <a:p>
             <a:pPr lvl="4"/>
             <a:r>
-              <a:rPr lang="en-US" smtClean="0"/>
-              <a:t>Fifth level</a:t>
-            </a:r>
-            <a:endParaRPr lang="en-US"/>
-          </a:p>
-        </p:txBody>
-      </p:sp>
-      <p:sp>
-        <p:nvSpPr>
-          <p:cNvPr id="4" name="Date Placeholder 3"/>
+              <a:rPr lang="es-ES" smtClean="0"/>
+              <a:t>Quinto nivel</a:t>
+            </a:r>
+            <a:endParaRPr lang="es-CO"/>
+          </a:p>
+        </p:txBody>
+      </p:sp>
+      <p:sp>
+        <p:nvSpPr>
+          <p:cNvPr id="4" name="Marcador de fecha 3"/>
           <p:cNvSpPr>
             <a:spLocks noGrp="1"/>
           </p:cNvSpPr>
@@ -807,17 +756,17 @@
           <a:bodyPr/>
           <a:lstStyle/>
           <a:p>
-            <a:fld id="{5BCAD085-E8A6-8845-BD4E-CB4CCA059FC4}" type="datetimeFigureOut">
-              <a:rPr lang="en-US" smtClean="0"/>
-              <a:t>1/27/13</a:t>
+            <a:fld id="{3B2E3770-A23A-4173-BFB4-C5E21B224C77}" type="datetimeFigureOut">
+              <a:rPr lang="es-CO" smtClean="0"/>
+              <a:t>13/09/2021</a:t>
             </a:fld>
-            <a:endParaRPr lang="en-US"/>
-          </a:p>
-        </p:txBody>
-      </p:sp>
-      <p:sp>
-        <p:nvSpPr>
-          <p:cNvPr id="5" name="Footer Placeholder 4"/>
+            <a:endParaRPr lang="es-CO"/>
+          </a:p>
+        </p:txBody>
+      </p:sp>
+      <p:sp>
+        <p:nvSpPr>
+          <p:cNvPr id="5" name="Marcador de pie de página 4"/>
           <p:cNvSpPr>
             <a:spLocks noGrp="1"/>
           </p:cNvSpPr>
@@ -830,13 +779,13 @@
           <a:bodyPr/>
           <a:lstStyle/>
           <a:p>
-            <a:endParaRPr lang="en-US"/>
-          </a:p>
-        </p:txBody>
-      </p:sp>
-      <p:sp>
-        <p:nvSpPr>
-          <p:cNvPr id="6" name="Slide Number Placeholder 5"/>
+            <a:endParaRPr lang="es-CO"/>
+          </a:p>
+        </p:txBody>
+      </p:sp>
+      <p:sp>
+        <p:nvSpPr>
+          <p:cNvPr id="6" name="Marcador de número de diapositiva 5"/>
           <p:cNvSpPr>
             <a:spLocks noGrp="1"/>
           </p:cNvSpPr>
@@ -849,18 +798,18 @@
           <a:bodyPr/>
           <a:lstStyle/>
           <a:p>
-            <a:fld id="{C1FF6DA9-008F-8B48-92A6-B652298478BF}" type="slidenum">
-              <a:rPr lang="en-US" smtClean="0"/>
-              <a:t>‹#›</a:t>
+            <a:fld id="{3117F2EE-F53C-4EC3-A699-49251ACBC68D}" type="slidenum">
+              <a:rPr lang="es-CO" smtClean="0"/>
+              <a:t>‹Nº›</a:t>
             </a:fld>
-            <a:endParaRPr lang="en-US"/>
+            <a:endParaRPr lang="es-CO"/>
           </a:p>
         </p:txBody>
       </p:sp>
     </p:spTree>
     <p:extLst>
       <p:ext uri="{BB962C8B-B14F-4D97-AF65-F5344CB8AC3E}">
-        <p14:creationId xmlns:p14="http://schemas.microsoft.com/office/powerpoint/2010/main" val="2614314258"/>
+        <p14:creationId xmlns:p14="http://schemas.microsoft.com/office/powerpoint/2010/main" val="3338860387"/>
       </p:ext>
     </p:extLst>
   </p:cSld>
@@ -872,7 +821,7 @@
 
 <file path=ppt/slideLayouts/slideLayout3.xml><?xml version="1.0" encoding="utf-8"?>
 <p:sldLayout xmlns:a="http://schemas.openxmlformats.org/drawingml/2006/main" xmlns:r="http://schemas.openxmlformats.org/officeDocument/2006/relationships" xmlns:p="http://schemas.openxmlformats.org/presentationml/2006/main" type="secHead" preserve="1">
-  <p:cSld name="Section Header">
+  <p:cSld name="Encabezado de sección">
     <p:spTree>
       <p:nvGrpSpPr>
         <p:cNvPr id="1" name=""/>
@@ -889,7 +838,7 @@
       </p:grpSpPr>
       <p:sp>
         <p:nvSpPr>
-          <p:cNvPr id="2" name="Title 1"/>
+          <p:cNvPr id="2" name="Título 1"/>
           <p:cNvSpPr>
             <a:spLocks noGrp="1"/>
           </p:cNvSpPr>
@@ -899,29 +848,29 @@
         </p:nvSpPr>
         <p:spPr>
           <a:xfrm>
-            <a:off x="722313" y="4406900"/>
-            <a:ext cx="7772400" cy="1362075"/>
+            <a:off x="467916" y="2279652"/>
+            <a:ext cx="5915025" cy="3803649"/>
           </a:xfrm>
         </p:spPr>
         <p:txBody>
-          <a:bodyPr anchor="t"/>
+          <a:bodyPr anchor="b"/>
           <a:lstStyle>
-            <a:lvl1pPr algn="l">
-              <a:defRPr sz="4000" b="1" cap="all"/>
+            <a:lvl1pPr>
+              <a:defRPr sz="3375"/>
             </a:lvl1pPr>
           </a:lstStyle>
           <a:p>
             <a:r>
-              <a:rPr lang="en-US" smtClean="0"/>
-              <a:t>Click to edit Master title style</a:t>
-            </a:r>
-            <a:endParaRPr lang="en-US"/>
-          </a:p>
-        </p:txBody>
-      </p:sp>
-      <p:sp>
-        <p:nvSpPr>
-          <p:cNvPr id="3" name="Text Placeholder 2"/>
+              <a:rPr lang="es-ES" smtClean="0"/>
+              <a:t>Haga clic para modificar el estilo de título del patrón</a:t>
+            </a:r>
+            <a:endParaRPr lang="es-CO"/>
+          </a:p>
+        </p:txBody>
+      </p:sp>
+      <p:sp>
+        <p:nvSpPr>
+          <p:cNvPr id="3" name="Marcador de texto 2"/>
           <p:cNvSpPr>
             <a:spLocks noGrp="1"/>
           </p:cNvSpPr>
@@ -931,16 +880,16 @@
         </p:nvSpPr>
         <p:spPr>
           <a:xfrm>
-            <a:off x="722313" y="2906713"/>
-            <a:ext cx="7772400" cy="1500187"/>
+            <a:off x="467916" y="6119285"/>
+            <a:ext cx="5915025" cy="2000249"/>
           </a:xfrm>
         </p:spPr>
         <p:txBody>
-          <a:bodyPr anchor="b"/>
+          <a:bodyPr/>
           <a:lstStyle>
             <a:lvl1pPr marL="0" indent="0">
               <a:buNone/>
-              <a:defRPr sz="2000">
+              <a:defRPr sz="1350">
                 <a:solidFill>
                   <a:schemeClr val="tx1">
                     <a:tint val="75000"/>
@@ -948,9 +897,9 @@
                 </a:solidFill>
               </a:defRPr>
             </a:lvl1pPr>
-            <a:lvl2pPr marL="457200" indent="0">
-              <a:buNone/>
-              <a:defRPr sz="1800">
+            <a:lvl2pPr marL="257175" indent="0">
+              <a:buNone/>
+              <a:defRPr sz="1125">
                 <a:solidFill>
                   <a:schemeClr val="tx1">
                     <a:tint val="75000"/>
@@ -958,9 +907,9 @@
                 </a:solidFill>
               </a:defRPr>
             </a:lvl2pPr>
-            <a:lvl3pPr marL="914400" indent="0">
-              <a:buNone/>
-              <a:defRPr sz="1600">
+            <a:lvl3pPr marL="514350" indent="0">
+              <a:buNone/>
+              <a:defRPr sz="1013">
                 <a:solidFill>
                   <a:schemeClr val="tx1">
                     <a:tint val="75000"/>
@@ -968,9 +917,9 @@
                 </a:solidFill>
               </a:defRPr>
             </a:lvl3pPr>
-            <a:lvl4pPr marL="1371600" indent="0">
-              <a:buNone/>
-              <a:defRPr sz="1400">
+            <a:lvl4pPr marL="771525" indent="0">
+              <a:buNone/>
+              <a:defRPr sz="900">
                 <a:solidFill>
                   <a:schemeClr val="tx1">
                     <a:tint val="75000"/>
@@ -978,9 +927,9 @@
                 </a:solidFill>
               </a:defRPr>
             </a:lvl4pPr>
-            <a:lvl5pPr marL="1828800" indent="0">
-              <a:buNone/>
-              <a:defRPr sz="1400">
+            <a:lvl5pPr marL="1028700" indent="0">
+              <a:buNone/>
+              <a:defRPr sz="900">
                 <a:solidFill>
                   <a:schemeClr val="tx1">
                     <a:tint val="75000"/>
@@ -988,9 +937,9 @@
                 </a:solidFill>
               </a:defRPr>
             </a:lvl5pPr>
-            <a:lvl6pPr marL="2286000" indent="0">
-              <a:buNone/>
-              <a:defRPr sz="1400">
+            <a:lvl6pPr marL="1285875" indent="0">
+              <a:buNone/>
+              <a:defRPr sz="900">
                 <a:solidFill>
                   <a:schemeClr val="tx1">
                     <a:tint val="75000"/>
@@ -998,9 +947,9 @@
                 </a:solidFill>
               </a:defRPr>
             </a:lvl6pPr>
-            <a:lvl7pPr marL="2743200" indent="0">
-              <a:buNone/>
-              <a:defRPr sz="1400">
+            <a:lvl7pPr marL="1543050" indent="0">
+              <a:buNone/>
+              <a:defRPr sz="900">
                 <a:solidFill>
                   <a:schemeClr val="tx1">
                     <a:tint val="75000"/>
@@ -1008,9 +957,9 @@
                 </a:solidFill>
               </a:defRPr>
             </a:lvl7pPr>
-            <a:lvl8pPr marL="3200400" indent="0">
-              <a:buNone/>
-              <a:defRPr sz="1400">
+            <a:lvl8pPr marL="1800225" indent="0">
+              <a:buNone/>
+              <a:defRPr sz="900">
                 <a:solidFill>
                   <a:schemeClr val="tx1">
                     <a:tint val="75000"/>
@@ -1018,9 +967,9 @@
                 </a:solidFill>
               </a:defRPr>
             </a:lvl8pPr>
-            <a:lvl9pPr marL="3657600" indent="0">
-              <a:buNone/>
-              <a:defRPr sz="1400">
+            <a:lvl9pPr marL="2057400" indent="0">
+              <a:buNone/>
+              <a:defRPr sz="900">
                 <a:solidFill>
                   <a:schemeClr val="tx1">
                     <a:tint val="75000"/>
@@ -1032,15 +981,15 @@
           <a:p>
             <a:pPr lvl="0"/>
             <a:r>
-              <a:rPr lang="en-US" smtClean="0"/>
-              <a:t>Click to edit Master text styles</a:t>
-            </a:r>
-          </a:p>
-        </p:txBody>
-      </p:sp>
-      <p:sp>
-        <p:nvSpPr>
-          <p:cNvPr id="4" name="Date Placeholder 3"/>
+              <a:rPr lang="es-ES" smtClean="0"/>
+              <a:t>Haga clic para modificar el estilo de texto del patrón</a:t>
+            </a:r>
+          </a:p>
+        </p:txBody>
+      </p:sp>
+      <p:sp>
+        <p:nvSpPr>
+          <p:cNvPr id="4" name="Marcador de fecha 3"/>
           <p:cNvSpPr>
             <a:spLocks noGrp="1"/>
           </p:cNvSpPr>
@@ -1053,17 +1002,17 @@
           <a:bodyPr/>
           <a:lstStyle/>
           <a:p>
-            <a:fld id="{5BCAD085-E8A6-8845-BD4E-CB4CCA059FC4}" type="datetimeFigureOut">
-              <a:rPr lang="en-US" smtClean="0"/>
-              <a:t>1/27/13</a:t>
+            <a:fld id="{3B2E3770-A23A-4173-BFB4-C5E21B224C77}" type="datetimeFigureOut">
+              <a:rPr lang="es-CO" smtClean="0"/>
+              <a:t>13/09/2021</a:t>
             </a:fld>
-            <a:endParaRPr lang="en-US"/>
-          </a:p>
-        </p:txBody>
-      </p:sp>
-      <p:sp>
-        <p:nvSpPr>
-          <p:cNvPr id="5" name="Footer Placeholder 4"/>
+            <a:endParaRPr lang="es-CO"/>
+          </a:p>
+        </p:txBody>
+      </p:sp>
+      <p:sp>
+        <p:nvSpPr>
+          <p:cNvPr id="5" name="Marcador de pie de página 4"/>
           <p:cNvSpPr>
             <a:spLocks noGrp="1"/>
           </p:cNvSpPr>
@@ -1076,13 +1025,13 @@
           <a:bodyPr/>
           <a:lstStyle/>
           <a:p>
-            <a:endParaRPr lang="en-US"/>
-          </a:p>
-        </p:txBody>
-      </p:sp>
-      <p:sp>
-        <p:nvSpPr>
-          <p:cNvPr id="6" name="Slide Number Placeholder 5"/>
+            <a:endParaRPr lang="es-CO"/>
+          </a:p>
+        </p:txBody>
+      </p:sp>
+      <p:sp>
+        <p:nvSpPr>
+          <p:cNvPr id="6" name="Marcador de número de diapositiva 5"/>
           <p:cNvSpPr>
             <a:spLocks noGrp="1"/>
           </p:cNvSpPr>
@@ -1095,18 +1044,18 @@
           <a:bodyPr/>
           <a:lstStyle/>
           <a:p>
-            <a:fld id="{C1FF6DA9-008F-8B48-92A6-B652298478BF}" type="slidenum">
-              <a:rPr lang="en-US" smtClean="0"/>
-              <a:t>‹#›</a:t>
+            <a:fld id="{3117F2EE-F53C-4EC3-A699-49251ACBC68D}" type="slidenum">
+              <a:rPr lang="es-CO" smtClean="0"/>
+              <a:t>‹Nº›</a:t>
             </a:fld>
-            <a:endParaRPr lang="en-US"/>
+            <a:endParaRPr lang="es-CO"/>
           </a:p>
         </p:txBody>
       </p:sp>
     </p:spTree>
     <p:extLst>
       <p:ext uri="{BB962C8B-B14F-4D97-AF65-F5344CB8AC3E}">
-        <p14:creationId xmlns:p14="http://schemas.microsoft.com/office/powerpoint/2010/main" val="960648375"/>
+        <p14:creationId xmlns:p14="http://schemas.microsoft.com/office/powerpoint/2010/main" val="563176640"/>
       </p:ext>
     </p:extLst>
   </p:cSld>
@@ -1118,7 +1067,7 @@
 
 <file path=ppt/slideLayouts/slideLayout4.xml><?xml version="1.0" encoding="utf-8"?>
 <p:sldLayout xmlns:a="http://schemas.openxmlformats.org/drawingml/2006/main" xmlns:r="http://schemas.openxmlformats.org/officeDocument/2006/relationships" xmlns:p="http://schemas.openxmlformats.org/presentationml/2006/main" type="twoObj" preserve="1">
-  <p:cSld name="Two Content">
+  <p:cSld name="Dos objetos">
     <p:spTree>
       <p:nvGrpSpPr>
         <p:cNvPr id="1" name=""/>
@@ -1135,7 +1084,7 @@
       </p:grpSpPr>
       <p:sp>
         <p:nvSpPr>
-          <p:cNvPr id="2" name="Title 1"/>
+          <p:cNvPr id="2" name="Título 1"/>
           <p:cNvSpPr>
             <a:spLocks noGrp="1"/>
           </p:cNvSpPr>
@@ -1149,16 +1098,16 @@
           <a:lstStyle/>
           <a:p>
             <a:r>
-              <a:rPr lang="en-US" smtClean="0"/>
-              <a:t>Click to edit Master title style</a:t>
-            </a:r>
-            <a:endParaRPr lang="en-US"/>
-          </a:p>
-        </p:txBody>
-      </p:sp>
-      <p:sp>
-        <p:nvSpPr>
-          <p:cNvPr id="3" name="Content Placeholder 2"/>
+              <a:rPr lang="es-ES" smtClean="0"/>
+              <a:t>Haga clic para modificar el estilo de título del patrón</a:t>
+            </a:r>
+            <a:endParaRPr lang="es-CO"/>
+          </a:p>
+        </p:txBody>
+      </p:sp>
+      <p:sp>
+        <p:nvSpPr>
+          <p:cNvPr id="3" name="Marcador de contenido 2"/>
           <p:cNvSpPr>
             <a:spLocks noGrp="1"/>
           </p:cNvSpPr>
@@ -1168,82 +1117,54 @@
         </p:nvSpPr>
         <p:spPr>
           <a:xfrm>
-            <a:off x="457200" y="1600200"/>
-            <a:ext cx="4038600" cy="4525963"/>
+            <a:off x="265212" y="3244851"/>
+            <a:ext cx="1620738" cy="7736416"/>
           </a:xfrm>
         </p:spPr>
         <p:txBody>
           <a:bodyPr/>
-          <a:lstStyle>
-            <a:lvl1pPr>
-              <a:defRPr sz="2800"/>
-            </a:lvl1pPr>
-            <a:lvl2pPr>
-              <a:defRPr sz="2400"/>
-            </a:lvl2pPr>
-            <a:lvl3pPr>
-              <a:defRPr sz="2000"/>
-            </a:lvl3pPr>
-            <a:lvl4pPr>
-              <a:defRPr sz="1800"/>
-            </a:lvl4pPr>
-            <a:lvl5pPr>
-              <a:defRPr sz="1800"/>
-            </a:lvl5pPr>
-            <a:lvl6pPr>
-              <a:defRPr sz="1800"/>
-            </a:lvl6pPr>
-            <a:lvl7pPr>
-              <a:defRPr sz="1800"/>
-            </a:lvl7pPr>
-            <a:lvl8pPr>
-              <a:defRPr sz="1800"/>
-            </a:lvl8pPr>
-            <a:lvl9pPr>
-              <a:defRPr sz="1800"/>
-            </a:lvl9pPr>
-          </a:lstStyle>
+          <a:lstStyle/>
           <a:p>
             <a:pPr lvl="0"/>
             <a:r>
-              <a:rPr lang="en-US" smtClean="0"/>
-              <a:t>Click to edit Master text styles</a:t>
+              <a:rPr lang="es-ES" smtClean="0"/>
+              <a:t>Haga clic para modificar el estilo de texto del patrón</a:t>
             </a:r>
           </a:p>
           <a:p>
             <a:pPr lvl="1"/>
             <a:r>
-              <a:rPr lang="en-US" smtClean="0"/>
-              <a:t>Second level</a:t>
+              <a:rPr lang="es-ES" smtClean="0"/>
+              <a:t>Segundo nivel</a:t>
             </a:r>
           </a:p>
           <a:p>
             <a:pPr lvl="2"/>
             <a:r>
-              <a:rPr lang="en-US" smtClean="0"/>
-              <a:t>Third level</a:t>
+              <a:rPr lang="es-ES" smtClean="0"/>
+              <a:t>Tercer nivel</a:t>
             </a:r>
           </a:p>
           <a:p>
             <a:pPr lvl="3"/>
             <a:r>
-              <a:rPr lang="en-US" smtClean="0"/>
-              <a:t>Fourth level</a:t>
+              <a:rPr lang="es-ES" smtClean="0"/>
+              <a:t>Cuarto nivel</a:t>
             </a:r>
           </a:p>
           <a:p>
             <a:pPr lvl="4"/>
             <a:r>
-              <a:rPr lang="en-US" smtClean="0"/>
-              <a:t>Fifth level</a:t>
-            </a:r>
-            <a:endParaRPr lang="en-US"/>
-          </a:p>
-        </p:txBody>
-      </p:sp>
-      <p:sp>
-        <p:nvSpPr>
-          <p:cNvPr id="4" name="Content Placeholder 3"/>
+              <a:rPr lang="es-ES" smtClean="0"/>
+              <a:t>Quinto nivel</a:t>
+            </a:r>
+            <a:endParaRPr lang="es-CO"/>
+          </a:p>
+        </p:txBody>
+      </p:sp>
+      <p:sp>
+        <p:nvSpPr>
+          <p:cNvPr id="4" name="Marcador de contenido 3"/>
           <p:cNvSpPr>
             <a:spLocks noGrp="1"/>
           </p:cNvSpPr>
@@ -1253,82 +1174,54 @@
         </p:nvSpPr>
         <p:spPr>
           <a:xfrm>
-            <a:off x="4648200" y="1600200"/>
-            <a:ext cx="4038600" cy="4525963"/>
+            <a:off x="1971675" y="3244851"/>
+            <a:ext cx="1620739" cy="7736416"/>
           </a:xfrm>
         </p:spPr>
         <p:txBody>
           <a:bodyPr/>
-          <a:lstStyle>
-            <a:lvl1pPr>
-              <a:defRPr sz="2800"/>
-            </a:lvl1pPr>
-            <a:lvl2pPr>
-              <a:defRPr sz="2400"/>
-            </a:lvl2pPr>
-            <a:lvl3pPr>
-              <a:defRPr sz="2000"/>
-            </a:lvl3pPr>
-            <a:lvl4pPr>
-              <a:defRPr sz="1800"/>
-            </a:lvl4pPr>
-            <a:lvl5pPr>
-              <a:defRPr sz="1800"/>
-            </a:lvl5pPr>
-            <a:lvl6pPr>
-              <a:defRPr sz="1800"/>
-            </a:lvl6pPr>
-            <a:lvl7pPr>
-              <a:defRPr sz="1800"/>
-            </a:lvl7pPr>
-            <a:lvl8pPr>
-              <a:defRPr sz="1800"/>
-            </a:lvl8pPr>
-            <a:lvl9pPr>
-              <a:defRPr sz="1800"/>
-            </a:lvl9pPr>
-          </a:lstStyle>
+          <a:lstStyle/>
           <a:p>
             <a:pPr lvl="0"/>
             <a:r>
-              <a:rPr lang="en-US" smtClean="0"/>
-              <a:t>Click to edit Master text styles</a:t>
+              <a:rPr lang="es-ES" smtClean="0"/>
+              <a:t>Haga clic para modificar el estilo de texto del patrón</a:t>
             </a:r>
           </a:p>
           <a:p>
             <a:pPr lvl="1"/>
             <a:r>
-              <a:rPr lang="en-US" smtClean="0"/>
-              <a:t>Second level</a:t>
+              <a:rPr lang="es-ES" smtClean="0"/>
+              <a:t>Segundo nivel</a:t>
             </a:r>
           </a:p>
           <a:p>
             <a:pPr lvl="2"/>
             <a:r>
-              <a:rPr lang="en-US" smtClean="0"/>
-              <a:t>Third level</a:t>
+              <a:rPr lang="es-ES" smtClean="0"/>
+              <a:t>Tercer nivel</a:t>
             </a:r>
           </a:p>
           <a:p>
             <a:pPr lvl="3"/>
             <a:r>
-              <a:rPr lang="en-US" smtClean="0"/>
-              <a:t>Fourth level</a:t>
+              <a:rPr lang="es-ES" smtClean="0"/>
+              <a:t>Cuarto nivel</a:t>
             </a:r>
           </a:p>
           <a:p>
             <a:pPr lvl="4"/>
             <a:r>
-              <a:rPr lang="en-US" smtClean="0"/>
-              <a:t>Fifth level</a:t>
-            </a:r>
-            <a:endParaRPr lang="en-US"/>
-          </a:p>
-        </p:txBody>
-      </p:sp>
-      <p:sp>
-        <p:nvSpPr>
-          <p:cNvPr id="5" name="Date Placeholder 4"/>
+              <a:rPr lang="es-ES" smtClean="0"/>
+              <a:t>Quinto nivel</a:t>
+            </a:r>
+            <a:endParaRPr lang="es-CO"/>
+          </a:p>
+        </p:txBody>
+      </p:sp>
+      <p:sp>
+        <p:nvSpPr>
+          <p:cNvPr id="5" name="Marcador de fecha 4"/>
           <p:cNvSpPr>
             <a:spLocks noGrp="1"/>
           </p:cNvSpPr>
@@ -1341,17 +1234,17 @@
           <a:bodyPr/>
           <a:lstStyle/>
           <a:p>
-            <a:fld id="{5BCAD085-E8A6-8845-BD4E-CB4CCA059FC4}" type="datetimeFigureOut">
-              <a:rPr lang="en-US" smtClean="0"/>
-              <a:t>1/27/13</a:t>
+            <a:fld id="{3B2E3770-A23A-4173-BFB4-C5E21B224C77}" type="datetimeFigureOut">
+              <a:rPr lang="es-CO" smtClean="0"/>
+              <a:t>13/09/2021</a:t>
             </a:fld>
-            <a:endParaRPr lang="en-US"/>
-          </a:p>
-        </p:txBody>
-      </p:sp>
-      <p:sp>
-        <p:nvSpPr>
-          <p:cNvPr id="6" name="Footer Placeholder 5"/>
+            <a:endParaRPr lang="es-CO"/>
+          </a:p>
+        </p:txBody>
+      </p:sp>
+      <p:sp>
+        <p:nvSpPr>
+          <p:cNvPr id="6" name="Marcador de pie de página 5"/>
           <p:cNvSpPr>
             <a:spLocks noGrp="1"/>
           </p:cNvSpPr>
@@ -1364,13 +1257,13 @@
           <a:bodyPr/>
           <a:lstStyle/>
           <a:p>
-            <a:endParaRPr lang="en-US"/>
-          </a:p>
-        </p:txBody>
-      </p:sp>
-      <p:sp>
-        <p:nvSpPr>
-          <p:cNvPr id="7" name="Slide Number Placeholder 6"/>
+            <a:endParaRPr lang="es-CO"/>
+          </a:p>
+        </p:txBody>
+      </p:sp>
+      <p:sp>
+        <p:nvSpPr>
+          <p:cNvPr id="7" name="Marcador de número de diapositiva 6"/>
           <p:cNvSpPr>
             <a:spLocks noGrp="1"/>
           </p:cNvSpPr>
@@ -1383,18 +1276,18 @@
           <a:bodyPr/>
           <a:lstStyle/>
           <a:p>
-            <a:fld id="{C1FF6DA9-008F-8B48-92A6-B652298478BF}" type="slidenum">
-              <a:rPr lang="en-US" smtClean="0"/>
-              <a:t>‹#›</a:t>
+            <a:fld id="{3117F2EE-F53C-4EC3-A699-49251ACBC68D}" type="slidenum">
+              <a:rPr lang="es-CO" smtClean="0"/>
+              <a:t>‹Nº›</a:t>
             </a:fld>
-            <a:endParaRPr lang="en-US"/>
+            <a:endParaRPr lang="es-CO"/>
           </a:p>
         </p:txBody>
       </p:sp>
     </p:spTree>
     <p:extLst>
       <p:ext uri="{BB962C8B-B14F-4D97-AF65-F5344CB8AC3E}">
-        <p14:creationId xmlns:p14="http://schemas.microsoft.com/office/powerpoint/2010/main" val="2782244947"/>
+        <p14:creationId xmlns:p14="http://schemas.microsoft.com/office/powerpoint/2010/main" val="1179222241"/>
       </p:ext>
     </p:extLst>
   </p:cSld>
@@ -1406,7 +1299,7 @@
 
 <file path=ppt/slideLayouts/slideLayout5.xml><?xml version="1.0" encoding="utf-8"?>
 <p:sldLayout xmlns:a="http://schemas.openxmlformats.org/drawingml/2006/main" xmlns:r="http://schemas.openxmlformats.org/officeDocument/2006/relationships" xmlns:p="http://schemas.openxmlformats.org/presentationml/2006/main" type="twoTxTwoObj" preserve="1">
-  <p:cSld name="Comparison">
+  <p:cSld name="Comparación">
     <p:spTree>
       <p:nvGrpSpPr>
         <p:cNvPr id="1" name=""/>
@@ -1423,45 +1316,46 @@
       </p:grpSpPr>
       <p:sp>
         <p:nvSpPr>
-          <p:cNvPr id="2" name="Title 1"/>
+          <p:cNvPr id="2" name="Título 1"/>
           <p:cNvSpPr>
             <a:spLocks noGrp="1"/>
           </p:cNvSpPr>
           <p:nvPr>
             <p:ph type="title"/>
-          </p:nvPr>
-        </p:nvSpPr>
-        <p:spPr/>
-        <p:txBody>
-          <a:bodyPr/>
-          <a:lstStyle>
-            <a:lvl1pPr>
-              <a:defRPr/>
-            </a:lvl1pPr>
-          </a:lstStyle>
-          <a:p>
-            <a:r>
-              <a:rPr lang="en-US" smtClean="0"/>
-              <a:t>Click to edit Master title style</a:t>
-            </a:r>
-            <a:endParaRPr lang="en-US"/>
-          </a:p>
-        </p:txBody>
-      </p:sp>
-      <p:sp>
-        <p:nvSpPr>
-          <p:cNvPr id="3" name="Text Placeholder 2"/>
-          <p:cNvSpPr>
-            <a:spLocks noGrp="1"/>
-          </p:cNvSpPr>
-          <p:nvPr>
-            <p:ph type="body" idx="1"/>
           </p:nvPr>
         </p:nvSpPr>
         <p:spPr>
           <a:xfrm>
-            <a:off x="457200" y="1535113"/>
-            <a:ext cx="4040188" cy="639762"/>
+            <a:off x="472381" y="486834"/>
+            <a:ext cx="5915025" cy="1767417"/>
+          </a:xfrm>
+        </p:spPr>
+        <p:txBody>
+          <a:bodyPr/>
+          <a:lstStyle/>
+          <a:p>
+            <a:r>
+              <a:rPr lang="es-ES" smtClean="0"/>
+              <a:t>Haga clic para modificar el estilo de título del patrón</a:t>
+            </a:r>
+            <a:endParaRPr lang="es-CO"/>
+          </a:p>
+        </p:txBody>
+      </p:sp>
+      <p:sp>
+        <p:nvSpPr>
+          <p:cNvPr id="3" name="Marcador de texto 2"/>
+          <p:cNvSpPr>
+            <a:spLocks noGrp="1"/>
+          </p:cNvSpPr>
+          <p:nvPr>
+            <p:ph type="body" idx="1"/>
+          </p:nvPr>
+        </p:nvSpPr>
+        <p:spPr>
+          <a:xfrm>
+            <a:off x="472381" y="2241551"/>
+            <a:ext cx="2901255" cy="1098549"/>
           </a:xfrm>
         </p:spPr>
         <p:txBody>
@@ -1469,53 +1363,53 @@
           <a:lstStyle>
             <a:lvl1pPr marL="0" indent="0">
               <a:buNone/>
-              <a:defRPr sz="2400" b="1"/>
+              <a:defRPr sz="1350" b="1"/>
             </a:lvl1pPr>
-            <a:lvl2pPr marL="457200" indent="0">
-              <a:buNone/>
-              <a:defRPr sz="2000" b="1"/>
+            <a:lvl2pPr marL="257175" indent="0">
+              <a:buNone/>
+              <a:defRPr sz="1125" b="1"/>
             </a:lvl2pPr>
-            <a:lvl3pPr marL="914400" indent="0">
-              <a:buNone/>
-              <a:defRPr sz="1800" b="1"/>
+            <a:lvl3pPr marL="514350" indent="0">
+              <a:buNone/>
+              <a:defRPr sz="1013" b="1"/>
             </a:lvl3pPr>
-            <a:lvl4pPr marL="1371600" indent="0">
-              <a:buNone/>
-              <a:defRPr sz="1600" b="1"/>
+            <a:lvl4pPr marL="771525" indent="0">
+              <a:buNone/>
+              <a:defRPr sz="900" b="1"/>
             </a:lvl4pPr>
-            <a:lvl5pPr marL="1828800" indent="0">
-              <a:buNone/>
-              <a:defRPr sz="1600" b="1"/>
+            <a:lvl5pPr marL="1028700" indent="0">
+              <a:buNone/>
+              <a:defRPr sz="900" b="1"/>
             </a:lvl5pPr>
-            <a:lvl6pPr marL="2286000" indent="0">
-              <a:buNone/>
-              <a:defRPr sz="1600" b="1"/>
+            <a:lvl6pPr marL="1285875" indent="0">
+              <a:buNone/>
+              <a:defRPr sz="900" b="1"/>
             </a:lvl6pPr>
-            <a:lvl7pPr marL="2743200" indent="0">
-              <a:buNone/>
-              <a:defRPr sz="1600" b="1"/>
+            <a:lvl7pPr marL="1543050" indent="0">
+              <a:buNone/>
+              <a:defRPr sz="900" b="1"/>
             </a:lvl7pPr>
-            <a:lvl8pPr marL="3200400" indent="0">
-              <a:buNone/>
-              <a:defRPr sz="1600" b="1"/>
+            <a:lvl8pPr marL="1800225" indent="0">
+              <a:buNone/>
+              <a:defRPr sz="900" b="1"/>
             </a:lvl8pPr>
-            <a:lvl9pPr marL="3657600" indent="0">
-              <a:buNone/>
-              <a:defRPr sz="1600" b="1"/>
+            <a:lvl9pPr marL="2057400" indent="0">
+              <a:buNone/>
+              <a:defRPr sz="900" b="1"/>
             </a:lvl9pPr>
           </a:lstStyle>
           <a:p>
             <a:pPr lvl="0"/>
             <a:r>
-              <a:rPr lang="en-US" smtClean="0"/>
-              <a:t>Click to edit Master text styles</a:t>
-            </a:r>
-          </a:p>
-        </p:txBody>
-      </p:sp>
-      <p:sp>
-        <p:nvSpPr>
-          <p:cNvPr id="4" name="Content Placeholder 3"/>
+              <a:rPr lang="es-ES" smtClean="0"/>
+              <a:t>Haga clic para modificar el estilo de texto del patrón</a:t>
+            </a:r>
+          </a:p>
+        </p:txBody>
+      </p:sp>
+      <p:sp>
+        <p:nvSpPr>
+          <p:cNvPr id="4" name="Marcador de contenido 3"/>
           <p:cNvSpPr>
             <a:spLocks noGrp="1"/>
           </p:cNvSpPr>
@@ -1525,82 +1419,54 @@
         </p:nvSpPr>
         <p:spPr>
           <a:xfrm>
-            <a:off x="457200" y="2174875"/>
-            <a:ext cx="4040188" cy="3951288"/>
+            <a:off x="472381" y="3340100"/>
+            <a:ext cx="2901255" cy="4912784"/>
           </a:xfrm>
         </p:spPr>
         <p:txBody>
           <a:bodyPr/>
-          <a:lstStyle>
-            <a:lvl1pPr>
-              <a:defRPr sz="2400"/>
-            </a:lvl1pPr>
-            <a:lvl2pPr>
-              <a:defRPr sz="2000"/>
-            </a:lvl2pPr>
-            <a:lvl3pPr>
-              <a:defRPr sz="1800"/>
-            </a:lvl3pPr>
-            <a:lvl4pPr>
-              <a:defRPr sz="1600"/>
-            </a:lvl4pPr>
-            <a:lvl5pPr>
-              <a:defRPr sz="1600"/>
-            </a:lvl5pPr>
-            <a:lvl6pPr>
-              <a:defRPr sz="1600"/>
-            </a:lvl6pPr>
-            <a:lvl7pPr>
-              <a:defRPr sz="1600"/>
-            </a:lvl7pPr>
-            <a:lvl8pPr>
-              <a:defRPr sz="1600"/>
-            </a:lvl8pPr>
-            <a:lvl9pPr>
-              <a:defRPr sz="1600"/>
-            </a:lvl9pPr>
-          </a:lstStyle>
+          <a:lstStyle/>
           <a:p>
             <a:pPr lvl="0"/>
             <a:r>
-              <a:rPr lang="en-US" smtClean="0"/>
-              <a:t>Click to edit Master text styles</a:t>
+              <a:rPr lang="es-ES" smtClean="0"/>
+              <a:t>Haga clic para modificar el estilo de texto del patrón</a:t>
             </a:r>
           </a:p>
           <a:p>
             <a:pPr lvl="1"/>
             <a:r>
-              <a:rPr lang="en-US" smtClean="0"/>
-              <a:t>Second level</a:t>
+              <a:rPr lang="es-ES" smtClean="0"/>
+              <a:t>Segundo nivel</a:t>
             </a:r>
           </a:p>
           <a:p>
             <a:pPr lvl="2"/>
             <a:r>
-              <a:rPr lang="en-US" smtClean="0"/>
-              <a:t>Third level</a:t>
+              <a:rPr lang="es-ES" smtClean="0"/>
+              <a:t>Tercer nivel</a:t>
             </a:r>
           </a:p>
           <a:p>
             <a:pPr lvl="3"/>
             <a:r>
-              <a:rPr lang="en-US" smtClean="0"/>
-              <a:t>Fourth level</a:t>
+              <a:rPr lang="es-ES" smtClean="0"/>
+              <a:t>Cuarto nivel</a:t>
             </a:r>
           </a:p>
           <a:p>
             <a:pPr lvl="4"/>
             <a:r>
-              <a:rPr lang="en-US" smtClean="0"/>
-              <a:t>Fifth level</a:t>
-            </a:r>
-            <a:endParaRPr lang="en-US"/>
-          </a:p>
-        </p:txBody>
-      </p:sp>
-      <p:sp>
-        <p:nvSpPr>
-          <p:cNvPr id="5" name="Text Placeholder 4"/>
+              <a:rPr lang="es-ES" smtClean="0"/>
+              <a:t>Quinto nivel</a:t>
+            </a:r>
+            <a:endParaRPr lang="es-CO"/>
+          </a:p>
+        </p:txBody>
+      </p:sp>
+      <p:sp>
+        <p:nvSpPr>
+          <p:cNvPr id="5" name="Marcador de texto 4"/>
           <p:cNvSpPr>
             <a:spLocks noGrp="1"/>
           </p:cNvSpPr>
@@ -1610,8 +1476,8 @@
         </p:nvSpPr>
         <p:spPr>
           <a:xfrm>
-            <a:off x="4645025" y="1535113"/>
-            <a:ext cx="4041775" cy="639762"/>
+            <a:off x="3471863" y="2241551"/>
+            <a:ext cx="2915543" cy="1098549"/>
           </a:xfrm>
         </p:spPr>
         <p:txBody>
@@ -1619,53 +1485,53 @@
           <a:lstStyle>
             <a:lvl1pPr marL="0" indent="0">
               <a:buNone/>
-              <a:defRPr sz="2400" b="1"/>
+              <a:defRPr sz="1350" b="1"/>
             </a:lvl1pPr>
-            <a:lvl2pPr marL="457200" indent="0">
-              <a:buNone/>
-              <a:defRPr sz="2000" b="1"/>
+            <a:lvl2pPr marL="257175" indent="0">
+              <a:buNone/>
+              <a:defRPr sz="1125" b="1"/>
             </a:lvl2pPr>
-            <a:lvl3pPr marL="914400" indent="0">
-              <a:buNone/>
-              <a:defRPr sz="1800" b="1"/>
+            <a:lvl3pPr marL="514350" indent="0">
+              <a:buNone/>
+              <a:defRPr sz="1013" b="1"/>
             </a:lvl3pPr>
-            <a:lvl4pPr marL="1371600" indent="0">
-              <a:buNone/>
-              <a:defRPr sz="1600" b="1"/>
+            <a:lvl4pPr marL="771525" indent="0">
+              <a:buNone/>
+              <a:defRPr sz="900" b="1"/>
             </a:lvl4pPr>
-            <a:lvl5pPr marL="1828800" indent="0">
-              <a:buNone/>
-              <a:defRPr sz="1600" b="1"/>
+            <a:lvl5pPr marL="1028700" indent="0">
+              <a:buNone/>
+              <a:defRPr sz="900" b="1"/>
             </a:lvl5pPr>
-            <a:lvl6pPr marL="2286000" indent="0">
-              <a:buNone/>
-              <a:defRPr sz="1600" b="1"/>
+            <a:lvl6pPr marL="1285875" indent="0">
+              <a:buNone/>
+              <a:defRPr sz="900" b="1"/>
             </a:lvl6pPr>
-            <a:lvl7pPr marL="2743200" indent="0">
-              <a:buNone/>
-              <a:defRPr sz="1600" b="1"/>
+            <a:lvl7pPr marL="1543050" indent="0">
+              <a:buNone/>
+              <a:defRPr sz="900" b="1"/>
             </a:lvl7pPr>
-            <a:lvl8pPr marL="3200400" indent="0">
-              <a:buNone/>
-              <a:defRPr sz="1600" b="1"/>
+            <a:lvl8pPr marL="1800225" indent="0">
+              <a:buNone/>
+              <a:defRPr sz="900" b="1"/>
             </a:lvl8pPr>
-            <a:lvl9pPr marL="3657600" indent="0">
-              <a:buNone/>
-              <a:defRPr sz="1600" b="1"/>
+            <a:lvl9pPr marL="2057400" indent="0">
+              <a:buNone/>
+              <a:defRPr sz="900" b="1"/>
             </a:lvl9pPr>
           </a:lstStyle>
           <a:p>
             <a:pPr lvl="0"/>
             <a:r>
-              <a:rPr lang="en-US" smtClean="0"/>
-              <a:t>Click to edit Master text styles</a:t>
-            </a:r>
-          </a:p>
-        </p:txBody>
-      </p:sp>
-      <p:sp>
-        <p:nvSpPr>
-          <p:cNvPr id="6" name="Content Placeholder 5"/>
+              <a:rPr lang="es-ES" smtClean="0"/>
+              <a:t>Haga clic para modificar el estilo de texto del patrón</a:t>
+            </a:r>
+          </a:p>
+        </p:txBody>
+      </p:sp>
+      <p:sp>
+        <p:nvSpPr>
+          <p:cNvPr id="6" name="Marcador de contenido 5"/>
           <p:cNvSpPr>
             <a:spLocks noGrp="1"/>
           </p:cNvSpPr>
@@ -1675,82 +1541,54 @@
         </p:nvSpPr>
         <p:spPr>
           <a:xfrm>
-            <a:off x="4645025" y="2174875"/>
-            <a:ext cx="4041775" cy="3951288"/>
+            <a:off x="3471863" y="3340100"/>
+            <a:ext cx="2915543" cy="4912784"/>
           </a:xfrm>
         </p:spPr>
         <p:txBody>
           <a:bodyPr/>
-          <a:lstStyle>
-            <a:lvl1pPr>
-              <a:defRPr sz="2400"/>
-            </a:lvl1pPr>
-            <a:lvl2pPr>
-              <a:defRPr sz="2000"/>
-            </a:lvl2pPr>
-            <a:lvl3pPr>
-              <a:defRPr sz="1800"/>
-            </a:lvl3pPr>
-            <a:lvl4pPr>
-              <a:defRPr sz="1600"/>
-            </a:lvl4pPr>
-            <a:lvl5pPr>
-              <a:defRPr sz="1600"/>
-            </a:lvl5pPr>
-            <a:lvl6pPr>
-              <a:defRPr sz="1600"/>
-            </a:lvl6pPr>
-            <a:lvl7pPr>
-              <a:defRPr sz="1600"/>
-            </a:lvl7pPr>
-            <a:lvl8pPr>
-              <a:defRPr sz="1600"/>
-            </a:lvl8pPr>
-            <a:lvl9pPr>
-              <a:defRPr sz="1600"/>
-            </a:lvl9pPr>
-          </a:lstStyle>
+          <a:lstStyle/>
           <a:p>
             <a:pPr lvl="0"/>
             <a:r>
-              <a:rPr lang="en-US" smtClean="0"/>
-              <a:t>Click to edit Master text styles</a:t>
+              <a:rPr lang="es-ES" smtClean="0"/>
+              <a:t>Haga clic para modificar el estilo de texto del patrón</a:t>
             </a:r>
           </a:p>
           <a:p>
             <a:pPr lvl="1"/>
             <a:r>
-              <a:rPr lang="en-US" smtClean="0"/>
-              <a:t>Second level</a:t>
+              <a:rPr lang="es-ES" smtClean="0"/>
+              <a:t>Segundo nivel</a:t>
             </a:r>
           </a:p>
           <a:p>
             <a:pPr lvl="2"/>
             <a:r>
-              <a:rPr lang="en-US" smtClean="0"/>
-              <a:t>Third level</a:t>
+              <a:rPr lang="es-ES" smtClean="0"/>
+              <a:t>Tercer nivel</a:t>
             </a:r>
           </a:p>
           <a:p>
             <a:pPr lvl="3"/>
             <a:r>
-              <a:rPr lang="en-US" smtClean="0"/>
-              <a:t>Fourth level</a:t>
+              <a:rPr lang="es-ES" smtClean="0"/>
+              <a:t>Cuarto nivel</a:t>
             </a:r>
           </a:p>
           <a:p>
             <a:pPr lvl="4"/>
             <a:r>
-              <a:rPr lang="en-US" smtClean="0"/>
-              <a:t>Fifth level</a:t>
-            </a:r>
-            <a:endParaRPr lang="en-US"/>
-          </a:p>
-        </p:txBody>
-      </p:sp>
-      <p:sp>
-        <p:nvSpPr>
-          <p:cNvPr id="7" name="Date Placeholder 6"/>
+              <a:rPr lang="es-ES" smtClean="0"/>
+              <a:t>Quinto nivel</a:t>
+            </a:r>
+            <a:endParaRPr lang="es-CO"/>
+          </a:p>
+        </p:txBody>
+      </p:sp>
+      <p:sp>
+        <p:nvSpPr>
+          <p:cNvPr id="7" name="Marcador de fecha 6"/>
           <p:cNvSpPr>
             <a:spLocks noGrp="1"/>
           </p:cNvSpPr>
@@ -1763,17 +1601,17 @@
           <a:bodyPr/>
           <a:lstStyle/>
           <a:p>
-            <a:fld id="{5BCAD085-E8A6-8845-BD4E-CB4CCA059FC4}" type="datetimeFigureOut">
-              <a:rPr lang="en-US" smtClean="0"/>
-              <a:t>1/27/13</a:t>
+            <a:fld id="{3B2E3770-A23A-4173-BFB4-C5E21B224C77}" type="datetimeFigureOut">
+              <a:rPr lang="es-CO" smtClean="0"/>
+              <a:t>13/09/2021</a:t>
             </a:fld>
-            <a:endParaRPr lang="en-US"/>
-          </a:p>
-        </p:txBody>
-      </p:sp>
-      <p:sp>
-        <p:nvSpPr>
-          <p:cNvPr id="8" name="Footer Placeholder 7"/>
+            <a:endParaRPr lang="es-CO"/>
+          </a:p>
+        </p:txBody>
+      </p:sp>
+      <p:sp>
+        <p:nvSpPr>
+          <p:cNvPr id="8" name="Marcador de pie de página 7"/>
           <p:cNvSpPr>
             <a:spLocks noGrp="1"/>
           </p:cNvSpPr>
@@ -1786,13 +1624,13 @@
           <a:bodyPr/>
           <a:lstStyle/>
           <a:p>
-            <a:endParaRPr lang="en-US"/>
-          </a:p>
-        </p:txBody>
-      </p:sp>
-      <p:sp>
-        <p:nvSpPr>
-          <p:cNvPr id="9" name="Slide Number Placeholder 8"/>
+            <a:endParaRPr lang="es-CO"/>
+          </a:p>
+        </p:txBody>
+      </p:sp>
+      <p:sp>
+        <p:nvSpPr>
+          <p:cNvPr id="9" name="Marcador de número de diapositiva 8"/>
           <p:cNvSpPr>
             <a:spLocks noGrp="1"/>
           </p:cNvSpPr>
@@ -1805,18 +1643,18 @@
           <a:bodyPr/>
           <a:lstStyle/>
           <a:p>
-            <a:fld id="{C1FF6DA9-008F-8B48-92A6-B652298478BF}" type="slidenum">
-              <a:rPr lang="en-US" smtClean="0"/>
-              <a:t>‹#›</a:t>
+            <a:fld id="{3117F2EE-F53C-4EC3-A699-49251ACBC68D}" type="slidenum">
+              <a:rPr lang="es-CO" smtClean="0"/>
+              <a:t>‹Nº›</a:t>
             </a:fld>
-            <a:endParaRPr lang="en-US"/>
+            <a:endParaRPr lang="es-CO"/>
           </a:p>
         </p:txBody>
       </p:sp>
     </p:spTree>
     <p:extLst>
       <p:ext uri="{BB962C8B-B14F-4D97-AF65-F5344CB8AC3E}">
-        <p14:creationId xmlns:p14="http://schemas.microsoft.com/office/powerpoint/2010/main" val="990158736"/>
+        <p14:creationId xmlns:p14="http://schemas.microsoft.com/office/powerpoint/2010/main" val="975942707"/>
       </p:ext>
     </p:extLst>
   </p:cSld>
@@ -1828,7 +1666,7 @@
 
 <file path=ppt/slideLayouts/slideLayout6.xml><?xml version="1.0" encoding="utf-8"?>
 <p:sldLayout xmlns:a="http://schemas.openxmlformats.org/drawingml/2006/main" xmlns:r="http://schemas.openxmlformats.org/officeDocument/2006/relationships" xmlns:p="http://schemas.openxmlformats.org/presentationml/2006/main" type="titleOnly" preserve="1">
-  <p:cSld name="Title Only">
+  <p:cSld name="Solo el título">
     <p:spTree>
       <p:nvGrpSpPr>
         <p:cNvPr id="1" name=""/>
@@ -1845,7 +1683,7 @@
       </p:grpSpPr>
       <p:sp>
         <p:nvSpPr>
-          <p:cNvPr id="2" name="Title 1"/>
+          <p:cNvPr id="2" name="Título 1"/>
           <p:cNvSpPr>
             <a:spLocks noGrp="1"/>
           </p:cNvSpPr>
@@ -1859,16 +1697,16 @@
           <a:lstStyle/>
           <a:p>
             <a:r>
-              <a:rPr lang="en-US" smtClean="0"/>
-              <a:t>Click to edit Master title style</a:t>
-            </a:r>
-            <a:endParaRPr lang="en-US"/>
-          </a:p>
-        </p:txBody>
-      </p:sp>
-      <p:sp>
-        <p:nvSpPr>
-          <p:cNvPr id="3" name="Date Placeholder 2"/>
+              <a:rPr lang="es-ES" smtClean="0"/>
+              <a:t>Haga clic para modificar el estilo de título del patrón</a:t>
+            </a:r>
+            <a:endParaRPr lang="es-CO"/>
+          </a:p>
+        </p:txBody>
+      </p:sp>
+      <p:sp>
+        <p:nvSpPr>
+          <p:cNvPr id="3" name="Marcador de fecha 2"/>
           <p:cNvSpPr>
             <a:spLocks noGrp="1"/>
           </p:cNvSpPr>
@@ -1881,17 +1719,17 @@
           <a:bodyPr/>
           <a:lstStyle/>
           <a:p>
-            <a:fld id="{5BCAD085-E8A6-8845-BD4E-CB4CCA059FC4}" type="datetimeFigureOut">
-              <a:rPr lang="en-US" smtClean="0"/>
-              <a:t>1/27/13</a:t>
+            <a:fld id="{3B2E3770-A23A-4173-BFB4-C5E21B224C77}" type="datetimeFigureOut">
+              <a:rPr lang="es-CO" smtClean="0"/>
+              <a:t>13/09/2021</a:t>
             </a:fld>
-            <a:endParaRPr lang="en-US"/>
-          </a:p>
-        </p:txBody>
-      </p:sp>
-      <p:sp>
-        <p:nvSpPr>
-          <p:cNvPr id="4" name="Footer Placeholder 3"/>
+            <a:endParaRPr lang="es-CO"/>
+          </a:p>
+        </p:txBody>
+      </p:sp>
+      <p:sp>
+        <p:nvSpPr>
+          <p:cNvPr id="4" name="Marcador de pie de página 3"/>
           <p:cNvSpPr>
             <a:spLocks noGrp="1"/>
           </p:cNvSpPr>
@@ -1904,13 +1742,13 @@
           <a:bodyPr/>
           <a:lstStyle/>
           <a:p>
-            <a:endParaRPr lang="en-US"/>
-          </a:p>
-        </p:txBody>
-      </p:sp>
-      <p:sp>
-        <p:nvSpPr>
-          <p:cNvPr id="5" name="Slide Number Placeholder 4"/>
+            <a:endParaRPr lang="es-CO"/>
+          </a:p>
+        </p:txBody>
+      </p:sp>
+      <p:sp>
+        <p:nvSpPr>
+          <p:cNvPr id="5" name="Marcador de número de diapositiva 4"/>
           <p:cNvSpPr>
             <a:spLocks noGrp="1"/>
           </p:cNvSpPr>
@@ -1923,18 +1761,18 @@
           <a:bodyPr/>
           <a:lstStyle/>
           <a:p>
-            <a:fld id="{C1FF6DA9-008F-8B48-92A6-B652298478BF}" type="slidenum">
-              <a:rPr lang="en-US" smtClean="0"/>
-              <a:t>‹#›</a:t>
+            <a:fld id="{3117F2EE-F53C-4EC3-A699-49251ACBC68D}" type="slidenum">
+              <a:rPr lang="es-CO" smtClean="0"/>
+              <a:t>‹Nº›</a:t>
             </a:fld>
-            <a:endParaRPr lang="en-US"/>
+            <a:endParaRPr lang="es-CO"/>
           </a:p>
         </p:txBody>
       </p:sp>
     </p:spTree>
     <p:extLst>
       <p:ext uri="{BB962C8B-B14F-4D97-AF65-F5344CB8AC3E}">
-        <p14:creationId xmlns:p14="http://schemas.microsoft.com/office/powerpoint/2010/main" val="727027711"/>
+        <p14:creationId xmlns:p14="http://schemas.microsoft.com/office/powerpoint/2010/main" val="1658525457"/>
       </p:ext>
     </p:extLst>
   </p:cSld>
@@ -1946,7 +1784,7 @@
 
 <file path=ppt/slideLayouts/slideLayout7.xml><?xml version="1.0" encoding="utf-8"?>
 <p:sldLayout xmlns:a="http://schemas.openxmlformats.org/drawingml/2006/main" xmlns:r="http://schemas.openxmlformats.org/officeDocument/2006/relationships" xmlns:p="http://schemas.openxmlformats.org/presentationml/2006/main" type="blank" preserve="1">
-  <p:cSld name="Blank">
+  <p:cSld name="En blanco">
     <p:spTree>
       <p:nvGrpSpPr>
         <p:cNvPr id="1" name=""/>
@@ -1963,7 +1801,7 @@
       </p:grpSpPr>
       <p:sp>
         <p:nvSpPr>
-          <p:cNvPr id="2" name="Date Placeholder 1"/>
+          <p:cNvPr id="2" name="Marcador de fecha 1"/>
           <p:cNvSpPr>
             <a:spLocks noGrp="1"/>
           </p:cNvSpPr>
@@ -1976,17 +1814,17 @@
           <a:bodyPr/>
           <a:lstStyle/>
           <a:p>
-            <a:fld id="{5BCAD085-E8A6-8845-BD4E-CB4CCA059FC4}" type="datetimeFigureOut">
-              <a:rPr lang="en-US" smtClean="0"/>
-              <a:t>1/27/13</a:t>
+            <a:fld id="{3B2E3770-A23A-4173-BFB4-C5E21B224C77}" type="datetimeFigureOut">
+              <a:rPr lang="es-CO" smtClean="0"/>
+              <a:t>13/09/2021</a:t>
             </a:fld>
-            <a:endParaRPr lang="en-US"/>
-          </a:p>
-        </p:txBody>
-      </p:sp>
-      <p:sp>
-        <p:nvSpPr>
-          <p:cNvPr id="3" name="Footer Placeholder 2"/>
+            <a:endParaRPr lang="es-CO"/>
+          </a:p>
+        </p:txBody>
+      </p:sp>
+      <p:sp>
+        <p:nvSpPr>
+          <p:cNvPr id="3" name="Marcador de pie de página 2"/>
           <p:cNvSpPr>
             <a:spLocks noGrp="1"/>
           </p:cNvSpPr>
@@ -1999,13 +1837,13 @@
           <a:bodyPr/>
           <a:lstStyle/>
           <a:p>
-            <a:endParaRPr lang="en-US"/>
-          </a:p>
-        </p:txBody>
-      </p:sp>
-      <p:sp>
-        <p:nvSpPr>
-          <p:cNvPr id="4" name="Slide Number Placeholder 3"/>
+            <a:endParaRPr lang="es-CO"/>
+          </a:p>
+        </p:txBody>
+      </p:sp>
+      <p:sp>
+        <p:nvSpPr>
+          <p:cNvPr id="4" name="Marcador de número de diapositiva 3"/>
           <p:cNvSpPr>
             <a:spLocks noGrp="1"/>
           </p:cNvSpPr>
@@ -2018,18 +1856,18 @@
           <a:bodyPr/>
           <a:lstStyle/>
           <a:p>
-            <a:fld id="{C1FF6DA9-008F-8B48-92A6-B652298478BF}" type="slidenum">
-              <a:rPr lang="en-US" smtClean="0"/>
-              <a:t>‹#›</a:t>
+            <a:fld id="{3117F2EE-F53C-4EC3-A699-49251ACBC68D}" type="slidenum">
+              <a:rPr lang="es-CO" smtClean="0"/>
+              <a:t>‹Nº›</a:t>
             </a:fld>
-            <a:endParaRPr lang="en-US"/>
+            <a:endParaRPr lang="es-CO"/>
           </a:p>
         </p:txBody>
       </p:sp>
     </p:spTree>
     <p:extLst>
       <p:ext uri="{BB962C8B-B14F-4D97-AF65-F5344CB8AC3E}">
-        <p14:creationId xmlns:p14="http://schemas.microsoft.com/office/powerpoint/2010/main" val="1212999818"/>
+        <p14:creationId xmlns:p14="http://schemas.microsoft.com/office/powerpoint/2010/main" val="2911714796"/>
       </p:ext>
     </p:extLst>
   </p:cSld>
@@ -2041,7 +1879,7 @@
 
 <file path=ppt/slideLayouts/slideLayout8.xml><?xml version="1.0" encoding="utf-8"?>
 <p:sldLayout xmlns:a="http://schemas.openxmlformats.org/drawingml/2006/main" xmlns:r="http://schemas.openxmlformats.org/officeDocument/2006/relationships" xmlns:p="http://schemas.openxmlformats.org/presentationml/2006/main" type="objTx" preserve="1">
-  <p:cSld name="Content with Caption">
+  <p:cSld name="Contenido con título">
     <p:spTree>
       <p:nvGrpSpPr>
         <p:cNvPr id="1" name=""/>
@@ -2058,7 +1896,7 @@
       </p:grpSpPr>
       <p:sp>
         <p:nvSpPr>
-          <p:cNvPr id="2" name="Title 1"/>
+          <p:cNvPr id="2" name="Título 1"/>
           <p:cNvSpPr>
             <a:spLocks noGrp="1"/>
           </p:cNvSpPr>
@@ -2068,29 +1906,29 @@
         </p:nvSpPr>
         <p:spPr>
           <a:xfrm>
-            <a:off x="457200" y="273050"/>
-            <a:ext cx="3008313" cy="1162050"/>
+            <a:off x="472381" y="609600"/>
+            <a:ext cx="2211883" cy="2133600"/>
           </a:xfrm>
         </p:spPr>
         <p:txBody>
           <a:bodyPr anchor="b"/>
           <a:lstStyle>
-            <a:lvl1pPr algn="l">
-              <a:defRPr sz="2000" b="1"/>
+            <a:lvl1pPr>
+              <a:defRPr sz="1800"/>
             </a:lvl1pPr>
           </a:lstStyle>
           <a:p>
             <a:r>
-              <a:rPr lang="en-US" smtClean="0"/>
-              <a:t>Click to edit Master title style</a:t>
-            </a:r>
-            <a:endParaRPr lang="en-US"/>
-          </a:p>
-        </p:txBody>
-      </p:sp>
-      <p:sp>
-        <p:nvSpPr>
-          <p:cNvPr id="3" name="Content Placeholder 2"/>
+              <a:rPr lang="es-ES" smtClean="0"/>
+              <a:t>Haga clic para modificar el estilo de título del patrón</a:t>
+            </a:r>
+            <a:endParaRPr lang="es-CO"/>
+          </a:p>
+        </p:txBody>
+      </p:sp>
+      <p:sp>
+        <p:nvSpPr>
+          <p:cNvPr id="3" name="Marcador de contenido 2"/>
           <p:cNvSpPr>
             <a:spLocks noGrp="1"/>
           </p:cNvSpPr>
@@ -2100,82 +1938,82 @@
         </p:nvSpPr>
         <p:spPr>
           <a:xfrm>
-            <a:off x="3575050" y="273050"/>
-            <a:ext cx="5111750" cy="5853113"/>
+            <a:off x="2915543" y="1316567"/>
+            <a:ext cx="3471863" cy="6498167"/>
           </a:xfrm>
         </p:spPr>
         <p:txBody>
           <a:bodyPr/>
           <a:lstStyle>
             <a:lvl1pPr>
-              <a:defRPr sz="3200"/>
+              <a:defRPr sz="1800"/>
             </a:lvl1pPr>
             <a:lvl2pPr>
-              <a:defRPr sz="2800"/>
+              <a:defRPr sz="1575"/>
             </a:lvl2pPr>
             <a:lvl3pPr>
-              <a:defRPr sz="2400"/>
+              <a:defRPr sz="1350"/>
             </a:lvl3pPr>
             <a:lvl4pPr>
-              <a:defRPr sz="2000"/>
+              <a:defRPr sz="1125"/>
             </a:lvl4pPr>
             <a:lvl5pPr>
-              <a:defRPr sz="2000"/>
+              <a:defRPr sz="1125"/>
             </a:lvl5pPr>
             <a:lvl6pPr>
-              <a:defRPr sz="2000"/>
+              <a:defRPr sz="1125"/>
             </a:lvl6pPr>
             <a:lvl7pPr>
-              <a:defRPr sz="2000"/>
+              <a:defRPr sz="1125"/>
             </a:lvl7pPr>
             <a:lvl8pPr>
-              <a:defRPr sz="2000"/>
+              <a:defRPr sz="1125"/>
             </a:lvl8pPr>
             <a:lvl9pPr>
-              <a:defRPr sz="2000"/>
+              <a:defRPr sz="1125"/>
             </a:lvl9pPr>
           </a:lstStyle>
           <a:p>
             <a:pPr lvl="0"/>
             <a:r>
-              <a:rPr lang="en-US" smtClean="0"/>
-              <a:t>Click to edit Master text styles</a:t>
+              <a:rPr lang="es-ES" smtClean="0"/>
+              <a:t>Haga clic para modificar el estilo de texto del patrón</a:t>
             </a:r>
           </a:p>
           <a:p>
             <a:pPr lvl="1"/>
             <a:r>
-              <a:rPr lang="en-US" smtClean="0"/>
-              <a:t>Second level</a:t>
+              <a:rPr lang="es-ES" smtClean="0"/>
+              <a:t>Segundo nivel</a:t>
             </a:r>
           </a:p>
           <a:p>
             <a:pPr lvl="2"/>
             <a:r>
-              <a:rPr lang="en-US" smtClean="0"/>
-              <a:t>Third level</a:t>
+              <a:rPr lang="es-ES" smtClean="0"/>
+              <a:t>Tercer nivel</a:t>
             </a:r>
           </a:p>
           <a:p>
             <a:pPr lvl="3"/>
             <a:r>
-              <a:rPr lang="en-US" smtClean="0"/>
-              <a:t>Fourth level</a:t>
+              <a:rPr lang="es-ES" smtClean="0"/>
+              <a:t>Cuarto nivel</a:t>
             </a:r>
           </a:p>
           <a:p>
             <a:pPr lvl="4"/>
             <a:r>
-              <a:rPr lang="en-US" smtClean="0"/>
-              <a:t>Fifth level</a:t>
-            </a:r>
-            <a:endParaRPr lang="en-US"/>
-          </a:p>
-        </p:txBody>
-      </p:sp>
-      <p:sp>
-        <p:nvSpPr>
-          <p:cNvPr id="4" name="Text Placeholder 3"/>
+              <a:rPr lang="es-ES" smtClean="0"/>
+              <a:t>Quinto nivel</a:t>
+            </a:r>
+            <a:endParaRPr lang="es-CO"/>
+          </a:p>
+        </p:txBody>
+      </p:sp>
+      <p:sp>
+        <p:nvSpPr>
+          <p:cNvPr id="4" name="Marcador de texto 3"/>
           <p:cNvSpPr>
             <a:spLocks noGrp="1"/>
           </p:cNvSpPr>
@@ -2185,8 +2023,8 @@
         </p:nvSpPr>
         <p:spPr>
           <a:xfrm>
-            <a:off x="457200" y="1435100"/>
-            <a:ext cx="3008313" cy="4691063"/>
+            <a:off x="472381" y="2743200"/>
+            <a:ext cx="2211883" cy="5082117"/>
           </a:xfrm>
         </p:spPr>
         <p:txBody>
@@ -2194,53 +2032,53 @@
           <a:lstStyle>
             <a:lvl1pPr marL="0" indent="0">
               <a:buNone/>
-              <a:defRPr sz="1400"/>
+              <a:defRPr sz="900"/>
             </a:lvl1pPr>
-            <a:lvl2pPr marL="457200" indent="0">
-              <a:buNone/>
-              <a:defRPr sz="1200"/>
+            <a:lvl2pPr marL="257175" indent="0">
+              <a:buNone/>
+              <a:defRPr sz="788"/>
             </a:lvl2pPr>
-            <a:lvl3pPr marL="914400" indent="0">
-              <a:buNone/>
-              <a:defRPr sz="1000"/>
+            <a:lvl3pPr marL="514350" indent="0">
+              <a:buNone/>
+              <a:defRPr sz="675"/>
             </a:lvl3pPr>
-            <a:lvl4pPr marL="1371600" indent="0">
-              <a:buNone/>
-              <a:defRPr sz="900"/>
+            <a:lvl4pPr marL="771525" indent="0">
+              <a:buNone/>
+              <a:defRPr sz="563"/>
             </a:lvl4pPr>
-            <a:lvl5pPr marL="1828800" indent="0">
-              <a:buNone/>
-              <a:defRPr sz="900"/>
+            <a:lvl5pPr marL="1028700" indent="0">
+              <a:buNone/>
+              <a:defRPr sz="563"/>
             </a:lvl5pPr>
-            <a:lvl6pPr marL="2286000" indent="0">
-              <a:buNone/>
-              <a:defRPr sz="900"/>
+            <a:lvl6pPr marL="1285875" indent="0">
+              <a:buNone/>
+              <a:defRPr sz="563"/>
             </a:lvl6pPr>
-            <a:lvl7pPr marL="2743200" indent="0">
-              <a:buNone/>
-              <a:defRPr sz="900"/>
+            <a:lvl7pPr marL="1543050" indent="0">
+              <a:buNone/>
+              <a:defRPr sz="563"/>
             </a:lvl7pPr>
-            <a:lvl8pPr marL="3200400" indent="0">
-              <a:buNone/>
-              <a:defRPr sz="900"/>
+            <a:lvl8pPr marL="1800225" indent="0">
+              <a:buNone/>
+              <a:defRPr sz="563"/>
             </a:lvl8pPr>
-            <a:lvl9pPr marL="3657600" indent="0">
-              <a:buNone/>
-              <a:defRPr sz="900"/>
+            <a:lvl9pPr marL="2057400" indent="0">
+              <a:buNone/>
+              <a:defRPr sz="563"/>
             </a:lvl9pPr>
           </a:lstStyle>
           <a:p>
             <a:pPr lvl="0"/>
             <a:r>
-              <a:rPr lang="en-US" smtClean="0"/>
-              <a:t>Click to edit Master text styles</a:t>
-            </a:r>
-          </a:p>
-        </p:txBody>
-      </p:sp>
-      <p:sp>
-        <p:nvSpPr>
-          <p:cNvPr id="5" name="Date Placeholder 4"/>
+              <a:rPr lang="es-ES" smtClean="0"/>
+              <a:t>Haga clic para modificar el estilo de texto del patrón</a:t>
+            </a:r>
+          </a:p>
+        </p:txBody>
+      </p:sp>
+      <p:sp>
+        <p:nvSpPr>
+          <p:cNvPr id="5" name="Marcador de fecha 4"/>
           <p:cNvSpPr>
             <a:spLocks noGrp="1"/>
           </p:cNvSpPr>
@@ -2253,17 +2091,17 @@
           <a:bodyPr/>
           <a:lstStyle/>
           <a:p>
-            <a:fld id="{5BCAD085-E8A6-8845-BD4E-CB4CCA059FC4}" type="datetimeFigureOut">
-              <a:rPr lang="en-US" smtClean="0"/>
-              <a:t>1/27/13</a:t>
+            <a:fld id="{3B2E3770-A23A-4173-BFB4-C5E21B224C77}" type="datetimeFigureOut">
+              <a:rPr lang="es-CO" smtClean="0"/>
+              <a:t>13/09/2021</a:t>
             </a:fld>
-            <a:endParaRPr lang="en-US"/>
-          </a:p>
-        </p:txBody>
-      </p:sp>
-      <p:sp>
-        <p:nvSpPr>
-          <p:cNvPr id="6" name="Footer Placeholder 5"/>
+            <a:endParaRPr lang="es-CO"/>
+          </a:p>
+        </p:txBody>
+      </p:sp>
+      <p:sp>
+        <p:nvSpPr>
+          <p:cNvPr id="6" name="Marcador de pie de página 5"/>
           <p:cNvSpPr>
             <a:spLocks noGrp="1"/>
           </p:cNvSpPr>
@@ -2276,13 +2114,13 @@
           <a:bodyPr/>
           <a:lstStyle/>
           <a:p>
-            <a:endParaRPr lang="en-US"/>
-          </a:p>
-        </p:txBody>
-      </p:sp>
-      <p:sp>
-        <p:nvSpPr>
-          <p:cNvPr id="7" name="Slide Number Placeholder 6"/>
+            <a:endParaRPr lang="es-CO"/>
+          </a:p>
+        </p:txBody>
+      </p:sp>
+      <p:sp>
+        <p:nvSpPr>
+          <p:cNvPr id="7" name="Marcador de número de diapositiva 6"/>
           <p:cNvSpPr>
             <a:spLocks noGrp="1"/>
           </p:cNvSpPr>
@@ -2295,18 +2133,18 @@
           <a:bodyPr/>
           <a:lstStyle/>
           <a:p>
-            <a:fld id="{C1FF6DA9-008F-8B48-92A6-B652298478BF}" type="slidenum">
-              <a:rPr lang="en-US" smtClean="0"/>
-              <a:t>‹#›</a:t>
+            <a:fld id="{3117F2EE-F53C-4EC3-A699-49251ACBC68D}" type="slidenum">
+              <a:rPr lang="es-CO" smtClean="0"/>
+              <a:t>‹Nº›</a:t>
             </a:fld>
-            <a:endParaRPr lang="en-US"/>
+            <a:endParaRPr lang="es-CO"/>
           </a:p>
         </p:txBody>
       </p:sp>
     </p:spTree>
     <p:extLst>
       <p:ext uri="{BB962C8B-B14F-4D97-AF65-F5344CB8AC3E}">
-        <p14:creationId xmlns:p14="http://schemas.microsoft.com/office/powerpoint/2010/main" val="1840726560"/>
+        <p14:creationId xmlns:p14="http://schemas.microsoft.com/office/powerpoint/2010/main" val="2599017810"/>
       </p:ext>
     </p:extLst>
   </p:cSld>
@@ -2318,7 +2156,7 @@
 
 <file path=ppt/slideLayouts/slideLayout9.xml><?xml version="1.0" encoding="utf-8"?>
 <p:sldLayout xmlns:a="http://schemas.openxmlformats.org/drawingml/2006/main" xmlns:r="http://schemas.openxmlformats.org/officeDocument/2006/relationships" xmlns:p="http://schemas.openxmlformats.org/presentationml/2006/main" type="picTx" preserve="1">
-  <p:cSld name="Picture with Caption">
+  <p:cSld name="Imagen con título">
     <p:spTree>
       <p:nvGrpSpPr>
         <p:cNvPr id="1" name=""/>
@@ -2335,7 +2173,7 @@
       </p:grpSpPr>
       <p:sp>
         <p:nvSpPr>
-          <p:cNvPr id="2" name="Title 1"/>
+          <p:cNvPr id="2" name="Título 1"/>
           <p:cNvSpPr>
             <a:spLocks noGrp="1"/>
           </p:cNvSpPr>
@@ -2345,29 +2183,29 @@
         </p:nvSpPr>
         <p:spPr>
           <a:xfrm>
-            <a:off x="1792288" y="4800600"/>
-            <a:ext cx="5486400" cy="566738"/>
+            <a:off x="472381" y="609600"/>
+            <a:ext cx="2211883" cy="2133600"/>
           </a:xfrm>
         </p:spPr>
         <p:txBody>
           <a:bodyPr anchor="b"/>
           <a:lstStyle>
-            <a:lvl1pPr algn="l">
-              <a:defRPr sz="2000" b="1"/>
+            <a:lvl1pPr>
+              <a:defRPr sz="1800"/>
             </a:lvl1pPr>
           </a:lstStyle>
           <a:p>
             <a:r>
-              <a:rPr lang="en-US" smtClean="0"/>
-              <a:t>Click to edit Master title style</a:t>
-            </a:r>
-            <a:endParaRPr lang="en-US"/>
-          </a:p>
-        </p:txBody>
-      </p:sp>
-      <p:sp>
-        <p:nvSpPr>
-          <p:cNvPr id="3" name="Picture Placeholder 2"/>
+              <a:rPr lang="es-ES" smtClean="0"/>
+              <a:t>Haga clic para modificar el estilo de título del patrón</a:t>
+            </a:r>
+            <a:endParaRPr lang="es-CO"/>
+          </a:p>
+        </p:txBody>
+      </p:sp>
+      <p:sp>
+        <p:nvSpPr>
+          <p:cNvPr id="3" name="Marcador de posición de imagen 2"/>
           <p:cNvSpPr>
             <a:spLocks noGrp="1"/>
           </p:cNvSpPr>
@@ -2377,8 +2215,8 @@
         </p:nvSpPr>
         <p:spPr>
           <a:xfrm>
-            <a:off x="1792288" y="612775"/>
-            <a:ext cx="5486400" cy="4114800"/>
+            <a:off x="2915543" y="1316567"/>
+            <a:ext cx="3471863" cy="6498167"/>
           </a:xfrm>
         </p:spPr>
         <p:txBody>
@@ -2386,49 +2224,49 @@
           <a:lstStyle>
             <a:lvl1pPr marL="0" indent="0">
               <a:buNone/>
-              <a:defRPr sz="3200"/>
+              <a:defRPr sz="1800"/>
             </a:lvl1pPr>
-            <a:lvl2pPr marL="457200" indent="0">
-              <a:buNone/>
-              <a:defRPr sz="2800"/>
+            <a:lvl2pPr marL="257175" indent="0">
+              <a:buNone/>
+              <a:defRPr sz="1575"/>
             </a:lvl2pPr>
-            <a:lvl3pPr marL="914400" indent="0">
-              <a:buNone/>
-              <a:defRPr sz="2400"/>
+            <a:lvl3pPr marL="514350" indent="0">
+              <a:buNone/>
+              <a:defRPr sz="1350"/>
             </a:lvl3pPr>
-            <a:lvl4pPr marL="1371600" indent="0">
-              <a:buNone/>
-              <a:defRPr sz="2000"/>
+            <a:lvl4pPr marL="771525" indent="0">
+              <a:buNone/>
+              <a:defRPr sz="1125"/>
             </a:lvl4pPr>
-            <a:lvl5pPr marL="1828800" indent="0">
-              <a:buNone/>
-              <a:defRPr sz="2000"/>
+            <a:lvl5pPr marL="1028700" indent="0">
+              <a:buNone/>
+              <a:defRPr sz="1125"/>
             </a:lvl5pPr>
-            <a:lvl6pPr marL="2286000" indent="0">
-              <a:buNone/>
-              <a:defRPr sz="2000"/>
+            <a:lvl6pPr marL="1285875" indent="0">
+              <a:buNone/>
+              <a:defRPr sz="1125"/>
             </a:lvl6pPr>
-            <a:lvl7pPr marL="2743200" indent="0">
-              <a:buNone/>
-              <a:defRPr sz="2000"/>
+            <a:lvl7pPr marL="1543050" indent="0">
+              <a:buNone/>
+              <a:defRPr sz="1125"/>
             </a:lvl7pPr>
-            <a:lvl8pPr marL="3200400" indent="0">
-              <a:buNone/>
-              <a:defRPr sz="2000"/>
+            <a:lvl8pPr marL="1800225" indent="0">
+              <a:buNone/>
+              <a:defRPr sz="1125"/>
             </a:lvl8pPr>
-            <a:lvl9pPr marL="3657600" indent="0">
-              <a:buNone/>
-              <a:defRPr sz="2000"/>
+            <a:lvl9pPr marL="2057400" indent="0">
+              <a:buNone/>
+              <a:defRPr sz="1125"/>
             </a:lvl9pPr>
           </a:lstStyle>
           <a:p>
-            <a:endParaRPr lang="en-US"/>
-          </a:p>
-        </p:txBody>
-      </p:sp>
-      <p:sp>
-        <p:nvSpPr>
-          <p:cNvPr id="4" name="Text Placeholder 3"/>
+            <a:endParaRPr lang="es-CO"/>
+          </a:p>
+        </p:txBody>
+      </p:sp>
+      <p:sp>
+        <p:nvSpPr>
+          <p:cNvPr id="4" name="Marcador de texto 3"/>
           <p:cNvSpPr>
             <a:spLocks noGrp="1"/>
           </p:cNvSpPr>
@@ -2438,8 +2276,8 @@
         </p:nvSpPr>
         <p:spPr>
           <a:xfrm>
-            <a:off x="1792288" y="5367338"/>
-            <a:ext cx="5486400" cy="804862"/>
+            <a:off x="472381" y="2743200"/>
+            <a:ext cx="2211883" cy="5082117"/>
           </a:xfrm>
         </p:spPr>
         <p:txBody>
@@ -2447,53 +2285,53 @@
           <a:lstStyle>
             <a:lvl1pPr marL="0" indent="0">
               <a:buNone/>
-              <a:defRPr sz="1400"/>
+              <a:defRPr sz="900"/>
             </a:lvl1pPr>
-            <a:lvl2pPr marL="457200" indent="0">
-              <a:buNone/>
-              <a:defRPr sz="1200"/>
+            <a:lvl2pPr marL="257175" indent="0">
+              <a:buNone/>
+              <a:defRPr sz="788"/>
             </a:lvl2pPr>
-            <a:lvl3pPr marL="914400" indent="0">
-              <a:buNone/>
-              <a:defRPr sz="1000"/>
+            <a:lvl3pPr marL="514350" indent="0">
+              <a:buNone/>
+              <a:defRPr sz="675"/>
             </a:lvl3pPr>
-            <a:lvl4pPr marL="1371600" indent="0">
-              <a:buNone/>
-              <a:defRPr sz="900"/>
+            <a:lvl4pPr marL="771525" indent="0">
+              <a:buNone/>
+              <a:defRPr sz="563"/>
             </a:lvl4pPr>
-            <a:lvl5pPr marL="1828800" indent="0">
-              <a:buNone/>
-              <a:defRPr sz="900"/>
+            <a:lvl5pPr marL="1028700" indent="0">
+              <a:buNone/>
+              <a:defRPr sz="563"/>
             </a:lvl5pPr>
-            <a:lvl6pPr marL="2286000" indent="0">
-              <a:buNone/>
-              <a:defRPr sz="900"/>
+            <a:lvl6pPr marL="1285875" indent="0">
+              <a:buNone/>
+              <a:defRPr sz="563"/>
             </a:lvl6pPr>
-            <a:lvl7pPr marL="2743200" indent="0">
-              <a:buNone/>
-              <a:defRPr sz="900"/>
+            <a:lvl7pPr marL="1543050" indent="0">
+              <a:buNone/>
+              <a:defRPr sz="563"/>
             </a:lvl7pPr>
-            <a:lvl8pPr marL="3200400" indent="0">
-              <a:buNone/>
-              <a:defRPr sz="900"/>
+            <a:lvl8pPr marL="1800225" indent="0">
+              <a:buNone/>
+              <a:defRPr sz="563"/>
             </a:lvl8pPr>
-            <a:lvl9pPr marL="3657600" indent="0">
-              <a:buNone/>
-              <a:defRPr sz="900"/>
+            <a:lvl9pPr marL="2057400" indent="0">
+              <a:buNone/>
+              <a:defRPr sz="563"/>
             </a:lvl9pPr>
           </a:lstStyle>
           <a:p>
             <a:pPr lvl="0"/>
             <a:r>
-              <a:rPr lang="en-US" smtClean="0"/>
-              <a:t>Click to edit Master text styles</a:t>
-            </a:r>
-          </a:p>
-        </p:txBody>
-      </p:sp>
-      <p:sp>
-        <p:nvSpPr>
-          <p:cNvPr id="5" name="Date Placeholder 4"/>
+              <a:rPr lang="es-ES" smtClean="0"/>
+              <a:t>Haga clic para modificar el estilo de texto del patrón</a:t>
+            </a:r>
+          </a:p>
+        </p:txBody>
+      </p:sp>
+      <p:sp>
+        <p:nvSpPr>
+          <p:cNvPr id="5" name="Marcador de fecha 4"/>
           <p:cNvSpPr>
             <a:spLocks noGrp="1"/>
           </p:cNvSpPr>
@@ -2506,17 +2344,17 @@
           <a:bodyPr/>
           <a:lstStyle/>
           <a:p>
-            <a:fld id="{5BCAD085-E8A6-8845-BD4E-CB4CCA059FC4}" type="datetimeFigureOut">
-              <a:rPr lang="en-US" smtClean="0"/>
-              <a:t>1/27/13</a:t>
+            <a:fld id="{3B2E3770-A23A-4173-BFB4-C5E21B224C77}" type="datetimeFigureOut">
+              <a:rPr lang="es-CO" smtClean="0"/>
+              <a:t>13/09/2021</a:t>
             </a:fld>
-            <a:endParaRPr lang="en-US"/>
-          </a:p>
-        </p:txBody>
-      </p:sp>
-      <p:sp>
-        <p:nvSpPr>
-          <p:cNvPr id="6" name="Footer Placeholder 5"/>
+            <a:endParaRPr lang="es-CO"/>
+          </a:p>
+        </p:txBody>
+      </p:sp>
+      <p:sp>
+        <p:nvSpPr>
+          <p:cNvPr id="6" name="Marcador de pie de página 5"/>
           <p:cNvSpPr>
             <a:spLocks noGrp="1"/>
           </p:cNvSpPr>
@@ -2529,13 +2367,13 @@
           <a:bodyPr/>
           <a:lstStyle/>
           <a:p>
-            <a:endParaRPr lang="en-US"/>
-          </a:p>
-        </p:txBody>
-      </p:sp>
-      <p:sp>
-        <p:nvSpPr>
-          <p:cNvPr id="7" name="Slide Number Placeholder 6"/>
+            <a:endParaRPr lang="es-CO"/>
+          </a:p>
+        </p:txBody>
+      </p:sp>
+      <p:sp>
+        <p:nvSpPr>
+          <p:cNvPr id="7" name="Marcador de número de diapositiva 6"/>
           <p:cNvSpPr>
             <a:spLocks noGrp="1"/>
           </p:cNvSpPr>
@@ -2548,18 +2386,18 @@
           <a:bodyPr/>
           <a:lstStyle/>
           <a:p>
-            <a:fld id="{C1FF6DA9-008F-8B48-92A6-B652298478BF}" type="slidenum">
-              <a:rPr lang="en-US" smtClean="0"/>
-              <a:t>‹#›</a:t>
+            <a:fld id="{3117F2EE-F53C-4EC3-A699-49251ACBC68D}" type="slidenum">
+              <a:rPr lang="es-CO" smtClean="0"/>
+              <a:t>‹Nº›</a:t>
             </a:fld>
-            <a:endParaRPr lang="en-US"/>
+            <a:endParaRPr lang="es-CO"/>
           </a:p>
         </p:txBody>
       </p:sp>
     </p:spTree>
     <p:extLst>
       <p:ext uri="{BB962C8B-B14F-4D97-AF65-F5344CB8AC3E}">
-        <p14:creationId xmlns:p14="http://schemas.microsoft.com/office/powerpoint/2010/main" val="3889236939"/>
+        <p14:creationId xmlns:p14="http://schemas.microsoft.com/office/powerpoint/2010/main" val="3827576755"/>
       </p:ext>
     </p:extLst>
   </p:cSld>
@@ -2593,7 +2431,7 @@
       </p:grpSpPr>
       <p:sp>
         <p:nvSpPr>
-          <p:cNvPr id="2" name="Title Placeholder 1"/>
+          <p:cNvPr id="2" name="Marcador de título 1"/>
           <p:cNvSpPr>
             <a:spLocks noGrp="1"/>
           </p:cNvSpPr>
@@ -2603,8 +2441,8 @@
         </p:nvSpPr>
         <p:spPr>
           <a:xfrm>
-            <a:off x="457200" y="274638"/>
-            <a:ext cx="8229600" cy="1143000"/>
+            <a:off x="471488" y="486834"/>
+            <a:ext cx="5915025" cy="1767417"/>
           </a:xfrm>
           <a:prstGeom prst="rect">
             <a:avLst/>
@@ -2617,16 +2455,16 @@
           <a:lstStyle/>
           <a:p>
             <a:r>
-              <a:rPr lang="en-US" smtClean="0"/>
-              <a:t>Click to edit Master title style</a:t>
-            </a:r>
-            <a:endParaRPr lang="en-US"/>
-          </a:p>
-        </p:txBody>
-      </p:sp>
-      <p:sp>
-        <p:nvSpPr>
-          <p:cNvPr id="3" name="Text Placeholder 2"/>
+              <a:rPr lang="es-ES" smtClean="0"/>
+              <a:t>Haga clic para modificar el estilo de título del patrón</a:t>
+            </a:r>
+            <a:endParaRPr lang="es-CO"/>
+          </a:p>
+        </p:txBody>
+      </p:sp>
+      <p:sp>
+        <p:nvSpPr>
+          <p:cNvPr id="3" name="Marcador de texto 2"/>
           <p:cNvSpPr>
             <a:spLocks noGrp="1"/>
           </p:cNvSpPr>
@@ -2636,8 +2474,8 @@
         </p:nvSpPr>
         <p:spPr>
           <a:xfrm>
-            <a:off x="457200" y="1600200"/>
-            <a:ext cx="8229600" cy="4525963"/>
+            <a:off x="471488" y="2434167"/>
+            <a:ext cx="5915025" cy="5801784"/>
           </a:xfrm>
           <a:prstGeom prst="rect">
             <a:avLst/>
@@ -2651,44 +2489,44 @@
           <a:p>
             <a:pPr lvl="0"/>
             <a:r>
-              <a:rPr lang="en-US" smtClean="0"/>
-              <a:t>Click to edit Master text styles</a:t>
+              <a:rPr lang="es-ES" smtClean="0"/>
+              <a:t>Haga clic para modificar el estilo de texto del patrón</a:t>
             </a:r>
           </a:p>
           <a:p>
             <a:pPr lvl="1"/>
             <a:r>
-              <a:rPr lang="en-US" smtClean="0"/>
-              <a:t>Second level</a:t>
+              <a:rPr lang="es-ES" smtClean="0"/>
+              <a:t>Segundo nivel</a:t>
             </a:r>
           </a:p>
           <a:p>
             <a:pPr lvl="2"/>
             <a:r>
-              <a:rPr lang="en-US" smtClean="0"/>
-              <a:t>Third level</a:t>
+              <a:rPr lang="es-ES" smtClean="0"/>
+              <a:t>Tercer nivel</a:t>
             </a:r>
           </a:p>
           <a:p>
             <a:pPr lvl="3"/>
             <a:r>
-              <a:rPr lang="en-US" smtClean="0"/>
-              <a:t>Fourth level</a:t>
+              <a:rPr lang="es-ES" smtClean="0"/>
+              <a:t>Cuarto nivel</a:t>
             </a:r>
           </a:p>
           <a:p>
             <a:pPr lvl="4"/>
             <a:r>
-              <a:rPr lang="en-US" smtClean="0"/>
-              <a:t>Fifth level</a:t>
-            </a:r>
-            <a:endParaRPr lang="en-US"/>
-          </a:p>
-        </p:txBody>
-      </p:sp>
-      <p:sp>
-        <p:nvSpPr>
-          <p:cNvPr id="4" name="Date Placeholder 3"/>
+              <a:rPr lang="es-ES" smtClean="0"/>
+              <a:t>Quinto nivel</a:t>
+            </a:r>
+            <a:endParaRPr lang="es-CO"/>
+          </a:p>
+        </p:txBody>
+      </p:sp>
+      <p:sp>
+        <p:nvSpPr>
+          <p:cNvPr id="4" name="Marcador de fecha 3"/>
           <p:cNvSpPr>
             <a:spLocks noGrp="1"/>
           </p:cNvSpPr>
@@ -2698,8 +2536,8 @@
         </p:nvSpPr>
         <p:spPr>
           <a:xfrm>
-            <a:off x="457200" y="6356350"/>
-            <a:ext cx="2133600" cy="365125"/>
+            <a:off x="471488" y="8475134"/>
+            <a:ext cx="1543050" cy="486833"/>
           </a:xfrm>
           <a:prstGeom prst="rect">
             <a:avLst/>
@@ -2709,7 +2547,7 @@
           <a:bodyPr vert="horz" lIns="91440" tIns="45720" rIns="91440" bIns="45720" rtlCol="0" anchor="ctr"/>
           <a:lstStyle>
             <a:lvl1pPr algn="l">
-              <a:defRPr sz="1200">
+              <a:defRPr sz="675">
                 <a:solidFill>
                   <a:schemeClr val="tx1">
                     <a:tint val="75000"/>
@@ -2719,17 +2557,17 @@
             </a:lvl1pPr>
           </a:lstStyle>
           <a:p>
-            <a:fld id="{5BCAD085-E8A6-8845-BD4E-CB4CCA059FC4}" type="datetimeFigureOut">
-              <a:rPr lang="en-US" smtClean="0"/>
-              <a:t>1/27/13</a:t>
+            <a:fld id="{3B2E3770-A23A-4173-BFB4-C5E21B224C77}" type="datetimeFigureOut">
+              <a:rPr lang="es-CO" smtClean="0"/>
+              <a:t>13/09/2021</a:t>
             </a:fld>
-            <a:endParaRPr lang="en-US"/>
-          </a:p>
-        </p:txBody>
-      </p:sp>
-      <p:sp>
-        <p:nvSpPr>
-          <p:cNvPr id="5" name="Footer Placeholder 4"/>
+            <a:endParaRPr lang="es-CO"/>
+          </a:p>
+        </p:txBody>
+      </p:sp>
+      <p:sp>
+        <p:nvSpPr>
+          <p:cNvPr id="5" name="Marcador de pie de página 4"/>
           <p:cNvSpPr>
             <a:spLocks noGrp="1"/>
           </p:cNvSpPr>
@@ -2739,8 +2577,8 @@
         </p:nvSpPr>
         <p:spPr>
           <a:xfrm>
-            <a:off x="3124200" y="6356350"/>
-            <a:ext cx="2895600" cy="365125"/>
+            <a:off x="2271713" y="8475134"/>
+            <a:ext cx="2314575" cy="486833"/>
           </a:xfrm>
           <a:prstGeom prst="rect">
             <a:avLst/>
@@ -2750,7 +2588,7 @@
           <a:bodyPr vert="horz" lIns="91440" tIns="45720" rIns="91440" bIns="45720" rtlCol="0" anchor="ctr"/>
           <a:lstStyle>
             <a:lvl1pPr algn="ctr">
-              <a:defRPr sz="1200">
+              <a:defRPr sz="675">
                 <a:solidFill>
                   <a:schemeClr val="tx1">
                     <a:tint val="75000"/>
@@ -2760,13 +2598,13 @@
             </a:lvl1pPr>
           </a:lstStyle>
           <a:p>
-            <a:endParaRPr lang="en-US"/>
-          </a:p>
-        </p:txBody>
-      </p:sp>
-      <p:sp>
-        <p:nvSpPr>
-          <p:cNvPr id="6" name="Slide Number Placeholder 5"/>
+            <a:endParaRPr lang="es-CO"/>
+          </a:p>
+        </p:txBody>
+      </p:sp>
+      <p:sp>
+        <p:nvSpPr>
+          <p:cNvPr id="6" name="Marcador de número de diapositiva 5"/>
           <p:cNvSpPr>
             <a:spLocks noGrp="1"/>
           </p:cNvSpPr>
@@ -2776,8 +2614,8 @@
         </p:nvSpPr>
         <p:spPr>
           <a:xfrm>
-            <a:off x="6553200" y="6356350"/>
-            <a:ext cx="2133600" cy="365125"/>
+            <a:off x="4843463" y="8475134"/>
+            <a:ext cx="1543050" cy="486833"/>
           </a:xfrm>
           <a:prstGeom prst="rect">
             <a:avLst/>
@@ -2787,7 +2625,7 @@
           <a:bodyPr vert="horz" lIns="91440" tIns="45720" rIns="91440" bIns="45720" rtlCol="0" anchor="ctr"/>
           <a:lstStyle>
             <a:lvl1pPr algn="r">
-              <a:defRPr sz="1200">
+              <a:defRPr sz="675">
                 <a:solidFill>
                   <a:schemeClr val="tx1">
                     <a:tint val="75000"/>
@@ -2797,18 +2635,18 @@
             </a:lvl1pPr>
           </a:lstStyle>
           <a:p>
-            <a:fld id="{C1FF6DA9-008F-8B48-92A6-B652298478BF}" type="slidenum">
-              <a:rPr lang="en-US" smtClean="0"/>
-              <a:t>‹#›</a:t>
+            <a:fld id="{3117F2EE-F53C-4EC3-A699-49251ACBC68D}" type="slidenum">
+              <a:rPr lang="es-CO" smtClean="0"/>
+              <a:t>‹Nº›</a:t>
             </a:fld>
-            <a:endParaRPr lang="en-US"/>
+            <a:endParaRPr lang="es-CO"/>
           </a:p>
         </p:txBody>
       </p:sp>
     </p:spTree>
     <p:extLst>
       <p:ext uri="{BB962C8B-B14F-4D97-AF65-F5344CB8AC3E}">
-        <p14:creationId xmlns:p14="http://schemas.microsoft.com/office/powerpoint/2010/main" val="2209977519"/>
+        <p14:creationId xmlns:p14="http://schemas.microsoft.com/office/powerpoint/2010/main" val="851172788"/>
       </p:ext>
     </p:extLst>
   </p:cSld>
@@ -2828,12 +2666,15 @@
   </p:sldLayoutIdLst>
   <p:txStyles>
     <p:titleStyle>
-      <a:lvl1pPr algn="ctr" defTabSz="457200" rtl="0" eaLnBrk="1" latinLnBrk="0" hangingPunct="1">
+      <a:lvl1pPr algn="l" defTabSz="514350" rtl="0" eaLnBrk="1" latinLnBrk="0" hangingPunct="1">
+        <a:lnSpc>
+          <a:spcPct val="90000"/>
+        </a:lnSpc>
         <a:spcBef>
           <a:spcPct val="0"/>
         </a:spcBef>
         <a:buNone/>
-        <a:defRPr sz="4400" kern="1200">
+        <a:defRPr sz="2475" kern="1200">
           <a:solidFill>
             <a:schemeClr val="tx1"/>
           </a:solidFill>
@@ -2844,13 +2685,16 @@
       </a:lvl1pPr>
     </p:titleStyle>
     <p:bodyStyle>
-      <a:lvl1pPr marL="342900" indent="-342900" algn="l" defTabSz="457200" rtl="0" eaLnBrk="1" latinLnBrk="0" hangingPunct="1">
+      <a:lvl1pPr marL="128588" indent="-128588" algn="l" defTabSz="514350" rtl="0" eaLnBrk="1" latinLnBrk="0" hangingPunct="1">
+        <a:lnSpc>
+          <a:spcPct val="90000"/>
+        </a:lnSpc>
         <a:spcBef>
-          <a:spcPct val="20000"/>
+          <a:spcPts val="563"/>
         </a:spcBef>
-        <a:buFont typeface="Arial"/>
+        <a:buFont typeface="Arial" panose="020B0604020202020204" pitchFamily="34" charset="0"/>
         <a:buChar char="•"/>
-        <a:defRPr sz="3200" kern="1200">
+        <a:defRPr sz="1575" kern="1200">
           <a:solidFill>
             <a:schemeClr val="tx1"/>
           </a:solidFill>
@@ -2859,13 +2703,16 @@
           <a:cs typeface="+mn-cs"/>
         </a:defRPr>
       </a:lvl1pPr>
-      <a:lvl2pPr marL="742950" indent="-285750" algn="l" defTabSz="457200" rtl="0" eaLnBrk="1" latinLnBrk="0" hangingPunct="1">
+      <a:lvl2pPr marL="385763" indent="-128588" algn="l" defTabSz="514350" rtl="0" eaLnBrk="1" latinLnBrk="0" hangingPunct="1">
+        <a:lnSpc>
+          <a:spcPct val="90000"/>
+        </a:lnSpc>
         <a:spcBef>
-          <a:spcPct val="20000"/>
+          <a:spcPts val="281"/>
         </a:spcBef>
-        <a:buFont typeface="Arial"/>
-        <a:buChar char="–"/>
-        <a:defRPr sz="2800" kern="1200">
+        <a:buFont typeface="Arial" panose="020B0604020202020204" pitchFamily="34" charset="0"/>
+        <a:buChar char="•"/>
+        <a:defRPr sz="1350" kern="1200">
           <a:solidFill>
             <a:schemeClr val="tx1"/>
           </a:solidFill>
@@ -2874,13 +2721,16 @@
           <a:cs typeface="+mn-cs"/>
         </a:defRPr>
       </a:lvl2pPr>
-      <a:lvl3pPr marL="1143000" indent="-228600" algn="l" defTabSz="457200" rtl="0" eaLnBrk="1" latinLnBrk="0" hangingPunct="1">
+      <a:lvl3pPr marL="642938" indent="-128588" algn="l" defTabSz="514350" rtl="0" eaLnBrk="1" latinLnBrk="0" hangingPunct="1">
+        <a:lnSpc>
+          <a:spcPct val="90000"/>
+        </a:lnSpc>
         <a:spcBef>
-          <a:spcPct val="20000"/>
+          <a:spcPts val="281"/>
         </a:spcBef>
-        <a:buFont typeface="Arial"/>
+        <a:buFont typeface="Arial" panose="020B0604020202020204" pitchFamily="34" charset="0"/>
         <a:buChar char="•"/>
-        <a:defRPr sz="2400" kern="1200">
+        <a:defRPr sz="1125" kern="1200">
           <a:solidFill>
             <a:schemeClr val="tx1"/>
           </a:solidFill>
@@ -2889,13 +2739,16 @@
           <a:cs typeface="+mn-cs"/>
         </a:defRPr>
       </a:lvl3pPr>
-      <a:lvl4pPr marL="1600200" indent="-228600" algn="l" defTabSz="457200" rtl="0" eaLnBrk="1" latinLnBrk="0" hangingPunct="1">
+      <a:lvl4pPr marL="900113" indent="-128588" algn="l" defTabSz="514350" rtl="0" eaLnBrk="1" latinLnBrk="0" hangingPunct="1">
+        <a:lnSpc>
+          <a:spcPct val="90000"/>
+        </a:lnSpc>
         <a:spcBef>
-          <a:spcPct val="20000"/>
+          <a:spcPts val="281"/>
         </a:spcBef>
-        <a:buFont typeface="Arial"/>
-        <a:buChar char="–"/>
-        <a:defRPr sz="2000" kern="1200">
+        <a:buFont typeface="Arial" panose="020B0604020202020204" pitchFamily="34" charset="0"/>
+        <a:buChar char="•"/>
+        <a:defRPr sz="1013" kern="1200">
           <a:solidFill>
             <a:schemeClr val="tx1"/>
           </a:solidFill>
@@ -2904,13 +2757,16 @@
           <a:cs typeface="+mn-cs"/>
         </a:defRPr>
       </a:lvl4pPr>
-      <a:lvl5pPr marL="2057400" indent="-228600" algn="l" defTabSz="457200" rtl="0" eaLnBrk="1" latinLnBrk="0" hangingPunct="1">
+      <a:lvl5pPr marL="1157288" indent="-128588" algn="l" defTabSz="514350" rtl="0" eaLnBrk="1" latinLnBrk="0" hangingPunct="1">
+        <a:lnSpc>
+          <a:spcPct val="90000"/>
+        </a:lnSpc>
         <a:spcBef>
-          <a:spcPct val="20000"/>
+          <a:spcPts val="281"/>
         </a:spcBef>
-        <a:buFont typeface="Arial"/>
-        <a:buChar char="»"/>
-        <a:defRPr sz="2000" kern="1200">
+        <a:buFont typeface="Arial" panose="020B0604020202020204" pitchFamily="34" charset="0"/>
+        <a:buChar char="•"/>
+        <a:defRPr sz="1013" kern="1200">
           <a:solidFill>
             <a:schemeClr val="tx1"/>
           </a:solidFill>
@@ -2919,13 +2775,16 @@
           <a:cs typeface="+mn-cs"/>
         </a:defRPr>
       </a:lvl5pPr>
-      <a:lvl6pPr marL="2514600" indent="-228600" algn="l" defTabSz="457200" rtl="0" eaLnBrk="1" latinLnBrk="0" hangingPunct="1">
+      <a:lvl6pPr marL="1414463" indent="-128588" algn="l" defTabSz="514350" rtl="0" eaLnBrk="1" latinLnBrk="0" hangingPunct="1">
+        <a:lnSpc>
+          <a:spcPct val="90000"/>
+        </a:lnSpc>
         <a:spcBef>
-          <a:spcPct val="20000"/>
+          <a:spcPts val="281"/>
         </a:spcBef>
-        <a:buFont typeface="Arial"/>
+        <a:buFont typeface="Arial" panose="020B0604020202020204" pitchFamily="34" charset="0"/>
         <a:buChar char="•"/>
-        <a:defRPr sz="2000" kern="1200">
+        <a:defRPr sz="1013" kern="1200">
           <a:solidFill>
             <a:schemeClr val="tx1"/>
           </a:solidFill>
@@ -2934,13 +2793,16 @@
           <a:cs typeface="+mn-cs"/>
         </a:defRPr>
       </a:lvl6pPr>
-      <a:lvl7pPr marL="2971800" indent="-228600" algn="l" defTabSz="457200" rtl="0" eaLnBrk="1" latinLnBrk="0" hangingPunct="1">
+      <a:lvl7pPr marL="1671638" indent="-128588" algn="l" defTabSz="514350" rtl="0" eaLnBrk="1" latinLnBrk="0" hangingPunct="1">
+        <a:lnSpc>
+          <a:spcPct val="90000"/>
+        </a:lnSpc>
         <a:spcBef>
-          <a:spcPct val="20000"/>
+          <a:spcPts val="281"/>
         </a:spcBef>
-        <a:buFont typeface="Arial"/>
+        <a:buFont typeface="Arial" panose="020B0604020202020204" pitchFamily="34" charset="0"/>
         <a:buChar char="•"/>
-        <a:defRPr sz="2000" kern="1200">
+        <a:defRPr sz="1013" kern="1200">
           <a:solidFill>
             <a:schemeClr val="tx1"/>
           </a:solidFill>
@@ -2949,13 +2811,16 @@
           <a:cs typeface="+mn-cs"/>
         </a:defRPr>
       </a:lvl7pPr>
-      <a:lvl8pPr marL="3429000" indent="-228600" algn="l" defTabSz="457200" rtl="0" eaLnBrk="1" latinLnBrk="0" hangingPunct="1">
+      <a:lvl8pPr marL="1928813" indent="-128588" algn="l" defTabSz="514350" rtl="0" eaLnBrk="1" latinLnBrk="0" hangingPunct="1">
+        <a:lnSpc>
+          <a:spcPct val="90000"/>
+        </a:lnSpc>
         <a:spcBef>
-          <a:spcPct val="20000"/>
+          <a:spcPts val="281"/>
         </a:spcBef>
-        <a:buFont typeface="Arial"/>
+        <a:buFont typeface="Arial" panose="020B0604020202020204" pitchFamily="34" charset="0"/>
         <a:buChar char="•"/>
-        <a:defRPr sz="2000" kern="1200">
+        <a:defRPr sz="1013" kern="1200">
           <a:solidFill>
             <a:schemeClr val="tx1"/>
           </a:solidFill>
@@ -2964,13 +2829,16 @@
           <a:cs typeface="+mn-cs"/>
         </a:defRPr>
       </a:lvl8pPr>
-      <a:lvl9pPr marL="3886200" indent="-228600" algn="l" defTabSz="457200" rtl="0" eaLnBrk="1" latinLnBrk="0" hangingPunct="1">
+      <a:lvl9pPr marL="2185988" indent="-128588" algn="l" defTabSz="514350" rtl="0" eaLnBrk="1" latinLnBrk="0" hangingPunct="1">
+        <a:lnSpc>
+          <a:spcPct val="90000"/>
+        </a:lnSpc>
         <a:spcBef>
-          <a:spcPct val="20000"/>
+          <a:spcPts val="281"/>
         </a:spcBef>
-        <a:buFont typeface="Arial"/>
+        <a:buFont typeface="Arial" panose="020B0604020202020204" pitchFamily="34" charset="0"/>
         <a:buChar char="•"/>
-        <a:defRPr sz="2000" kern="1200">
+        <a:defRPr sz="1013" kern="1200">
           <a:solidFill>
             <a:schemeClr val="tx1"/>
           </a:solidFill>
@@ -2982,10 +2850,10 @@
     </p:bodyStyle>
     <p:otherStyle>
       <a:defPPr>
-        <a:defRPr lang="en-US"/>
+        <a:defRPr lang="es-CO"/>
       </a:defPPr>
-      <a:lvl1pPr marL="0" algn="l" defTabSz="457200" rtl="0" eaLnBrk="1" latinLnBrk="0" hangingPunct="1">
-        <a:defRPr sz="1800" kern="1200">
+      <a:lvl1pPr marL="0" algn="l" defTabSz="514350" rtl="0" eaLnBrk="1" latinLnBrk="0" hangingPunct="1">
+        <a:defRPr sz="1013" kern="1200">
           <a:solidFill>
             <a:schemeClr val="tx1"/>
           </a:solidFill>
@@ -2994,8 +2862,8 @@
           <a:cs typeface="+mn-cs"/>
         </a:defRPr>
       </a:lvl1pPr>
-      <a:lvl2pPr marL="457200" algn="l" defTabSz="457200" rtl="0" eaLnBrk="1" latinLnBrk="0" hangingPunct="1">
-        <a:defRPr sz="1800" kern="1200">
+      <a:lvl2pPr marL="257175" algn="l" defTabSz="514350" rtl="0" eaLnBrk="1" latinLnBrk="0" hangingPunct="1">
+        <a:defRPr sz="1013" kern="1200">
           <a:solidFill>
             <a:schemeClr val="tx1"/>
           </a:solidFill>
@@ -3004,8 +2872,8 @@
           <a:cs typeface="+mn-cs"/>
         </a:defRPr>
       </a:lvl2pPr>
-      <a:lvl3pPr marL="914400" algn="l" defTabSz="457200" rtl="0" eaLnBrk="1" latinLnBrk="0" hangingPunct="1">
-        <a:defRPr sz="1800" kern="1200">
+      <a:lvl3pPr marL="514350" algn="l" defTabSz="514350" rtl="0" eaLnBrk="1" latinLnBrk="0" hangingPunct="1">
+        <a:defRPr sz="1013" kern="1200">
           <a:solidFill>
             <a:schemeClr val="tx1"/>
           </a:solidFill>
@@ -3014,8 +2882,8 @@
           <a:cs typeface="+mn-cs"/>
         </a:defRPr>
       </a:lvl3pPr>
-      <a:lvl4pPr marL="1371600" algn="l" defTabSz="457200" rtl="0" eaLnBrk="1" latinLnBrk="0" hangingPunct="1">
-        <a:defRPr sz="1800" kern="1200">
+      <a:lvl4pPr marL="771525" algn="l" defTabSz="514350" rtl="0" eaLnBrk="1" latinLnBrk="0" hangingPunct="1">
+        <a:defRPr sz="1013" kern="1200">
           <a:solidFill>
             <a:schemeClr val="tx1"/>
           </a:solidFill>
@@ -3024,8 +2892,8 @@
           <a:cs typeface="+mn-cs"/>
         </a:defRPr>
       </a:lvl4pPr>
-      <a:lvl5pPr marL="1828800" algn="l" defTabSz="457200" rtl="0" eaLnBrk="1" latinLnBrk="0" hangingPunct="1">
-        <a:defRPr sz="1800" kern="1200">
+      <a:lvl5pPr marL="1028700" algn="l" defTabSz="514350" rtl="0" eaLnBrk="1" latinLnBrk="0" hangingPunct="1">
+        <a:defRPr sz="1013" kern="1200">
           <a:solidFill>
             <a:schemeClr val="tx1"/>
           </a:solidFill>
@@ -3034,8 +2902,8 @@
           <a:cs typeface="+mn-cs"/>
         </a:defRPr>
       </a:lvl5pPr>
-      <a:lvl6pPr marL="2286000" algn="l" defTabSz="457200" rtl="0" eaLnBrk="1" latinLnBrk="0" hangingPunct="1">
-        <a:defRPr sz="1800" kern="1200">
+      <a:lvl6pPr marL="1285875" algn="l" defTabSz="514350" rtl="0" eaLnBrk="1" latinLnBrk="0" hangingPunct="1">
+        <a:defRPr sz="1013" kern="1200">
           <a:solidFill>
             <a:schemeClr val="tx1"/>
           </a:solidFill>
@@ -3044,8 +2912,8 @@
           <a:cs typeface="+mn-cs"/>
         </a:defRPr>
       </a:lvl6pPr>
-      <a:lvl7pPr marL="2743200" algn="l" defTabSz="457200" rtl="0" eaLnBrk="1" latinLnBrk="0" hangingPunct="1">
-        <a:defRPr sz="1800" kern="1200">
+      <a:lvl7pPr marL="1543050" algn="l" defTabSz="514350" rtl="0" eaLnBrk="1" latinLnBrk="0" hangingPunct="1">
+        <a:defRPr sz="1013" kern="1200">
           <a:solidFill>
             <a:schemeClr val="tx1"/>
           </a:solidFill>
@@ -3054,8 +2922,8 @@
           <a:cs typeface="+mn-cs"/>
         </a:defRPr>
       </a:lvl7pPr>
-      <a:lvl8pPr marL="3200400" algn="l" defTabSz="457200" rtl="0" eaLnBrk="1" latinLnBrk="0" hangingPunct="1">
-        <a:defRPr sz="1800" kern="1200">
+      <a:lvl8pPr marL="1800225" algn="l" defTabSz="514350" rtl="0" eaLnBrk="1" latinLnBrk="0" hangingPunct="1">
+        <a:defRPr sz="1013" kern="1200">
           <a:solidFill>
             <a:schemeClr val="tx1"/>
           </a:solidFill>
@@ -3064,8 +2932,8 @@
           <a:cs typeface="+mn-cs"/>
         </a:defRPr>
       </a:lvl8pPr>
-      <a:lvl9pPr marL="3657600" algn="l" defTabSz="457200" rtl="0" eaLnBrk="1" latinLnBrk="0" hangingPunct="1">
-        <a:defRPr sz="1800" kern="1200">
+      <a:lvl9pPr marL="2057400" algn="l" defTabSz="514350" rtl="0" eaLnBrk="1" latinLnBrk="0" hangingPunct="1">
+        <a:defRPr sz="1013" kern="1200">
           <a:solidFill>
             <a:schemeClr val="tx1"/>
           </a:solidFill>
@@ -3121,7 +2989,54 @@
         </p:nvSpPr>
         <p:spPr>
           <a:xfrm>
-            <a:off x="6480000" y="-180000"/>
+            <a:off x="2700000" y="8028000"/>
+            <a:ext cx="5040000" cy="1080000"/>
+          </a:xfrm>
+          <a:prstGeom prst="rect">
+            <a:avLst/>
+          </a:prstGeom>
+          <a:noFill/>
+        </p:spPr>
+        <p:txBody>
+          <a:bodyPr wrap="none">
+            <a:spAutoFit/>
+          </a:bodyPr>
+          <a:lstStyle/>
+          <a:p/>
+          <a:p>
+            <a:pPr>
+              <a:spcBef>
+                <a:spcPts val="0"/>
+              </a:spcBef>
+              <a:defRPr sz="1100" b="0"/>
+            </a:pPr>
+            <a:r>
+              <a:t>Calle 6 sur #50 - 30, Medellin</a:t>
+            </a:r>
+            <a:br/>
+            <a:r>
+              <a:t> 316 324 05 27 / (4) 322 3662 ext.106</a:t>
+            </a:r>
+            <a:br/>
+            <a:r>
+              <a:t> curibe@magicmedios.com</a:t>
+            </a:r>
+            <a:br/>
+            <a:r>
+              <a:t> www.magicmedios.com</a:t>
+            </a:r>
+          </a:p>
+        </p:txBody>
+      </p:sp>
+      <p:sp>
+        <p:nvSpPr>
+          <p:cNvPr id="4" name="TextBox 3"/>
+          <p:cNvSpPr txBox="1"/>
+          <p:nvPr/>
+        </p:nvSpPr>
+        <p:spPr>
+          <a:xfrm>
+            <a:off x="4320000" y="-180000"/>
             <a:ext cx="2376000" cy="2160000"/>
           </a:xfrm>
           <a:prstGeom prst="rect">
@@ -3137,27 +3052,39 @@
           <a:p/>
           <a:p>
             <a:pPr>
+              <a:spcBef>
+                <a:spcPts val="0"/>
+              </a:spcBef>
               <a:defRPr sz="1400" b="0"/>
             </a:pPr>
             <a:r>
-              <a:t>12 9 de 2021</a:t>
+              <a:t>13 9 de 2021</a:t>
             </a:r>
           </a:p>
           <a:p>
             <a:pPr>
+              <a:spcBef>
+                <a:spcPts val="0"/>
+              </a:spcBef>
               <a:defRPr sz="1400" b="0"/>
             </a:pPr>
             <a:r>
-              <a:t>Cot N°207</a:t>
+              <a:t>Cot N°222</a:t>
             </a:r>
           </a:p>
           <a:p>
             <a:pPr>
+              <a:spcBef>
+                <a:spcPts val="0"/>
+              </a:spcBef>
               <a:defRPr sz="1100" b="0"/>
             </a:pPr>
           </a:p>
           <a:p>
             <a:pPr>
+              <a:spcBef>
+                <a:spcPts val="0"/>
+              </a:spcBef>
               <a:defRPr sz="1100" b="0"/>
             </a:pPr>
             <a:r>
@@ -3166,42 +3093,36 @@
           </a:p>
           <a:p>
             <a:pPr>
+              <a:spcBef>
+                <a:spcPts val="0"/>
+              </a:spcBef>
               <a:defRPr sz="1100" b="0"/>
             </a:pPr>
             <a:r>
               <a:t>Carlos Uribe</a:t>
             </a:r>
             <a:br/>
-          </a:p>
-          <a:p>
-            <a:pPr>
-              <a:defRPr sz="1100" b="0"/>
-            </a:pPr>
-            <a:r>
-              <a:t>316 324 05 27 / (4) 322 3662 ext.106</a:t>
+            <a:r>
+              <a:t> 316 324 05 27 / (4) 322 3662 ext.106</a:t>
             </a:r>
             <a:br/>
-          </a:p>
-          <a:p>
-            <a:pPr>
-              <a:defRPr sz="1100" b="0"/>
-            </a:pPr>
-            <a:r>
-              <a:t>curibe@magicmedios.com</a:t>
-            </a:r>
-          </a:p>
-        </p:txBody>
-      </p:sp>
-      <p:sp>
-        <p:nvSpPr>
-          <p:cNvPr id="4" name="TextBox 3"/>
+            <a:r>
+              <a:t> curibe@magicmedios.com</a:t>
+            </a:r>
+            <a:br/>
+          </a:p>
+        </p:txBody>
+      </p:sp>
+      <p:sp>
+        <p:nvSpPr>
+          <p:cNvPr id="5" name="TextBox 4"/>
           <p:cNvSpPr txBox="1"/>
           <p:nvPr/>
         </p:nvSpPr>
         <p:spPr>
           <a:xfrm>
-            <a:off x="360000" y="540000"/>
-            <a:ext cx="2304000" cy="1800000"/>
+            <a:off x="360000" y="900000"/>
+            <a:ext cx="2304000" cy="720000"/>
           </a:xfrm>
           <a:prstGeom prst="rect">
             <a:avLst/>
@@ -3216,6 +3137,9 @@
           <a:p/>
           <a:p>
             <a:pPr>
+              <a:spcBef>
+                <a:spcPts val="0"/>
+              </a:spcBef>
               <a:defRPr sz="1400" b="1"/>
             </a:pPr>
             <a:r>
@@ -3224,6 +3148,9 @@
           </a:p>
           <a:p>
             <a:pPr>
+              <a:spcBef>
+                <a:spcPts val="0"/>
+              </a:spcBef>
               <a:defRPr sz="1400" b="1"/>
             </a:pPr>
             <a:r>
@@ -3234,14 +3161,14 @@
       </p:sp>
       <p:sp>
         <p:nvSpPr>
-          <p:cNvPr id="5" name="TextBox 4"/>
+          <p:cNvPr id="6" name="TextBox 5"/>
           <p:cNvSpPr txBox="1"/>
           <p:nvPr/>
         </p:nvSpPr>
         <p:spPr>
           <a:xfrm>
-            <a:off x="540000" y="1080000"/>
-            <a:ext cx="6840000" cy="360000"/>
+            <a:off x="288000" y="1440000"/>
+            <a:ext cx="4500000" cy="360000"/>
           </a:xfrm>
           <a:prstGeom prst="rect">
             <a:avLst/>
@@ -3256,6 +3183,9 @@
           <a:p/>
           <a:p>
             <a:pPr>
+              <a:spcBef>
+                <a:spcPts val="0"/>
+              </a:spcBef>
               <a:defRPr sz="1200" b="1"/>
             </a:pPr>
             <a:r>
@@ -3266,14 +3196,14 @@
       </p:sp>
       <p:sp>
         <p:nvSpPr>
-          <p:cNvPr id="6" name="TextBox 5"/>
+          <p:cNvPr id="7" name="TextBox 6"/>
           <p:cNvSpPr txBox="1"/>
           <p:nvPr/>
         </p:nvSpPr>
         <p:spPr>
           <a:xfrm>
-            <a:off x="540000" y="1800000"/>
-            <a:ext cx="6840000" cy="1800000"/>
+            <a:off x="288000" y="2160000"/>
+            <a:ext cx="4500000" cy="1800000"/>
           </a:xfrm>
           <a:prstGeom prst="rect">
             <a:avLst/>
@@ -3288,6 +3218,9 @@
           <a:p/>
           <a:p>
             <a:pPr>
+              <a:spcBef>
+                <a:spcPts val="0"/>
+              </a:spcBef>
               <a:defRPr sz="1100" b="0"/>
             </a:pPr>
             <a:r>
@@ -3306,14 +3239,14 @@
       </p:sp>
       <p:sp>
         <p:nvSpPr>
-          <p:cNvPr id="7" name="TextBox 6"/>
+          <p:cNvPr id="8" name="TextBox 7"/>
           <p:cNvSpPr txBox="1"/>
           <p:nvPr/>
         </p:nvSpPr>
         <p:spPr>
           <a:xfrm>
-            <a:off x="540000" y="2880000"/>
-            <a:ext cx="6840000" cy="1800000"/>
+            <a:off x="288000" y="3060000"/>
+            <a:ext cx="4500000" cy="720000"/>
           </a:xfrm>
           <a:prstGeom prst="rect">
             <a:avLst/>
@@ -3328,6 +3261,9 @@
           <a:p/>
           <a:p>
             <a:pPr>
+              <a:spcBef>
+                <a:spcPts val="0"/>
+              </a:spcBef>
               <a:defRPr sz="1100" b="1"/>
             </a:pPr>
             <a:r>
@@ -3336,6 +3272,9 @@
           </a:p>
           <a:p>
             <a:pPr>
+              <a:spcBef>
+                <a:spcPts val="0"/>
+              </a:spcBef>
               <a:defRPr sz="1100" b="1"/>
             </a:pPr>
             <a:r>
@@ -3346,14 +3285,14 @@
       </p:sp>
       <p:graphicFrame>
         <p:nvGraphicFramePr>
-          <p:cNvPr id="8" name="Table 7"/>
+          <p:cNvPr id="9" name="Table 8"/>
           <p:cNvGraphicFramePr>
             <a:graphicFrameLocks noGrp="1"/>
           </p:cNvGraphicFramePr>
           <p:nvPr/>
         </p:nvGraphicFramePr>
         <p:xfrm>
-          <a:off x="540000" y="3240000"/>
+          <a:off x="288000" y="3600000"/>
           <a:ext cx="2880000" cy="360000"/>
         </p:xfrm>
         <a:graphic>
@@ -3424,7 +3363,7 @@
       </p:graphicFrame>
       <p:pic>
         <p:nvPicPr>
-          <p:cNvPr id="9" name="Picture 8" descr="sample_image.jpg"/>
+          <p:cNvPr id="10" name="Picture 9" descr="sample_image.jpg"/>
           <p:cNvPicPr>
             <a:picLocks noChangeAspect="1"/>
           </p:cNvPicPr>
@@ -3438,262 +3377,8 @@
         </p:blipFill>
         <p:spPr>
           <a:xfrm>
-            <a:off x="4320000" y="3240000"/>
-            <a:ext cx="4752000" cy="3420000"/>
-          </a:xfrm>
-          <a:prstGeom prst="rect">
-            <a:avLst/>
-          </a:prstGeom>
-        </p:spPr>
-      </p:pic>
-    </p:spTree>
-  </p:cSld>
-  <p:clrMapOvr>
-    <a:masterClrMapping/>
-  </p:clrMapOvr>
-</p:sld>
-</file>
-
-<file path=ppt/slides/slide2.xml><?xml version="1.0" encoding="utf-8"?>
-<p:sld xmlns:a="http://schemas.openxmlformats.org/drawingml/2006/main" xmlns:p="http://schemas.openxmlformats.org/presentationml/2006/main" xmlns:r="http://schemas.openxmlformats.org/officeDocument/2006/relationships">
-  <p:cSld>
-    <p:spTree>
-      <p:nvGrpSpPr>
-        <p:cNvPr id="1" name=""/>
-        <p:cNvGrpSpPr/>
-        <p:nvPr/>
-      </p:nvGrpSpPr>
-      <p:grpSpPr/>
-      <p:pic>
-        <p:nvPicPr>
-          <p:cNvPr id="2" name="Picture 1" descr="logo.jpg"/>
-          <p:cNvPicPr>
-            <a:picLocks noChangeAspect="1"/>
-          </p:cNvPicPr>
-          <p:nvPr/>
-        </p:nvPicPr>
-        <p:blipFill>
-          <a:blip r:embed="rId2"/>
-          <a:stretch>
-            <a:fillRect/>
-          </a:stretch>
-        </p:blipFill>
-        <p:spPr>
-          <a:xfrm>
-            <a:off x="360000" y="180000"/>
-            <a:ext cx="3204000" cy="612000"/>
-          </a:xfrm>
-          <a:prstGeom prst="rect">
-            <a:avLst/>
-          </a:prstGeom>
-        </p:spPr>
-      </p:pic>
-      <p:sp>
-        <p:nvSpPr>
-          <p:cNvPr id="3" name="TextBox 2"/>
-          <p:cNvSpPr txBox="1"/>
-          <p:nvPr/>
-        </p:nvSpPr>
-        <p:spPr>
-          <a:xfrm>
-            <a:off x="540000" y="1080000"/>
-            <a:ext cx="6840000" cy="360000"/>
-          </a:xfrm>
-          <a:prstGeom prst="rect">
-            <a:avLst/>
-          </a:prstGeom>
-          <a:noFill/>
-        </p:spPr>
-        <p:txBody>
-          <a:bodyPr wrap="none">
-            <a:spAutoFit/>
-          </a:bodyPr>
-          <a:lstStyle/>
-          <a:p/>
-          <a:p>
-            <a:pPr>
-              <a:defRPr sz="1100" b="1"/>
-            </a:pPr>
-            <a:r>
-              <a:t>1.PA0106 Paraguas Chic 23"</a:t>
-            </a:r>
-          </a:p>
-        </p:txBody>
-      </p:sp>
-      <p:sp>
-        <p:nvSpPr>
-          <p:cNvPr id="4" name="TextBox 3"/>
-          <p:cNvSpPr txBox="1"/>
-          <p:nvPr/>
-        </p:nvSpPr>
-        <p:spPr>
-          <a:xfrm>
-            <a:off x="540000" y="1260000"/>
-            <a:ext cx="6840000" cy="720000"/>
-          </a:xfrm>
-          <a:prstGeom prst="rect">
-            <a:avLst/>
-          </a:prstGeom>
-          <a:noFill/>
-        </p:spPr>
-        <p:txBody>
-          <a:bodyPr wrap="square">
-            <a:spAutoFit/>
-          </a:bodyPr>
-          <a:lstStyle/>
-          <a:p/>
-          <a:p>
-            <a:pPr>
-              <a:defRPr sz="1100" b="1"/>
-            </a:pPr>
-            <a:r>
-              <a:t>Apertura automática y cierre manual, marco en fibra de vidrio, costillas largas. Tela en pongee 190t, mango plástico en ABS con acabado en caucho.</a:t>
-            </a:r>
-          </a:p>
-        </p:txBody>
-      </p:sp>
-      <p:sp>
-        <p:nvSpPr>
-          <p:cNvPr id="5" name="TextBox 4"/>
-          <p:cNvSpPr txBox="1"/>
-          <p:nvPr/>
-        </p:nvSpPr>
-        <p:spPr>
-          <a:xfrm>
-            <a:off x="540000" y="1800000"/>
-            <a:ext cx="6840000" cy="1800000"/>
-          </a:xfrm>
-          <a:prstGeom prst="rect">
-            <a:avLst/>
-          </a:prstGeom>
-          <a:noFill/>
-        </p:spPr>
-        <p:txBody>
-          <a:bodyPr wrap="none">
-            <a:spAutoFit/>
-          </a:bodyPr>
-          <a:lstStyle/>
-          <a:p/>
-          <a:p>
-            <a:pPr>
-              <a:defRPr sz="1100" b="0"/>
-            </a:pPr>
-            <a:r>
-              <a:t>MATERIAL: 190T Pongee. Mango en plástico ABS. Costillas en fibra de vidrio.</a:t>
-            </a:r>
-          </a:p>
-          <a:p>
-            <a:pPr>
-              <a:defRPr sz="1100" b="0"/>
-            </a:pPr>
-            <a:r>
-              <a:t>MEDIDAS: 23 pulgadas x 8 cascos, cobertura 103 cm.</a:t>
-            </a:r>
-          </a:p>
-          <a:p>
-            <a:pPr>
-              <a:defRPr sz="1100" b="0"/>
-            </a:pPr>
-            <a:r>
-              <a:t>ÁREA DE IMPRESIÓN APROXIMADA: 20 x 13 cm.</a:t>
-            </a:r>
-          </a:p>
-          <a:p>
-            <a:pPr>
-              <a:defRPr sz="1100" b="0"/>
-            </a:pPr>
-            <a:r>
-              <a:t>MARCA: SE SUGIERE: Screen Paraguas hasta 3 tintas.</a:t>
-            </a:r>
-          </a:p>
-          <a:p>
-            <a:pPr>
-              <a:defRPr sz="1100" b="0"/>
-            </a:pPr>
-            <a:r>
-              <a:t>EMPAQUE: 48 Unidades en caja máster de: 84 cm x 25 cm x 27,5; Pesos Bruto: 18 Kg ; Pesos Neto: 18 Kg</a:t>
-            </a:r>
-          </a:p>
-          <a:p>
-            <a:pPr>
-              <a:defRPr sz="1100" b="0"/>
-            </a:pPr>
-            <a:r>
-              <a:t>INVENTARIO: 87 unidades</a:t>
-            </a:r>
-          </a:p>
-        </p:txBody>
-      </p:sp>
-      <p:graphicFrame>
-        <p:nvGraphicFramePr>
-          <p:cNvPr id="6" name="Table 5"/>
-          <p:cNvGraphicFramePr>
-            <a:graphicFrameLocks noGrp="1"/>
-          </p:cNvGraphicFramePr>
-          <p:nvPr/>
-        </p:nvGraphicFramePr>
-        <p:xfrm>
-          <a:off x="540000" y="3240000"/>
-          <a:ext cx="2880000" cy="180000"/>
-        </p:xfrm>
-        <a:graphic>
-          <a:graphicData uri="http://schemas.openxmlformats.org/drawingml/2006/table">
-            <a:tbl>
-              <a:tblPr firstRow="1" bandRow="1">
-                <a:tableStyleId>{5C22544A-7EE6-4342-B048-85BDC9FD1C3A}</a:tableStyleId>
-              </a:tblPr>
-              <a:tblGrid>
-                <a:gridCol w="1440000"/>
-                <a:gridCol w="1440000"/>
-              </a:tblGrid>
-              <a:tr h="180000">
-                <a:tc>
-                  <a:txBody>
-                    <a:bodyPr/>
-                    <a:lstStyle/>
-                    <a:p>
-                      <a:r>
-                        <a:t>Azul Oscuro</a:t>
-                      </a:r>
-                    </a:p>
-                  </a:txBody>
-                  <a:tcPr/>
-                </a:tc>
-                <a:tc>
-                  <a:txBody>
-                    <a:bodyPr/>
-                    <a:lstStyle/>
-                    <a:p>
-                      <a:r>
-                        <a:t>87</a:t>
-                      </a:r>
-                    </a:p>
-                  </a:txBody>
-                  <a:tcPr/>
-                </a:tc>
-              </a:tr>
-            </a:tbl>
-          </a:graphicData>
-        </a:graphic>
-      </p:graphicFrame>
-      <p:pic>
-        <p:nvPicPr>
-          <p:cNvPr id="7" name="Picture 6" descr="sample_image.jpg"/>
-          <p:cNvPicPr>
-            <a:picLocks noChangeAspect="1"/>
-          </p:cNvPicPr>
-          <p:nvPr/>
-        </p:nvPicPr>
-        <p:blipFill>
-          <a:blip r:embed="rId3"/>
-          <a:stretch>
-            <a:fillRect/>
-          </a:stretch>
-        </p:blipFill>
-        <p:spPr>
-          <a:xfrm>
-            <a:off x="4320000" y="3240000"/>
-            <a:ext cx="4752000" cy="3420000"/>
+            <a:off x="3060000" y="3600000"/>
+            <a:ext cx="3564000" cy="2556000"/>
           </a:xfrm>
           <a:prstGeom prst="rect">
             <a:avLst/>
@@ -3709,7 +3394,7 @@
 </file>
 
 <file path=ppt/theme/theme1.xml><?xml version="1.0" encoding="utf-8"?>
-<a:theme xmlns:a="http://schemas.openxmlformats.org/drawingml/2006/main" name="Office Theme">
+<a:theme xmlns:a="http://schemas.openxmlformats.org/drawingml/2006/main" name="Tema de Office">
   <a:themeElements>
     <a:clrScheme name="Office">
       <a:dk1>
@@ -3719,39 +3404,39 @@
         <a:sysClr val="window" lastClr="FFFFFF"/>
       </a:lt1>
       <a:dk2>
-        <a:srgbClr val="1F497D"/>
+        <a:srgbClr val="44546A"/>
       </a:dk2>
       <a:lt2>
-        <a:srgbClr val="EEECE1"/>
+        <a:srgbClr val="E7E6E6"/>
       </a:lt2>
       <a:accent1>
-        <a:srgbClr val="4F81BD"/>
+        <a:srgbClr val="5B9BD5"/>
       </a:accent1>
       <a:accent2>
-        <a:srgbClr val="C0504D"/>
+        <a:srgbClr val="ED7D31"/>
       </a:accent2>
       <a:accent3>
-        <a:srgbClr val="9BBB59"/>
+        <a:srgbClr val="A5A5A5"/>
       </a:accent3>
       <a:accent4>
-        <a:srgbClr val="8064A2"/>
+        <a:srgbClr val="FFC000"/>
       </a:accent4>
       <a:accent5>
-        <a:srgbClr val="4BACC6"/>
+        <a:srgbClr val="4472C4"/>
       </a:accent5>
       <a:accent6>
-        <a:srgbClr val="F79646"/>
+        <a:srgbClr val="70AD47"/>
       </a:accent6>
       <a:hlink>
-        <a:srgbClr val="0000FF"/>
+        <a:srgbClr val="0563C1"/>
       </a:hlink>
       <a:folHlink>
-        <a:srgbClr val="800080"/>
+        <a:srgbClr val="954F72"/>
       </a:folHlink>
     </a:clrScheme>
     <a:fontScheme name="Office">
       <a:majorFont>
-        <a:latin typeface="Calibri"/>
+        <a:latin typeface="Calibri Light" panose="020F0302020204030204"/>
         <a:ea typeface=""/>
         <a:cs typeface=""/>
         <a:font script="Jpan" typeface="ＭＳ Ｐゴシック"/>
@@ -3786,7 +3471,7 @@
         <a:font script="Geor" typeface="Sylfaen"/>
       </a:majorFont>
       <a:minorFont>
-        <a:latin typeface="Calibri"/>
+        <a:latin typeface="Calibri" panose="020F0502020204030204"/>
         <a:ea typeface=""/>
         <a:cs typeface=""/>
         <a:font script="Jpan" typeface="ＭＳ Ｐゴシック"/>
@@ -3830,200 +3515,141 @@
           <a:gsLst>
             <a:gs pos="0">
               <a:schemeClr val="phClr">
-                <a:tint val="50000"/>
-                <a:satMod val="300000"/>
+                <a:lumMod val="110000"/>
+                <a:satMod val="105000"/>
+                <a:tint val="67000"/>
               </a:schemeClr>
             </a:gs>
-            <a:gs pos="35000">
+            <a:gs pos="50000">
               <a:schemeClr val="phClr">
-                <a:tint val="37000"/>
-                <a:satMod val="300000"/>
+                <a:lumMod val="105000"/>
+                <a:satMod val="103000"/>
+                <a:tint val="73000"/>
               </a:schemeClr>
             </a:gs>
             <a:gs pos="100000">
               <a:schemeClr val="phClr">
-                <a:tint val="15000"/>
-                <a:satMod val="350000"/>
+                <a:lumMod val="105000"/>
+                <a:satMod val="109000"/>
+                <a:tint val="81000"/>
               </a:schemeClr>
             </a:gs>
           </a:gsLst>
-          <a:lin ang="16200000" scaled="1"/>
+          <a:lin ang="5400000" scaled="0"/>
         </a:gradFill>
         <a:gradFill rotWithShape="1">
           <a:gsLst>
             <a:gs pos="0">
               <a:schemeClr val="phClr">
-                <a:tint val="100000"/>
+                <a:satMod val="103000"/>
+                <a:lumMod val="102000"/>
+                <a:tint val="94000"/>
+              </a:schemeClr>
+            </a:gs>
+            <a:gs pos="50000">
+              <a:schemeClr val="phClr">
+                <a:satMod val="110000"/>
+                <a:lumMod val="100000"/>
                 <a:shade val="100000"/>
-                <a:satMod val="130000"/>
               </a:schemeClr>
             </a:gs>
             <a:gs pos="100000">
               <a:schemeClr val="phClr">
-                <a:tint val="50000"/>
-                <a:shade val="100000"/>
-                <a:satMod val="350000"/>
+                <a:lumMod val="99000"/>
+                <a:satMod val="120000"/>
+                <a:shade val="78000"/>
               </a:schemeClr>
             </a:gs>
           </a:gsLst>
-          <a:lin ang="16200000" scaled="0"/>
+          <a:lin ang="5400000" scaled="0"/>
         </a:gradFill>
       </a:fillStyleLst>
       <a:lnStyleLst>
-        <a:ln w="9525" cap="flat" cmpd="sng" algn="ctr">
-          <a:solidFill>
-            <a:schemeClr val="phClr">
-              <a:shade val="95000"/>
-              <a:satMod val="105000"/>
-            </a:schemeClr>
-          </a:solidFill>
-          <a:prstDash val="solid"/>
-        </a:ln>
-        <a:ln w="25400" cap="flat" cmpd="sng" algn="ctr">
+        <a:ln w="6350" cap="flat" cmpd="sng" algn="ctr">
           <a:solidFill>
             <a:schemeClr val="phClr"/>
           </a:solidFill>
           <a:prstDash val="solid"/>
+          <a:miter lim="800000"/>
         </a:ln>
-        <a:ln w="38100" cap="flat" cmpd="sng" algn="ctr">
+        <a:ln w="12700" cap="flat" cmpd="sng" algn="ctr">
           <a:solidFill>
             <a:schemeClr val="phClr"/>
           </a:solidFill>
           <a:prstDash val="solid"/>
+          <a:miter lim="800000"/>
+        </a:ln>
+        <a:ln w="19050" cap="flat" cmpd="sng" algn="ctr">
+          <a:solidFill>
+            <a:schemeClr val="phClr"/>
+          </a:solidFill>
+          <a:prstDash val="solid"/>
+          <a:miter lim="800000"/>
         </a:ln>
       </a:lnStyleLst>
       <a:effectStyleLst>
         <a:effectStyle>
+          <a:effectLst/>
+        </a:effectStyle>
+        <a:effectStyle>
+          <a:effectLst/>
+        </a:effectStyle>
+        <a:effectStyle>
           <a:effectLst>
-            <a:outerShdw blurRad="40000" dist="20000" dir="5400000" rotWithShape="0">
+            <a:outerShdw blurRad="57150" dist="19050" dir="5400000" algn="ctr" rotWithShape="0">
               <a:srgbClr val="000000">
-                <a:alpha val="38000"/>
+                <a:alpha val="63000"/>
               </a:srgbClr>
             </a:outerShdw>
           </a:effectLst>
-        </a:effectStyle>
-        <a:effectStyle>
-          <a:effectLst>
-            <a:outerShdw blurRad="40000" dist="23000" dir="5400000" rotWithShape="0">
-              <a:srgbClr val="000000">
-                <a:alpha val="35000"/>
-              </a:srgbClr>
-            </a:outerShdw>
-          </a:effectLst>
-        </a:effectStyle>
-        <a:effectStyle>
-          <a:effectLst>
-            <a:outerShdw blurRad="40000" dist="23000" dir="5400000" rotWithShape="0">
-              <a:srgbClr val="000000">
-                <a:alpha val="35000"/>
-              </a:srgbClr>
-            </a:outerShdw>
-          </a:effectLst>
-          <a:scene3d>
-            <a:camera prst="orthographicFront">
-              <a:rot lat="0" lon="0" rev="0"/>
-            </a:camera>
-            <a:lightRig rig="threePt" dir="t">
-              <a:rot lat="0" lon="0" rev="1200000"/>
-            </a:lightRig>
-          </a:scene3d>
-          <a:sp3d>
-            <a:bevelT w="63500" h="25400"/>
-          </a:sp3d>
         </a:effectStyle>
       </a:effectStyleLst>
       <a:bgFillStyleLst>
         <a:solidFill>
           <a:schemeClr val="phClr"/>
         </a:solidFill>
+        <a:solidFill>
+          <a:schemeClr val="phClr">
+            <a:tint val="95000"/>
+            <a:satMod val="170000"/>
+          </a:schemeClr>
+        </a:solidFill>
         <a:gradFill rotWithShape="1">
           <a:gsLst>
             <a:gs pos="0">
               <a:schemeClr val="phClr">
-                <a:tint val="40000"/>
-                <a:satMod val="350000"/>
+                <a:tint val="93000"/>
+                <a:satMod val="150000"/>
+                <a:shade val="98000"/>
+                <a:lumMod val="102000"/>
               </a:schemeClr>
             </a:gs>
-            <a:gs pos="40000">
+            <a:gs pos="50000">
               <a:schemeClr val="phClr">
-                <a:tint val="45000"/>
-                <a:shade val="99000"/>
-                <a:satMod val="350000"/>
+                <a:tint val="98000"/>
+                <a:satMod val="130000"/>
+                <a:shade val="90000"/>
+                <a:lumMod val="103000"/>
               </a:schemeClr>
             </a:gs>
             <a:gs pos="100000">
               <a:schemeClr val="phClr">
-                <a:shade val="20000"/>
-                <a:satMod val="255000"/>
+                <a:shade val="63000"/>
+                <a:satMod val="120000"/>
               </a:schemeClr>
             </a:gs>
           </a:gsLst>
-          <a:path path="circle">
-            <a:fillToRect l="50000" t="-80000" r="50000" b="180000"/>
-          </a:path>
-        </a:gradFill>
-        <a:gradFill rotWithShape="1">
-          <a:gsLst>
-            <a:gs pos="0">
-              <a:schemeClr val="phClr">
-                <a:tint val="80000"/>
-                <a:satMod val="300000"/>
-              </a:schemeClr>
-            </a:gs>
-            <a:gs pos="100000">
-              <a:schemeClr val="phClr">
-                <a:shade val="30000"/>
-                <a:satMod val="200000"/>
-              </a:schemeClr>
-            </a:gs>
-          </a:gsLst>
-          <a:path path="circle">
-            <a:fillToRect l="50000" t="50000" r="50000" b="50000"/>
-          </a:path>
+          <a:lin ang="5400000" scaled="0"/>
         </a:gradFill>
       </a:bgFillStyleLst>
     </a:fmtScheme>
   </a:themeElements>
-  <a:objectDefaults>
-    <a:spDef>
-      <a:spPr/>
-      <a:bodyPr/>
-      <a:lstStyle/>
-      <a:style>
-        <a:lnRef idx="1">
-          <a:schemeClr val="accent1"/>
-        </a:lnRef>
-        <a:fillRef idx="3">
-          <a:schemeClr val="accent1"/>
-        </a:fillRef>
-        <a:effectRef idx="2">
-          <a:schemeClr val="accent1"/>
-        </a:effectRef>
-        <a:fontRef idx="minor">
-          <a:schemeClr val="lt1"/>
-        </a:fontRef>
-      </a:style>
-    </a:spDef>
-    <a:lnDef>
-      <a:spPr/>
-      <a:bodyPr/>
-      <a:lstStyle/>
-      <a:style>
-        <a:lnRef idx="2">
-          <a:schemeClr val="accent1"/>
-        </a:lnRef>
-        <a:fillRef idx="0">
-          <a:schemeClr val="accent1"/>
-        </a:fillRef>
-        <a:effectRef idx="1">
-          <a:schemeClr val="accent1"/>
-        </a:effectRef>
-        <a:fontRef idx="minor">
-          <a:schemeClr val="tx1"/>
-        </a:fontRef>
-      </a:style>
-    </a:lnDef>
-  </a:objectDefaults>
+  <a:objectDefaults/>
   <a:extraClrSchemeLst/>
+  <a:extLst>
+    <a:ext uri="{05A4C25C-085E-4340-85A3-A5531E510DB2}">
+      <thm15:themeFamily xmlns:thm15="http://schemas.microsoft.com/office/thememl/2012/main" name="Office Theme" id="{62F939B6-93AF-4DB8-9C6B-D6C7DFDC589F}" vid="{4A3C46E8-61CC-4603-A589-7422A47A8E4A}"/>
+    </a:ext>
+  </a:extLst>
 </a:theme>
 </file>
</xml_diff>

<commit_message>
add tabla de cantidades
</commit_message>
<xml_diff>
--- a/cotizaciones/cotización_Test1.pptx
+++ b/cotizaciones/cotización_Test1.pptx
@@ -3058,7 +3058,7 @@
               <a:defRPr sz="1400" b="0"/>
             </a:pPr>
             <a:r>
-              <a:t>14 septiembre de 2021</a:t>
+              <a:t>15 septiembre de 2021</a:t>
             </a:r>
           </a:p>
           <a:p>
@@ -3069,7 +3069,7 @@
               <a:defRPr sz="1400" b="0"/>
             </a:pPr>
             <a:r>
-              <a:t>Cot N°281</a:t>
+              <a:t>Cot N°289</a:t>
             </a:r>
           </a:p>
           <a:p>
@@ -3159,16 +3159,120 @@
           </a:p>
         </p:txBody>
       </p:sp>
-      <p:sp>
-        <p:nvSpPr>
-          <p:cNvPr id="6" name="TextBox 5"/>
+      <p:graphicFrame>
+        <p:nvGraphicFramePr>
+          <p:cNvPr id="6" name="Table 5"/>
+          <p:cNvGraphicFramePr>
+            <a:graphicFrameLocks noGrp="1"/>
+          </p:cNvGraphicFramePr>
+          <p:nvPr/>
+        </p:nvGraphicFramePr>
+        <p:xfrm>
+          <a:off x="1080000" y="4320000"/>
+          <a:ext cx="4500000" cy="540000"/>
+        </p:xfrm>
+        <a:graphic>
+          <a:graphicData uri="http://schemas.openxmlformats.org/drawingml/2006/table">
+            <a:tbl>
+              <a:tblPr firstRow="1">
+                <a:tableStyleId>{5C22544A-7EE6-4342-B048-85BDC9FD1C3A}</a:tableStyleId>
+              </a:tblPr>
+              <a:tblGrid>
+                <a:gridCol w="1080000"/>
+                <a:gridCol w="3420000"/>
+              </a:tblGrid>
+              <a:tr h="180000">
+                <a:tc>
+                  <a:txBody>
+                    <a:bodyPr/>
+                    <a:lstStyle/>
+                    <a:p>
+                      <a:r>
+                        <a:t>Cantidad (und)</a:t>
+                      </a:r>
+                    </a:p>
+                  </a:txBody>
+                  <a:tcPr/>
+                </a:tc>
+                <a:tc>
+                  <a:txBody>
+                    <a:bodyPr/>
+                    <a:lstStyle/>
+                    <a:p>
+                      <a:r>
+                        <a:t>Valor unitario</a:t>
+                      </a:r>
+                    </a:p>
+                  </a:txBody>
+                  <a:tcPr/>
+                </a:tc>
+              </a:tr>
+              <a:tr h="180000">
+                <a:tc>
+                  <a:txBody>
+                    <a:bodyPr/>
+                    <a:lstStyle/>
+                    <a:p/>
+                  </a:txBody>
+                  <a:tcPr>
+                    <a:solidFill>
+                      <a:srgbClr val="FFFFFF"/>
+                    </a:solidFill>
+                  </a:tcPr>
+                </a:tc>
+                <a:tc>
+                  <a:txBody>
+                    <a:bodyPr/>
+                    <a:lstStyle/>
+                    <a:p/>
+                  </a:txBody>
+                  <a:tcPr>
+                    <a:solidFill>
+                      <a:srgbClr val="FFFFFF"/>
+                    </a:solidFill>
+                  </a:tcPr>
+                </a:tc>
+              </a:tr>
+              <a:tr h="180000">
+                <a:tc>
+                  <a:txBody>
+                    <a:bodyPr/>
+                    <a:lstStyle/>
+                    <a:p/>
+                  </a:txBody>
+                  <a:tcPr>
+                    <a:solidFill>
+                      <a:srgbClr val="FFFFFF"/>
+                    </a:solidFill>
+                  </a:tcPr>
+                </a:tc>
+                <a:tc>
+                  <a:txBody>
+                    <a:bodyPr/>
+                    <a:lstStyle/>
+                    <a:p/>
+                  </a:txBody>
+                  <a:tcPr>
+                    <a:solidFill>
+                      <a:srgbClr val="FFFFFF"/>
+                    </a:solidFill>
+                  </a:tcPr>
+                </a:tc>
+              </a:tr>
+            </a:tbl>
+          </a:graphicData>
+        </a:graphic>
+      </p:graphicFrame>
+      <p:sp>
+        <p:nvSpPr>
+          <p:cNvPr id="7" name="TextBox 6"/>
           <p:cNvSpPr txBox="1"/>
           <p:nvPr/>
         </p:nvSpPr>
         <p:spPr>
           <a:xfrm>
             <a:off x="288000" y="1440000"/>
-            <a:ext cx="4500000" cy="360000"/>
+            <a:ext cx="6263999" cy="360000"/>
           </a:xfrm>
           <a:prstGeom prst="rect">
             <a:avLst/>
@@ -3196,14 +3300,14 @@
       </p:sp>
       <p:sp>
         <p:nvSpPr>
-          <p:cNvPr id="7" name="TextBox 6"/>
+          <p:cNvPr id="8" name="TextBox 7"/>
           <p:cNvSpPr txBox="1"/>
           <p:nvPr/>
         </p:nvSpPr>
         <p:spPr>
           <a:xfrm>
             <a:off x="288000" y="1620000"/>
-            <a:ext cx="4500000" cy="720000"/>
+            <a:ext cx="6263999" cy="720000"/>
           </a:xfrm>
           <a:prstGeom prst="rect">
             <a:avLst/>
@@ -3231,14 +3335,14 @@
       </p:sp>
       <p:sp>
         <p:nvSpPr>
-          <p:cNvPr id="8" name="TextBox 7"/>
+          <p:cNvPr id="9" name="TextBox 8"/>
           <p:cNvSpPr txBox="1"/>
           <p:nvPr/>
         </p:nvSpPr>
         <p:spPr>
           <a:xfrm>
             <a:off x="288000" y="2160000"/>
-            <a:ext cx="4500000" cy="1800000"/>
+            <a:ext cx="6263999" cy="1800000"/>
           </a:xfrm>
           <a:prstGeom prst="rect">
             <a:avLst/>
@@ -3321,14 +3425,14 @@
       </p:sp>
       <p:graphicFrame>
         <p:nvGraphicFramePr>
-          <p:cNvPr id="9" name="Table 8"/>
+          <p:cNvPr id="10" name="Table 9"/>
           <p:cNvGraphicFramePr>
             <a:graphicFrameLocks noGrp="1"/>
           </p:cNvGraphicFramePr>
           <p:nvPr/>
         </p:nvGraphicFramePr>
         <p:xfrm>
-          <a:off x="288000" y="4320000"/>
+          <a:off x="288000" y="5400000"/>
           <a:ext cx="2160000" cy="360000"/>
         </p:xfrm>
         <a:graphic>
@@ -3347,6 +3451,9 @@
                     <a:bodyPr/>
                     <a:lstStyle/>
                     <a:p>
+                      <a:pPr>
+                        <a:defRPr sz="900"/>
+                      </a:pPr>
                       <a:r>
                         <a:t>Color</a:t>
                       </a:r>
@@ -3359,6 +3466,9 @@
                     <a:bodyPr/>
                     <a:lstStyle/>
                     <a:p>
+                      <a:pPr>
+                        <a:defRPr sz="900"/>
+                      </a:pPr>
                       <a:r>
                         <a:t>Inventario</a:t>
                       </a:r>
@@ -3373,6 +3483,9 @@
                     <a:bodyPr/>
                     <a:lstStyle/>
                     <a:p>
+                      <a:pPr>
+                        <a:defRPr sz="900"/>
+                      </a:pPr>
                       <a:r>
                         <a:t>Azul Oscuro</a:t>
                       </a:r>
@@ -3389,6 +3502,9 @@
                     <a:bodyPr/>
                     <a:lstStyle/>
                     <a:p>
+                      <a:pPr>
+                        <a:defRPr sz="900"/>
+                      </a:pPr>
                       <a:r>
                         <a:t>87</a:t>
                       </a:r>
@@ -3407,7 +3523,7 @@
       </p:graphicFrame>
       <p:pic>
         <p:nvPicPr>
-          <p:cNvPr id="10" name="Picture 9" descr="sample_image.jpg"/>
+          <p:cNvPr id="11" name="Picture 10" descr="sample_image.jpg"/>
           <p:cNvPicPr>
             <a:picLocks noChangeAspect="1"/>
           </p:cNvPicPr>
@@ -3421,7 +3537,7 @@
         </p:blipFill>
         <p:spPr>
           <a:xfrm>
-            <a:off x="3060000" y="4320000"/>
+            <a:off x="3060000" y="5400000"/>
             <a:ext cx="3564000" cy="2556000"/>
           </a:xfrm>
           <a:prstGeom prst="rect">

</xml_diff>

<commit_message>
fix title index bug
</commit_message>
<xml_diff>
--- a/cotizaciones/cotización_Test1.pptx
+++ b/cotizaciones/cotización_Test1.pptx
@@ -3069,7 +3069,7 @@
               <a:defRPr sz="1400" b="0"/>
             </a:pPr>
             <a:r>
-              <a:t>Cot N°289</a:t>
+              <a:t>Cot N°326</a:t>
             </a:r>
           </a:p>
           <a:p>
@@ -3293,7 +3293,7 @@
               <a:defRPr sz="1100" b="1"/>
             </a:pPr>
             <a:r>
-              <a:t>1.PA0106 Paraguas Chic 23"</a:t>
+              <a:t>1.GO0020 Gorra Hanna</a:t>
             </a:r>
           </a:p>
         </p:txBody>
@@ -3328,7 +3328,7 @@
               <a:defRPr sz="1100" b="1"/>
             </a:pPr>
             <a:r>
-              <a:t>Apertura automática y cierre manual, marco en fibra de vidrio, costillas largas. Tela en pongee 190t, mango plástico en ABS con acabado en caucho.</a:t>
+              <a:t>Gorra de 5 paneles con frente fusionado y parte posterior en malla, visera indeformable 4 costuras, botón forrado, tafilete textil y cierre plástico.</a:t>
             </a:r>
           </a:p>
         </p:txBody>
@@ -3363,7 +3363,7 @@
               <a:defRPr sz="1100" b="0"/>
             </a:pPr>
             <a:r>
-              <a:t>MATERIAL: 190T Pongee. Mango en plástico ABS. Costillas en fibra de vidrio.</a:t>
+              <a:t>MATERIAL: Poliéster + Malla Nylon.</a:t>
             </a:r>
           </a:p>
           <a:p>
@@ -3374,7 +3374,7 @@
               <a:defRPr sz="1100" b="0"/>
             </a:pPr>
             <a:r>
-              <a:t>MEDIDAS: 23 pulgadas x 8 cascos, cobertura 103 cm.</a:t>
+              <a:t>MEDIDAS: Circunferencia 55cm. Visera 18 x 12 cm.</a:t>
             </a:r>
           </a:p>
           <a:p>
@@ -3385,7 +3385,7 @@
               <a:defRPr sz="1100" b="0"/>
             </a:pPr>
             <a:r>
-              <a:t>ÁREA DE IMPRESIÓN APROXIMADA: 20 x 13 cm.</a:t>
+              <a:t>ÁREA DE IMPRESIÓN APROXIMADA: Bordado: 5 x 5,5 cm. Sublimación: 13 x 8 cm.</a:t>
             </a:r>
           </a:p>
           <a:p>
@@ -3396,7 +3396,7 @@
               <a:defRPr sz="1100" b="0"/>
             </a:pPr>
             <a:r>
-              <a:t>MARCA: SE SUGIERE: Screen Paraguas hasta 3 tintas.</a:t>
+              <a:t>MARCA: SE SUGIERE: Bordado. Sublimación en gorras con frente blanco.</a:t>
             </a:r>
           </a:p>
           <a:p>
@@ -3407,7 +3407,7 @@
               <a:defRPr sz="1100" b="0"/>
             </a:pPr>
             <a:r>
-              <a:t>EMPAQUE: 48 Unidades en caja máster de: 84 cm x 25 cm x 27,5; Pesos Bruto: 18 Kg ; Pesos Neto: 18 Kg</a:t>
+              <a:t>EMPAQUE: 200 Unidades en caja máster de: 45 cm x 38 cm x 80 cm; Peso Bruto: 13,7 Kg; Peso Neto: 12 Kg</a:t>
             </a:r>
           </a:p>
           <a:p>
@@ -3418,7 +3418,7 @@
               <a:defRPr sz="1100" b="0"/>
             </a:pPr>
             <a:r>
-              <a:t>INVENTARIO: 87 unidades</a:t>
+              <a:t>INVENTARIO: 108.018 unidades</a:t>
             </a:r>
           </a:p>
         </p:txBody>
@@ -3433,7 +3433,7 @@
         </p:nvGraphicFramePr>
         <p:xfrm>
           <a:off x="288000" y="5400000"/>
-          <a:ext cx="2160000" cy="360000"/>
+          <a:ext cx="2160000" cy="3240000"/>
         </p:xfrm>
         <a:graphic>
           <a:graphicData uri="http://schemas.openxmlformats.org/drawingml/2006/table">
@@ -3487,6 +3487,606 @@
                         <a:defRPr sz="900"/>
                       </a:pPr>
                       <a:r>
+                        <a:t>Blanco / Azul Neón</a:t>
+                      </a:r>
+                    </a:p>
+                  </a:txBody>
+                  <a:tcPr>
+                    <a:solidFill>
+                      <a:srgbClr val="FFFFFF"/>
+                    </a:solidFill>
+                  </a:tcPr>
+                </a:tc>
+                <a:tc>
+                  <a:txBody>
+                    <a:bodyPr/>
+                    <a:lstStyle/>
+                    <a:p>
+                      <a:pPr>
+                        <a:defRPr sz="900"/>
+                      </a:pPr>
+                      <a:r>
+                        <a:t>545</a:t>
+                      </a:r>
+                    </a:p>
+                  </a:txBody>
+                  <a:tcPr>
+                    <a:solidFill>
+                      <a:srgbClr val="FFFFFF"/>
+                    </a:solidFill>
+                  </a:tcPr>
+                </a:tc>
+              </a:tr>
+              <a:tr h="180000">
+                <a:tc>
+                  <a:txBody>
+                    <a:bodyPr/>
+                    <a:lstStyle/>
+                    <a:p>
+                      <a:pPr>
+                        <a:defRPr sz="900"/>
+                      </a:pPr>
+                      <a:r>
+                        <a:t>Naranja Neón / Blanco</a:t>
+                      </a:r>
+                    </a:p>
+                  </a:txBody>
+                  <a:tcPr>
+                    <a:solidFill>
+                      <a:srgbClr val="FFFFFF"/>
+                    </a:solidFill>
+                  </a:tcPr>
+                </a:tc>
+                <a:tc>
+                  <a:txBody>
+                    <a:bodyPr/>
+                    <a:lstStyle/>
+                    <a:p>
+                      <a:pPr>
+                        <a:defRPr sz="900"/>
+                      </a:pPr>
+                      <a:r>
+                        <a:t>5747</a:t>
+                      </a:r>
+                    </a:p>
+                  </a:txBody>
+                  <a:tcPr>
+                    <a:solidFill>
+                      <a:srgbClr val="FFFFFF"/>
+                    </a:solidFill>
+                  </a:tcPr>
+                </a:tc>
+              </a:tr>
+              <a:tr h="180000">
+                <a:tc>
+                  <a:txBody>
+                    <a:bodyPr/>
+                    <a:lstStyle/>
+                    <a:p>
+                      <a:pPr>
+                        <a:defRPr sz="900"/>
+                      </a:pPr>
+                      <a:r>
+                        <a:t>Blanco / Rosado Neón</a:t>
+                      </a:r>
+                    </a:p>
+                  </a:txBody>
+                  <a:tcPr>
+                    <a:solidFill>
+                      <a:srgbClr val="FFFFFF"/>
+                    </a:solidFill>
+                  </a:tcPr>
+                </a:tc>
+                <a:tc>
+                  <a:txBody>
+                    <a:bodyPr/>
+                    <a:lstStyle/>
+                    <a:p>
+                      <a:pPr>
+                        <a:defRPr sz="900"/>
+                      </a:pPr>
+                      <a:r>
+                        <a:t>3398</a:t>
+                      </a:r>
+                    </a:p>
+                  </a:txBody>
+                  <a:tcPr>
+                    <a:solidFill>
+                      <a:srgbClr val="FFFFFF"/>
+                    </a:solidFill>
+                  </a:tcPr>
+                </a:tc>
+              </a:tr>
+              <a:tr h="180000">
+                <a:tc>
+                  <a:txBody>
+                    <a:bodyPr/>
+                    <a:lstStyle/>
+                    <a:p>
+                      <a:pPr>
+                        <a:defRPr sz="900"/>
+                      </a:pPr>
+                      <a:r>
+                        <a:t>Blanco / Verde Neón</a:t>
+                      </a:r>
+                    </a:p>
+                  </a:txBody>
+                  <a:tcPr>
+                    <a:solidFill>
+                      <a:srgbClr val="FFFFFF"/>
+                    </a:solidFill>
+                  </a:tcPr>
+                </a:tc>
+                <a:tc>
+                  <a:txBody>
+                    <a:bodyPr/>
+                    <a:lstStyle/>
+                    <a:p>
+                      <a:pPr>
+                        <a:defRPr sz="900"/>
+                      </a:pPr>
+                      <a:r>
+                        <a:t>4548</a:t>
+                      </a:r>
+                    </a:p>
+                  </a:txBody>
+                  <a:tcPr>
+                    <a:solidFill>
+                      <a:srgbClr val="FFFFFF"/>
+                    </a:solidFill>
+                  </a:tcPr>
+                </a:tc>
+              </a:tr>
+              <a:tr h="180000">
+                <a:tc>
+                  <a:txBody>
+                    <a:bodyPr/>
+                    <a:lstStyle/>
+                    <a:p>
+                      <a:pPr>
+                        <a:defRPr sz="900"/>
+                      </a:pPr>
+                      <a:r>
+                        <a:t>Blanco / Azul Oscuro</a:t>
+                      </a:r>
+                    </a:p>
+                  </a:txBody>
+                  <a:tcPr>
+                    <a:solidFill>
+                      <a:srgbClr val="FFFFFF"/>
+                    </a:solidFill>
+                  </a:tcPr>
+                </a:tc>
+                <a:tc>
+                  <a:txBody>
+                    <a:bodyPr/>
+                    <a:lstStyle/>
+                    <a:p>
+                      <a:pPr>
+                        <a:defRPr sz="900"/>
+                      </a:pPr>
+                      <a:r>
+                        <a:t>13406</a:t>
+                      </a:r>
+                    </a:p>
+                  </a:txBody>
+                  <a:tcPr>
+                    <a:solidFill>
+                      <a:srgbClr val="FFFFFF"/>
+                    </a:solidFill>
+                  </a:tcPr>
+                </a:tc>
+              </a:tr>
+              <a:tr h="180000">
+                <a:tc>
+                  <a:txBody>
+                    <a:bodyPr/>
+                    <a:lstStyle/>
+                    <a:p>
+                      <a:pPr>
+                        <a:defRPr sz="900"/>
+                      </a:pPr>
+                      <a:r>
+                        <a:t>Blanco / Azul Rey</a:t>
+                      </a:r>
+                    </a:p>
+                  </a:txBody>
+                  <a:tcPr>
+                    <a:solidFill>
+                      <a:srgbClr val="FFFFFF"/>
+                    </a:solidFill>
+                  </a:tcPr>
+                </a:tc>
+                <a:tc>
+                  <a:txBody>
+                    <a:bodyPr/>
+                    <a:lstStyle/>
+                    <a:p>
+                      <a:pPr>
+                        <a:defRPr sz="900"/>
+                      </a:pPr>
+                      <a:r>
+                        <a:t>9965</a:t>
+                      </a:r>
+                    </a:p>
+                  </a:txBody>
+                  <a:tcPr>
+                    <a:solidFill>
+                      <a:srgbClr val="FFFFFF"/>
+                    </a:solidFill>
+                  </a:tcPr>
+                </a:tc>
+              </a:tr>
+              <a:tr h="180000">
+                <a:tc>
+                  <a:txBody>
+                    <a:bodyPr/>
+                    <a:lstStyle/>
+                    <a:p>
+                      <a:pPr>
+                        <a:defRPr sz="900"/>
+                      </a:pPr>
+                      <a:r>
+                        <a:t>Blanco / Naranja</a:t>
+                      </a:r>
+                    </a:p>
+                  </a:txBody>
+                  <a:tcPr>
+                    <a:solidFill>
+                      <a:srgbClr val="FFFFFF"/>
+                    </a:solidFill>
+                  </a:tcPr>
+                </a:tc>
+                <a:tc>
+                  <a:txBody>
+                    <a:bodyPr/>
+                    <a:lstStyle/>
+                    <a:p>
+                      <a:pPr>
+                        <a:defRPr sz="900"/>
+                      </a:pPr>
+                      <a:r>
+                        <a:t>1420</a:t>
+                      </a:r>
+                    </a:p>
+                  </a:txBody>
+                  <a:tcPr>
+                    <a:solidFill>
+                      <a:srgbClr val="FFFFFF"/>
+                    </a:solidFill>
+                  </a:tcPr>
+                </a:tc>
+              </a:tr>
+              <a:tr h="180000">
+                <a:tc>
+                  <a:txBody>
+                    <a:bodyPr/>
+                    <a:lstStyle/>
+                    <a:p>
+                      <a:pPr>
+                        <a:defRPr sz="900"/>
+                      </a:pPr>
+                      <a:r>
+                        <a:t>Blanco / Negro</a:t>
+                      </a:r>
+                    </a:p>
+                  </a:txBody>
+                  <a:tcPr>
+                    <a:solidFill>
+                      <a:srgbClr val="FFFFFF"/>
+                    </a:solidFill>
+                  </a:tcPr>
+                </a:tc>
+                <a:tc>
+                  <a:txBody>
+                    <a:bodyPr/>
+                    <a:lstStyle/>
+                    <a:p>
+                      <a:pPr>
+                        <a:defRPr sz="900"/>
+                      </a:pPr>
+                      <a:r>
+                        <a:t>11398</a:t>
+                      </a:r>
+                    </a:p>
+                  </a:txBody>
+                  <a:tcPr>
+                    <a:solidFill>
+                      <a:srgbClr val="FFFFFF"/>
+                    </a:solidFill>
+                  </a:tcPr>
+                </a:tc>
+              </a:tr>
+              <a:tr h="180000">
+                <a:tc>
+                  <a:txBody>
+                    <a:bodyPr/>
+                    <a:lstStyle/>
+                    <a:p>
+                      <a:pPr>
+                        <a:defRPr sz="900"/>
+                      </a:pPr>
+                      <a:r>
+                        <a:t>Blanco / Rojo</a:t>
+                      </a:r>
+                    </a:p>
+                  </a:txBody>
+                  <a:tcPr>
+                    <a:solidFill>
+                      <a:srgbClr val="FFFFFF"/>
+                    </a:solidFill>
+                  </a:tcPr>
+                </a:tc>
+                <a:tc>
+                  <a:txBody>
+                    <a:bodyPr/>
+                    <a:lstStyle/>
+                    <a:p>
+                      <a:pPr>
+                        <a:defRPr sz="900"/>
+                      </a:pPr>
+                      <a:r>
+                        <a:t>13</a:t>
+                      </a:r>
+                    </a:p>
+                  </a:txBody>
+                  <a:tcPr>
+                    <a:solidFill>
+                      <a:srgbClr val="FFFFFF"/>
+                    </a:solidFill>
+                  </a:tcPr>
+                </a:tc>
+              </a:tr>
+              <a:tr h="180000">
+                <a:tc>
+                  <a:txBody>
+                    <a:bodyPr/>
+                    <a:lstStyle/>
+                    <a:p>
+                      <a:pPr>
+                        <a:defRPr sz="900"/>
+                      </a:pPr>
+                      <a:r>
+                        <a:t>Blanco / Verde</a:t>
+                      </a:r>
+                    </a:p>
+                  </a:txBody>
+                  <a:tcPr>
+                    <a:solidFill>
+                      <a:srgbClr val="FFFFFF"/>
+                    </a:solidFill>
+                  </a:tcPr>
+                </a:tc>
+                <a:tc>
+                  <a:txBody>
+                    <a:bodyPr/>
+                    <a:lstStyle/>
+                    <a:p>
+                      <a:pPr>
+                        <a:defRPr sz="900"/>
+                      </a:pPr>
+                      <a:r>
+                        <a:t>6035</a:t>
+                      </a:r>
+                    </a:p>
+                  </a:txBody>
+                  <a:tcPr>
+                    <a:solidFill>
+                      <a:srgbClr val="FFFFFF"/>
+                    </a:solidFill>
+                  </a:tcPr>
+                </a:tc>
+              </a:tr>
+              <a:tr h="180000">
+                <a:tc>
+                  <a:txBody>
+                    <a:bodyPr/>
+                    <a:lstStyle/>
+                    <a:p>
+                      <a:pPr>
+                        <a:defRPr sz="900"/>
+                      </a:pPr>
+                      <a:r>
+                        <a:t>Amarillo</a:t>
+                      </a:r>
+                    </a:p>
+                  </a:txBody>
+                  <a:tcPr>
+                    <a:solidFill>
+                      <a:srgbClr val="FFFFFF"/>
+                    </a:solidFill>
+                  </a:tcPr>
+                </a:tc>
+                <a:tc>
+                  <a:txBody>
+                    <a:bodyPr/>
+                    <a:lstStyle/>
+                    <a:p>
+                      <a:pPr>
+                        <a:defRPr sz="900"/>
+                      </a:pPr>
+                      <a:r>
+                        <a:t>50</a:t>
+                      </a:r>
+                    </a:p>
+                  </a:txBody>
+                  <a:tcPr>
+                    <a:solidFill>
+                      <a:srgbClr val="FFFFFF"/>
+                    </a:solidFill>
+                  </a:tcPr>
+                </a:tc>
+              </a:tr>
+              <a:tr h="180000">
+                <a:tc>
+                  <a:txBody>
+                    <a:bodyPr/>
+                    <a:lstStyle/>
+                    <a:p>
+                      <a:pPr>
+                        <a:defRPr sz="900"/>
+                      </a:pPr>
+                      <a:r>
+                        <a:t>Azul Rey</a:t>
+                      </a:r>
+                    </a:p>
+                  </a:txBody>
+                  <a:tcPr>
+                    <a:solidFill>
+                      <a:srgbClr val="FFFFFF"/>
+                    </a:solidFill>
+                  </a:tcPr>
+                </a:tc>
+                <a:tc>
+                  <a:txBody>
+                    <a:bodyPr/>
+                    <a:lstStyle/>
+                    <a:p>
+                      <a:pPr>
+                        <a:defRPr sz="900"/>
+                      </a:pPr>
+                      <a:r>
+                        <a:t>18596</a:t>
+                      </a:r>
+                    </a:p>
+                  </a:txBody>
+                  <a:tcPr>
+                    <a:solidFill>
+                      <a:srgbClr val="FFFFFF"/>
+                    </a:solidFill>
+                  </a:tcPr>
+                </a:tc>
+              </a:tr>
+              <a:tr h="180000">
+                <a:tc>
+                  <a:txBody>
+                    <a:bodyPr/>
+                    <a:lstStyle/>
+                    <a:p>
+                      <a:pPr>
+                        <a:defRPr sz="900"/>
+                      </a:pPr>
+                      <a:r>
+                        <a:t>Negro</a:t>
+                      </a:r>
+                    </a:p>
+                  </a:txBody>
+                  <a:tcPr>
+                    <a:solidFill>
+                      <a:srgbClr val="FFFFFF"/>
+                    </a:solidFill>
+                  </a:tcPr>
+                </a:tc>
+                <a:tc>
+                  <a:txBody>
+                    <a:bodyPr/>
+                    <a:lstStyle/>
+                    <a:p>
+                      <a:pPr>
+                        <a:defRPr sz="900"/>
+                      </a:pPr>
+                      <a:r>
+                        <a:t>1</a:t>
+                      </a:r>
+                    </a:p>
+                  </a:txBody>
+                  <a:tcPr>
+                    <a:solidFill>
+                      <a:srgbClr val="FFFFFF"/>
+                    </a:solidFill>
+                  </a:tcPr>
+                </a:tc>
+              </a:tr>
+              <a:tr h="180000">
+                <a:tc>
+                  <a:txBody>
+                    <a:bodyPr/>
+                    <a:lstStyle/>
+                    <a:p>
+                      <a:pPr>
+                        <a:defRPr sz="900"/>
+                      </a:pPr>
+                      <a:r>
+                        <a:t>Rojo</a:t>
+                      </a:r>
+                    </a:p>
+                  </a:txBody>
+                  <a:tcPr>
+                    <a:solidFill>
+                      <a:srgbClr val="FFFFFF"/>
+                    </a:solidFill>
+                  </a:tcPr>
+                </a:tc>
+                <a:tc>
+                  <a:txBody>
+                    <a:bodyPr/>
+                    <a:lstStyle/>
+                    <a:p>
+                      <a:pPr>
+                        <a:defRPr sz="900"/>
+                      </a:pPr>
+                      <a:r>
+                        <a:t>18975</a:t>
+                      </a:r>
+                    </a:p>
+                  </a:txBody>
+                  <a:tcPr>
+                    <a:solidFill>
+                      <a:srgbClr val="FFFFFF"/>
+                    </a:solidFill>
+                  </a:tcPr>
+                </a:tc>
+              </a:tr>
+              <a:tr h="180000">
+                <a:tc>
+                  <a:txBody>
+                    <a:bodyPr/>
+                    <a:lstStyle/>
+                    <a:p>
+                      <a:pPr>
+                        <a:defRPr sz="900"/>
+                      </a:pPr>
+                      <a:r>
+                        <a:t>Verde</a:t>
+                      </a:r>
+                    </a:p>
+                  </a:txBody>
+                  <a:tcPr>
+                    <a:solidFill>
+                      <a:srgbClr val="FFFFFF"/>
+                    </a:solidFill>
+                  </a:tcPr>
+                </a:tc>
+                <a:tc>
+                  <a:txBody>
+                    <a:bodyPr/>
+                    <a:lstStyle/>
+                    <a:p>
+                      <a:pPr>
+                        <a:defRPr sz="900"/>
+                      </a:pPr>
+                      <a:r>
+                        <a:t>5363</a:t>
+                      </a:r>
+                    </a:p>
+                  </a:txBody>
+                  <a:tcPr>
+                    <a:solidFill>
+                      <a:srgbClr val="FFFFFF"/>
+                    </a:solidFill>
+                  </a:tcPr>
+                </a:tc>
+              </a:tr>
+              <a:tr h="180000">
+                <a:tc>
+                  <a:txBody>
+                    <a:bodyPr/>
+                    <a:lstStyle/>
+                    <a:p>
+                      <a:pPr>
+                        <a:defRPr sz="900"/>
+                      </a:pPr>
+                      <a:r>
                         <a:t>Azul Oscuro</a:t>
                       </a:r>
                     </a:p>
@@ -3506,7 +4106,47 @@
                         <a:defRPr sz="900"/>
                       </a:pPr>
                       <a:r>
-                        <a:t>87</a:t>
+                        <a:t>12</a:t>
+                      </a:r>
+                    </a:p>
+                  </a:txBody>
+                  <a:tcPr>
+                    <a:solidFill>
+                      <a:srgbClr val="FFFFFF"/>
+                    </a:solidFill>
+                  </a:tcPr>
+                </a:tc>
+              </a:tr>
+              <a:tr h="180000">
+                <a:tc>
+                  <a:txBody>
+                    <a:bodyPr/>
+                    <a:lstStyle/>
+                    <a:p>
+                      <a:pPr>
+                        <a:defRPr sz="900"/>
+                      </a:pPr>
+                      <a:r>
+                        <a:t>Naranja</a:t>
+                      </a:r>
+                    </a:p>
+                  </a:txBody>
+                  <a:tcPr>
+                    <a:solidFill>
+                      <a:srgbClr val="FFFFFF"/>
+                    </a:solidFill>
+                  </a:tcPr>
+                </a:tc>
+                <a:tc>
+                  <a:txBody>
+                    <a:bodyPr/>
+                    <a:lstStyle/>
+                    <a:p>
+                      <a:pPr>
+                        <a:defRPr sz="900"/>
+                      </a:pPr>
+                      <a:r>
+                        <a:t>8546</a:t>
                       </a:r>
                     </a:p>
                   </a:txBody>

</xml_diff>

<commit_message>
add .env and cdopromo
</commit_message>
<xml_diff>
--- a/cotizaciones/cotización_Test1.pptx
+++ b/cotizaciones/cotización_Test1.pptx
@@ -6,8 +6,6 @@
   </p:sldMasterIdLst>
   <p:sldIdLst>
     <p:sldId id="256" r:id="rId6"/>
-    <p:sldId id="257" r:id="rId7"/>
-    <p:sldId id="258" r:id="rId8"/>
   </p:sldIdLst>
   <p:sldSz cx="6858000" cy="9144000" type="letter"/>
   <p:notesSz cx="6858000" cy="9144000"/>
@@ -3071,7 +3069,7 @@
               <a:defRPr sz="1400" b="0"/>
             </a:pPr>
             <a:r>
-              <a:t>Cot N°337</a:t>
+              <a:t>Cot N°362</a:t>
             </a:r>
           </a:p>
           <a:p>
@@ -3161,9 +3159,44 @@
           </a:p>
         </p:txBody>
       </p:sp>
+      <p:sp>
+        <p:nvSpPr>
+          <p:cNvPr id="6" name="TextBox 5"/>
+          <p:cNvSpPr txBox="1"/>
+          <p:nvPr/>
+        </p:nvSpPr>
+        <p:spPr>
+          <a:xfrm>
+            <a:off x="288000" y="1440000"/>
+            <a:ext cx="6263999" cy="360000"/>
+          </a:xfrm>
+          <a:prstGeom prst="rect">
+            <a:avLst/>
+          </a:prstGeom>
+          <a:noFill/>
+        </p:spPr>
+        <p:txBody>
+          <a:bodyPr wrap="none">
+            <a:spAutoFit/>
+          </a:bodyPr>
+          <a:lstStyle/>
+          <a:p/>
+          <a:p>
+            <a:pPr>
+              <a:spcBef>
+                <a:spcPts val="0"/>
+              </a:spcBef>
+              <a:defRPr sz="1200" b="1"/>
+            </a:pPr>
+            <a:r>
+              <a:t>1.GORRA DE POLYESTER G213</a:t>
+            </a:r>
+          </a:p>
+        </p:txBody>
+      </p:sp>
       <p:graphicFrame>
         <p:nvGraphicFramePr>
-          <p:cNvPr id="6" name="Table 5"/>
+          <p:cNvPr id="7" name="Table 6"/>
           <p:cNvGraphicFramePr>
             <a:graphicFrameLocks noGrp="1"/>
           </p:cNvGraphicFramePr>
@@ -3267,91 +3300,13 @@
       </p:graphicFrame>
       <p:sp>
         <p:nvSpPr>
-          <p:cNvPr id="7" name="TextBox 6"/>
-          <p:cNvSpPr txBox="1"/>
-          <p:nvPr/>
-        </p:nvSpPr>
-        <p:spPr>
-          <a:xfrm>
-            <a:off x="288000" y="1440000"/>
-            <a:ext cx="6263999" cy="360000"/>
-          </a:xfrm>
-          <a:prstGeom prst="rect">
-            <a:avLst/>
-          </a:prstGeom>
-          <a:noFill/>
-        </p:spPr>
-        <p:txBody>
-          <a:bodyPr wrap="none">
-            <a:spAutoFit/>
-          </a:bodyPr>
-          <a:lstStyle/>
-          <a:p/>
-          <a:p>
-            <a:pPr>
-              <a:spcBef>
-                <a:spcPts val="0"/>
-              </a:spcBef>
-              <a:defRPr sz="1200" b="1"/>
-            </a:pPr>
-            <a:r>
-              <a:t>1.ADVANT 3-1 STYLUS ADV-STY</a:t>
-            </a:r>
-          </a:p>
-        </p:txBody>
-      </p:sp>
-      <p:sp>
-        <p:nvSpPr>
           <p:cNvPr id="8" name="TextBox 7"/>
           <p:cNvSpPr txBox="1"/>
           <p:nvPr/>
         </p:nvSpPr>
         <p:spPr>
           <a:xfrm>
-            <a:off x="288000" y="2160000"/>
-            <a:ext cx="6263999" cy="1800000"/>
-          </a:xfrm>
-          <a:prstGeom prst="rect">
-            <a:avLst/>
-          </a:prstGeom>
-          <a:noFill/>
-        </p:spPr>
-        <p:txBody>
-          <a:bodyPr wrap="square">
-            <a:spAutoFit/>
-          </a:bodyPr>
-          <a:lstStyle/>
-          <a:p/>
-          <a:p>
-            <a:pPr>
-              <a:spcBef>
-                <a:spcPts val="0"/>
-              </a:spcBef>
-              <a:defRPr sz="1100" b="0"/>
-            </a:pPr>
-            <a:r>
-              <a:t>Bolígrafo plástico con stylus y resaltador de tinta.</a:t>
-            </a:r>
-            <a:br/>
-            <a:r>
-              <a:t>Medidas: 15 cm</a:t>
-            </a:r>
-            <a:br/>
-            <a:r>
-              <a:t>Marca: 4.5 cm / Tampografía</a:t>
-            </a:r>
-          </a:p>
-        </p:txBody>
-      </p:sp>
-      <p:sp>
-        <p:nvSpPr>
-          <p:cNvPr id="9" name="TextBox 8"/>
-          <p:cNvSpPr txBox="1"/>
-          <p:nvPr/>
-        </p:nvSpPr>
-        <p:spPr>
-          <a:xfrm>
-            <a:off x="288000" y="3240000"/>
+            <a:off x="288000" y="1620000"/>
             <a:ext cx="6263999" cy="720000"/>
           </a:xfrm>
           <a:prstGeom prst="rect">
@@ -3360,7 +3315,7 @@
           <a:noFill/>
         </p:spPr>
         <p:txBody>
-          <a:bodyPr wrap="none">
+          <a:bodyPr wrap="square">
             <a:spAutoFit/>
           </a:bodyPr>
           <a:lstStyle/>
@@ -3373,22 +3328,35 @@
               <a:defRPr sz="1100" b="1"/>
             </a:pPr>
             <a:r>
-              <a:t>Unidades por Caja: 1000   Unidades</a:t>
-            </a:r>
-          </a:p>
-          <a:p>
-            <a:pPr>
-              <a:spcBef>
-                <a:spcPts val="0"/>
-              </a:spcBef>
-              <a:defRPr sz="1100" b="1"/>
-            </a:pPr>
-            <a:r>
-              <a:t>Empaque: 60,0    X 33,0 X 24,0 / 16,0 Kg</a:t>
-            </a:r>
-          </a:p>
-        </p:txBody>
-      </p:sp>
+              <a:t>Gorra de 6 paneles con frente libre (sin costura). Cierre de velcro. Con visera "Sandwich".</a:t>
+            </a:r>
+          </a:p>
+        </p:txBody>
+      </p:sp>
+      <p:pic>
+        <p:nvPicPr>
+          <p:cNvPr id="9" name="Picture 8" descr="sample_image.jpg"/>
+          <p:cNvPicPr>
+            <a:picLocks noChangeAspect="1"/>
+          </p:cNvPicPr>
+          <p:nvPr/>
+        </p:nvPicPr>
+        <p:blipFill>
+          <a:blip r:embed="rId3"/>
+          <a:stretch>
+            <a:fillRect/>
+          </a:stretch>
+        </p:blipFill>
+        <p:spPr>
+          <a:xfrm>
+            <a:off x="3060000" y="5400000"/>
+            <a:ext cx="3564000" cy="2556000"/>
+          </a:xfrm>
+          <a:prstGeom prst="rect">
+            <a:avLst/>
+          </a:prstGeom>
+        </p:spPr>
+      </p:pic>
       <p:graphicFrame>
         <p:nvGraphicFramePr>
           <p:cNvPr id="10" name="Table 9"/>
@@ -3399,7 +3367,7 @@
         </p:nvGraphicFramePr>
         <p:xfrm>
           <a:off x="288000" y="5400000"/>
-          <a:ext cx="2160000" cy="540000"/>
+          <a:ext cx="2160000" cy="1080000"/>
         </p:xfrm>
         <a:graphic>
           <a:graphicData uri="http://schemas.openxmlformats.org/drawingml/2006/table">
@@ -3453,7 +3421,7 @@
                         <a:defRPr sz="900"/>
                       </a:pPr>
                       <a:r>
-                        <a:t>Azul Reflex</a:t>
+                        <a:t>Blanco</a:t>
                       </a:r>
                     </a:p>
                   </a:txBody>
@@ -3472,7 +3440,7 @@
                         <a:defRPr sz="900"/>
                       </a:pPr>
                       <a:r>
-                        <a:t>15935</a:t>
+                        <a:t>0</a:t>
                       </a:r>
                     </a:p>
                   </a:txBody>
@@ -3493,7 +3461,7 @@
                         <a:defRPr sz="900"/>
                       </a:pPr>
                       <a:r>
-                        <a:t>Azul Reflex</a:t>
+                        <a:t>Negro</a:t>
                       </a:r>
                     </a:p>
                   </a:txBody>
@@ -3512,482 +3480,7 @@
                         <a:defRPr sz="900"/>
                       </a:pPr>
                       <a:r>
-                        <a:t>15935</a:t>
-                      </a:r>
-                    </a:p>
-                  </a:txBody>
-                  <a:tcPr>
-                    <a:solidFill>
-                      <a:srgbClr val="FFFFFF"/>
-                    </a:solidFill>
-                  </a:tcPr>
-                </a:tc>
-              </a:tr>
-            </a:tbl>
-          </a:graphicData>
-        </a:graphic>
-      </p:graphicFrame>
-      <p:pic>
-        <p:nvPicPr>
-          <p:cNvPr id="11" name="Picture 10" descr="sample_image.jpg"/>
-          <p:cNvPicPr>
-            <a:picLocks noChangeAspect="1"/>
-          </p:cNvPicPr>
-          <p:nvPr/>
-        </p:nvPicPr>
-        <p:blipFill>
-          <a:blip r:embed="rId3"/>
-          <a:stretch>
-            <a:fillRect/>
-          </a:stretch>
-        </p:blipFill>
-        <p:spPr>
-          <a:xfrm>
-            <a:off x="3060000" y="5400000"/>
-            <a:ext cx="3564000" cy="2556000"/>
-          </a:xfrm>
-          <a:prstGeom prst="rect">
-            <a:avLst/>
-          </a:prstGeom>
-        </p:spPr>
-      </p:pic>
-    </p:spTree>
-  </p:cSld>
-  <p:clrMapOvr>
-    <a:masterClrMapping/>
-  </p:clrMapOvr>
-</p:sld>
-</file>
-
-<file path=ppt/slides/slide2.xml><?xml version="1.0" encoding="utf-8"?>
-<p:sld xmlns:a="http://schemas.openxmlformats.org/drawingml/2006/main" xmlns:p="http://schemas.openxmlformats.org/presentationml/2006/main" xmlns:r="http://schemas.openxmlformats.org/officeDocument/2006/relationships">
-  <p:cSld>
-    <p:spTree>
-      <p:nvGrpSpPr>
-        <p:cNvPr id="1" name=""/>
-        <p:cNvGrpSpPr/>
-        <p:nvPr/>
-      </p:nvGrpSpPr>
-      <p:grpSpPr/>
-      <p:pic>
-        <p:nvPicPr>
-          <p:cNvPr id="2" name="Picture 1" descr="logo.jpg"/>
-          <p:cNvPicPr>
-            <a:picLocks noChangeAspect="1"/>
-          </p:cNvPicPr>
-          <p:nvPr/>
-        </p:nvPicPr>
-        <p:blipFill>
-          <a:blip r:embed="rId2"/>
-          <a:stretch>
-            <a:fillRect/>
-          </a:stretch>
-        </p:blipFill>
-        <p:spPr>
-          <a:xfrm>
-            <a:off x="360000" y="180000"/>
-            <a:ext cx="3204000" cy="612000"/>
-          </a:xfrm>
-          <a:prstGeom prst="rect">
-            <a:avLst/>
-          </a:prstGeom>
-        </p:spPr>
-      </p:pic>
-      <p:sp>
-        <p:nvSpPr>
-          <p:cNvPr id="3" name="TextBox 2"/>
-          <p:cNvSpPr txBox="1"/>
-          <p:nvPr/>
-        </p:nvSpPr>
-        <p:spPr>
-          <a:xfrm>
-            <a:off x="2700000" y="8028000"/>
-            <a:ext cx="5040000" cy="1080000"/>
-          </a:xfrm>
-          <a:prstGeom prst="rect">
-            <a:avLst/>
-          </a:prstGeom>
-          <a:noFill/>
-        </p:spPr>
-        <p:txBody>
-          <a:bodyPr wrap="none">
-            <a:spAutoFit/>
-          </a:bodyPr>
-          <a:lstStyle/>
-          <a:p/>
-          <a:p>
-            <a:pPr>
-              <a:spcBef>
-                <a:spcPts val="0"/>
-              </a:spcBef>
-              <a:defRPr sz="1100" b="0"/>
-            </a:pPr>
-            <a:r>
-              <a:t>Calle 6 sur #50 - 30, Medellin</a:t>
-            </a:r>
-            <a:br/>
-            <a:r>
-              <a:t> 316 324 05 27 / (4) 322 3662 ext.106</a:t>
-            </a:r>
-            <a:br/>
-            <a:r>
-              <a:t> curibe@magicmedios.com</a:t>
-            </a:r>
-            <a:br/>
-            <a:r>
-              <a:t> www.magicmedios.com</a:t>
-            </a:r>
-          </a:p>
-        </p:txBody>
-      </p:sp>
-      <p:graphicFrame>
-        <p:nvGraphicFramePr>
-          <p:cNvPr id="4" name="Table 3"/>
-          <p:cNvGraphicFramePr>
-            <a:graphicFrameLocks noGrp="1"/>
-          </p:cNvGraphicFramePr>
-          <p:nvPr/>
-        </p:nvGraphicFramePr>
-        <p:xfrm>
-          <a:off x="1080000" y="4320000"/>
-          <a:ext cx="4500000" cy="540000"/>
-        </p:xfrm>
-        <a:graphic>
-          <a:graphicData uri="http://schemas.openxmlformats.org/drawingml/2006/table">
-            <a:tbl>
-              <a:tblPr firstRow="1">
-                <a:tableStyleId>{5C22544A-7EE6-4342-B048-85BDC9FD1C3A}</a:tableStyleId>
-              </a:tblPr>
-              <a:tblGrid>
-                <a:gridCol w="1080000"/>
-                <a:gridCol w="3420000"/>
-              </a:tblGrid>
-              <a:tr h="180000">
-                <a:tc>
-                  <a:txBody>
-                    <a:bodyPr/>
-                    <a:lstStyle/>
-                    <a:p>
-                      <a:r>
-                        <a:t>Cantidad (und)</a:t>
-                      </a:r>
-                    </a:p>
-                  </a:txBody>
-                  <a:tcPr/>
-                </a:tc>
-                <a:tc>
-                  <a:txBody>
-                    <a:bodyPr/>
-                    <a:lstStyle/>
-                    <a:p>
-                      <a:r>
-                        <a:t>Valor unitario</a:t>
-                      </a:r>
-                    </a:p>
-                  </a:txBody>
-                  <a:tcPr/>
-                </a:tc>
-              </a:tr>
-              <a:tr h="180000">
-                <a:tc>
-                  <a:txBody>
-                    <a:bodyPr/>
-                    <a:lstStyle/>
-                    <a:p/>
-                  </a:txBody>
-                  <a:tcPr>
-                    <a:solidFill>
-                      <a:srgbClr val="FFFFFF"/>
-                    </a:solidFill>
-                  </a:tcPr>
-                </a:tc>
-                <a:tc>
-                  <a:txBody>
-                    <a:bodyPr/>
-                    <a:lstStyle/>
-                    <a:p/>
-                  </a:txBody>
-                  <a:tcPr>
-                    <a:solidFill>
-                      <a:srgbClr val="FFFFFF"/>
-                    </a:solidFill>
-                  </a:tcPr>
-                </a:tc>
-              </a:tr>
-              <a:tr h="180000">
-                <a:tc>
-                  <a:txBody>
-                    <a:bodyPr/>
-                    <a:lstStyle/>
-                    <a:p/>
-                  </a:txBody>
-                  <a:tcPr>
-                    <a:solidFill>
-                      <a:srgbClr val="FFFFFF"/>
-                    </a:solidFill>
-                  </a:tcPr>
-                </a:tc>
-                <a:tc>
-                  <a:txBody>
-                    <a:bodyPr/>
-                    <a:lstStyle/>
-                    <a:p/>
-                  </a:txBody>
-                  <a:tcPr>
-                    <a:solidFill>
-                      <a:srgbClr val="FFFFFF"/>
-                    </a:solidFill>
-                  </a:tcPr>
-                </a:tc>
-              </a:tr>
-            </a:tbl>
-          </a:graphicData>
-        </a:graphic>
-      </p:graphicFrame>
-      <p:sp>
-        <p:nvSpPr>
-          <p:cNvPr id="5" name="TextBox 4"/>
-          <p:cNvSpPr txBox="1"/>
-          <p:nvPr/>
-        </p:nvSpPr>
-        <p:spPr>
-          <a:xfrm>
-            <a:off x="288000" y="1440000"/>
-            <a:ext cx="6263999" cy="360000"/>
-          </a:xfrm>
-          <a:prstGeom prst="rect">
-            <a:avLst/>
-          </a:prstGeom>
-          <a:noFill/>
-        </p:spPr>
-        <p:txBody>
-          <a:bodyPr wrap="none">
-            <a:spAutoFit/>
-          </a:bodyPr>
-          <a:lstStyle/>
-          <a:p/>
-          <a:p>
-            <a:pPr>
-              <a:spcBef>
-                <a:spcPts val="0"/>
-              </a:spcBef>
-              <a:defRPr sz="1200" b="1"/>
-            </a:pPr>
-            <a:r>
-              <a:t>2.GO0020 Gorra Hanna GO0020</a:t>
-            </a:r>
-          </a:p>
-        </p:txBody>
-      </p:sp>
-      <p:sp>
-        <p:nvSpPr>
-          <p:cNvPr id="6" name="TextBox 5"/>
-          <p:cNvSpPr txBox="1"/>
-          <p:nvPr/>
-        </p:nvSpPr>
-        <p:spPr>
-          <a:xfrm>
-            <a:off x="288000" y="1620000"/>
-            <a:ext cx="6263999" cy="720000"/>
-          </a:xfrm>
-          <a:prstGeom prst="rect">
-            <a:avLst/>
-          </a:prstGeom>
-          <a:noFill/>
-        </p:spPr>
-        <p:txBody>
-          <a:bodyPr wrap="square">
-            <a:spAutoFit/>
-          </a:bodyPr>
-          <a:lstStyle/>
-          <a:p/>
-          <a:p>
-            <a:pPr>
-              <a:spcBef>
-                <a:spcPts val="0"/>
-              </a:spcBef>
-              <a:defRPr sz="1100" b="1"/>
-            </a:pPr>
-            <a:r>
-              <a:t>Gorra de 5 paneles con frente fusionado y parte posterior en malla, visera indeformable 4 costuras, botón forrado, tafilete textil y cierre plástico.</a:t>
-            </a:r>
-          </a:p>
-        </p:txBody>
-      </p:sp>
-      <p:sp>
-        <p:nvSpPr>
-          <p:cNvPr id="7" name="TextBox 6"/>
-          <p:cNvSpPr txBox="1"/>
-          <p:nvPr/>
-        </p:nvSpPr>
-        <p:spPr>
-          <a:xfrm>
-            <a:off x="288000" y="2160000"/>
-            <a:ext cx="6263999" cy="1800000"/>
-          </a:xfrm>
-          <a:prstGeom prst="rect">
-            <a:avLst/>
-          </a:prstGeom>
-          <a:noFill/>
-        </p:spPr>
-        <p:txBody>
-          <a:bodyPr wrap="square">
-            <a:spAutoFit/>
-          </a:bodyPr>
-          <a:lstStyle/>
-          <a:p/>
-          <a:p>
-            <a:pPr>
-              <a:spcBef>
-                <a:spcPts val="0"/>
-              </a:spcBef>
-              <a:defRPr sz="1100" b="0"/>
-            </a:pPr>
-            <a:r>
-              <a:t>MATERIAL: Poliéster + Malla Nylon.</a:t>
-            </a:r>
-          </a:p>
-          <a:p>
-            <a:pPr>
-              <a:spcBef>
-                <a:spcPts val="0"/>
-              </a:spcBef>
-              <a:defRPr sz="1100" b="0"/>
-            </a:pPr>
-            <a:r>
-              <a:t>MEDIDAS: Circunferencia 55cm. Visera 18 x 12 cm.</a:t>
-            </a:r>
-          </a:p>
-          <a:p>
-            <a:pPr>
-              <a:spcBef>
-                <a:spcPts val="0"/>
-              </a:spcBef>
-              <a:defRPr sz="1100" b="0"/>
-            </a:pPr>
-            <a:r>
-              <a:t>ÁREA DE IMPRESIÓN APROXIMADA: Bordado: 5 x 5,5 cm. Sublimación: 13 x 8 cm.</a:t>
-            </a:r>
-          </a:p>
-          <a:p>
-            <a:pPr>
-              <a:spcBef>
-                <a:spcPts val="0"/>
-              </a:spcBef>
-              <a:defRPr sz="1100" b="0"/>
-            </a:pPr>
-            <a:r>
-              <a:t>MARCA: SE SUGIERE: Bordado. Sublimación en gorras con frente blanco.</a:t>
-            </a:r>
-          </a:p>
-          <a:p>
-            <a:pPr>
-              <a:spcBef>
-                <a:spcPts val="0"/>
-              </a:spcBef>
-              <a:defRPr sz="1100" b="0"/>
-            </a:pPr>
-            <a:r>
-              <a:t>EMPAQUE: 200 Unidades en caja máster de: 45 cm x 38 cm x 80 cm; Peso Bruto: 13,7 Kg; Peso Neto: 12 Kg</a:t>
-            </a:r>
-          </a:p>
-          <a:p>
-            <a:pPr>
-              <a:spcBef>
-                <a:spcPts val="0"/>
-              </a:spcBef>
-              <a:defRPr sz="1100" b="0"/>
-            </a:pPr>
-            <a:r>
-              <a:t>INVENTARIO: 108.018 unidades</a:t>
-            </a:r>
-          </a:p>
-        </p:txBody>
-      </p:sp>
-      <p:graphicFrame>
-        <p:nvGraphicFramePr>
-          <p:cNvPr id="8" name="Table 7"/>
-          <p:cNvGraphicFramePr>
-            <a:graphicFrameLocks noGrp="1"/>
-          </p:cNvGraphicFramePr>
-          <p:nvPr/>
-        </p:nvGraphicFramePr>
-        <p:xfrm>
-          <a:off x="288000" y="5400000"/>
-          <a:ext cx="2160000" cy="3240000"/>
-        </p:xfrm>
-        <a:graphic>
-          <a:graphicData uri="http://schemas.openxmlformats.org/drawingml/2006/table">
-            <a:tbl>
-              <a:tblPr>
-                <a:tableStyleId>{5C22544A-7EE6-4342-B048-85BDC9FD1C3A}</a:tableStyleId>
-              </a:tblPr>
-              <a:tblGrid>
-                <a:gridCol w="1368000"/>
-                <a:gridCol w="792000"/>
-              </a:tblGrid>
-              <a:tr h="180000">
-                <a:tc>
-                  <a:txBody>
-                    <a:bodyPr/>
-                    <a:lstStyle/>
-                    <a:p>
-                      <a:pPr>
-                        <a:defRPr sz="900"/>
-                      </a:pPr>
-                      <a:r>
-                        <a:t>Color</a:t>
-                      </a:r>
-                    </a:p>
-                  </a:txBody>
-                  <a:tcPr/>
-                </a:tc>
-                <a:tc>
-                  <a:txBody>
-                    <a:bodyPr/>
-                    <a:lstStyle/>
-                    <a:p>
-                      <a:pPr>
-                        <a:defRPr sz="900"/>
-                      </a:pPr>
-                      <a:r>
-                        <a:t>Inventario</a:t>
-                      </a:r>
-                    </a:p>
-                  </a:txBody>
-                  <a:tcPr/>
-                </a:tc>
-              </a:tr>
-              <a:tr h="180000">
-                <a:tc>
-                  <a:txBody>
-                    <a:bodyPr/>
-                    <a:lstStyle/>
-                    <a:p>
-                      <a:pPr>
-                        <a:defRPr sz="900"/>
-                      </a:pPr>
-                      <a:r>
-                        <a:t>Blanco / Azul Neón</a:t>
-                      </a:r>
-                    </a:p>
-                  </a:txBody>
-                  <a:tcPr>
-                    <a:solidFill>
-                      <a:srgbClr val="FFFFFF"/>
-                    </a:solidFill>
-                  </a:tcPr>
-                </a:tc>
-                <a:tc>
-                  <a:txBody>
-                    <a:bodyPr/>
-                    <a:lstStyle/>
-                    <a:p>
-                      <a:pPr>
-                        <a:defRPr sz="900"/>
-                      </a:pPr>
-                      <a:r>
-                        <a:t>545</a:t>
+                        <a:t>2</a:t>
                       </a:r>
                     </a:p>
                   </a:txBody>
@@ -4008,7 +3501,7 @@
                         <a:defRPr sz="900"/>
                       </a:pPr>
                       <a:r>
-                        <a:t>Blanco / Azul Neón</a:t>
+                        <a:t>Verde</a:t>
                       </a:r>
                     </a:p>
                   </a:txBody>
@@ -4027,7 +3520,7 @@
                         <a:defRPr sz="900"/>
                       </a:pPr>
                       <a:r>
-                        <a:t>545</a:t>
+                        <a:t>2</a:t>
                       </a:r>
                     </a:p>
                   </a:txBody>
@@ -4048,7 +3541,7 @@
                         <a:defRPr sz="900"/>
                       </a:pPr>
                       <a:r>
-                        <a:t>Blanco / Azul Neón</a:t>
+                        <a:t>Azul</a:t>
                       </a:r>
                     </a:p>
                   </a:txBody>
@@ -4067,7 +3560,7 @@
                         <a:defRPr sz="900"/>
                       </a:pPr>
                       <a:r>
-                        <a:t>545</a:t>
+                        <a:t>0</a:t>
                       </a:r>
                     </a:p>
                   </a:txBody>
@@ -4088,7 +3581,7 @@
                         <a:defRPr sz="900"/>
                       </a:pPr>
                       <a:r>
-                        <a:t>Blanco / Azul Neón</a:t>
+                        <a:t>Rojo</a:t>
                       </a:r>
                     </a:p>
                   </a:txBody>
@@ -4107,527 +3600,7 @@
                         <a:defRPr sz="900"/>
                       </a:pPr>
                       <a:r>
-                        <a:t>545</a:t>
-                      </a:r>
-                    </a:p>
-                  </a:txBody>
-                  <a:tcPr>
-                    <a:solidFill>
-                      <a:srgbClr val="FFFFFF"/>
-                    </a:solidFill>
-                  </a:tcPr>
-                </a:tc>
-              </a:tr>
-              <a:tr h="180000">
-                <a:tc>
-                  <a:txBody>
-                    <a:bodyPr/>
-                    <a:lstStyle/>
-                    <a:p>
-                      <a:pPr>
-                        <a:defRPr sz="900"/>
-                      </a:pPr>
-                      <a:r>
-                        <a:t>Blanco / Azul Neón</a:t>
-                      </a:r>
-                    </a:p>
-                  </a:txBody>
-                  <a:tcPr>
-                    <a:solidFill>
-                      <a:srgbClr val="FFFFFF"/>
-                    </a:solidFill>
-                  </a:tcPr>
-                </a:tc>
-                <a:tc>
-                  <a:txBody>
-                    <a:bodyPr/>
-                    <a:lstStyle/>
-                    <a:p>
-                      <a:pPr>
-                        <a:defRPr sz="900"/>
-                      </a:pPr>
-                      <a:r>
-                        <a:t>545</a:t>
-                      </a:r>
-                    </a:p>
-                  </a:txBody>
-                  <a:tcPr>
-                    <a:solidFill>
-                      <a:srgbClr val="FFFFFF"/>
-                    </a:solidFill>
-                  </a:tcPr>
-                </a:tc>
-              </a:tr>
-              <a:tr h="180000">
-                <a:tc>
-                  <a:txBody>
-                    <a:bodyPr/>
-                    <a:lstStyle/>
-                    <a:p>
-                      <a:pPr>
-                        <a:defRPr sz="900"/>
-                      </a:pPr>
-                      <a:r>
-                        <a:t>Blanco / Azul Neón</a:t>
-                      </a:r>
-                    </a:p>
-                  </a:txBody>
-                  <a:tcPr>
-                    <a:solidFill>
-                      <a:srgbClr val="FFFFFF"/>
-                    </a:solidFill>
-                  </a:tcPr>
-                </a:tc>
-                <a:tc>
-                  <a:txBody>
-                    <a:bodyPr/>
-                    <a:lstStyle/>
-                    <a:p>
-                      <a:pPr>
-                        <a:defRPr sz="900"/>
-                      </a:pPr>
-                      <a:r>
-                        <a:t>545</a:t>
-                      </a:r>
-                    </a:p>
-                  </a:txBody>
-                  <a:tcPr>
-                    <a:solidFill>
-                      <a:srgbClr val="FFFFFF"/>
-                    </a:solidFill>
-                  </a:tcPr>
-                </a:tc>
-              </a:tr>
-              <a:tr h="180000">
-                <a:tc>
-                  <a:txBody>
-                    <a:bodyPr/>
-                    <a:lstStyle/>
-                    <a:p>
-                      <a:pPr>
-                        <a:defRPr sz="900"/>
-                      </a:pPr>
-                      <a:r>
-                        <a:t>Blanco / Azul Neón</a:t>
-                      </a:r>
-                    </a:p>
-                  </a:txBody>
-                  <a:tcPr>
-                    <a:solidFill>
-                      <a:srgbClr val="FFFFFF"/>
-                    </a:solidFill>
-                  </a:tcPr>
-                </a:tc>
-                <a:tc>
-                  <a:txBody>
-                    <a:bodyPr/>
-                    <a:lstStyle/>
-                    <a:p>
-                      <a:pPr>
-                        <a:defRPr sz="900"/>
-                      </a:pPr>
-                      <a:r>
-                        <a:t>545</a:t>
-                      </a:r>
-                    </a:p>
-                  </a:txBody>
-                  <a:tcPr>
-                    <a:solidFill>
-                      <a:srgbClr val="FFFFFF"/>
-                    </a:solidFill>
-                  </a:tcPr>
-                </a:tc>
-              </a:tr>
-              <a:tr h="180000">
-                <a:tc>
-                  <a:txBody>
-                    <a:bodyPr/>
-                    <a:lstStyle/>
-                    <a:p>
-                      <a:pPr>
-                        <a:defRPr sz="900"/>
-                      </a:pPr>
-                      <a:r>
-                        <a:t>Blanco / Azul Neón</a:t>
-                      </a:r>
-                    </a:p>
-                  </a:txBody>
-                  <a:tcPr>
-                    <a:solidFill>
-                      <a:srgbClr val="FFFFFF"/>
-                    </a:solidFill>
-                  </a:tcPr>
-                </a:tc>
-                <a:tc>
-                  <a:txBody>
-                    <a:bodyPr/>
-                    <a:lstStyle/>
-                    <a:p>
-                      <a:pPr>
-                        <a:defRPr sz="900"/>
-                      </a:pPr>
-                      <a:r>
-                        <a:t>545</a:t>
-                      </a:r>
-                    </a:p>
-                  </a:txBody>
-                  <a:tcPr>
-                    <a:solidFill>
-                      <a:srgbClr val="FFFFFF"/>
-                    </a:solidFill>
-                  </a:tcPr>
-                </a:tc>
-              </a:tr>
-              <a:tr h="180000">
-                <a:tc>
-                  <a:txBody>
-                    <a:bodyPr/>
-                    <a:lstStyle/>
-                    <a:p>
-                      <a:pPr>
-                        <a:defRPr sz="900"/>
-                      </a:pPr>
-                      <a:r>
-                        <a:t>Blanco / Azul Neón</a:t>
-                      </a:r>
-                    </a:p>
-                  </a:txBody>
-                  <a:tcPr>
-                    <a:solidFill>
-                      <a:srgbClr val="FFFFFF"/>
-                    </a:solidFill>
-                  </a:tcPr>
-                </a:tc>
-                <a:tc>
-                  <a:txBody>
-                    <a:bodyPr/>
-                    <a:lstStyle/>
-                    <a:p>
-                      <a:pPr>
-                        <a:defRPr sz="900"/>
-                      </a:pPr>
-                      <a:r>
-                        <a:t>545</a:t>
-                      </a:r>
-                    </a:p>
-                  </a:txBody>
-                  <a:tcPr>
-                    <a:solidFill>
-                      <a:srgbClr val="FFFFFF"/>
-                    </a:solidFill>
-                  </a:tcPr>
-                </a:tc>
-              </a:tr>
-              <a:tr h="180000">
-                <a:tc>
-                  <a:txBody>
-                    <a:bodyPr/>
-                    <a:lstStyle/>
-                    <a:p>
-                      <a:pPr>
-                        <a:defRPr sz="900"/>
-                      </a:pPr>
-                      <a:r>
-                        <a:t>Blanco / Azul Neón</a:t>
-                      </a:r>
-                    </a:p>
-                  </a:txBody>
-                  <a:tcPr>
-                    <a:solidFill>
-                      <a:srgbClr val="FFFFFF"/>
-                    </a:solidFill>
-                  </a:tcPr>
-                </a:tc>
-                <a:tc>
-                  <a:txBody>
-                    <a:bodyPr/>
-                    <a:lstStyle/>
-                    <a:p>
-                      <a:pPr>
-                        <a:defRPr sz="900"/>
-                      </a:pPr>
-                      <a:r>
-                        <a:t>545</a:t>
-                      </a:r>
-                    </a:p>
-                  </a:txBody>
-                  <a:tcPr>
-                    <a:solidFill>
-                      <a:srgbClr val="FFFFFF"/>
-                    </a:solidFill>
-                  </a:tcPr>
-                </a:tc>
-              </a:tr>
-              <a:tr h="180000">
-                <a:tc>
-                  <a:txBody>
-                    <a:bodyPr/>
-                    <a:lstStyle/>
-                    <a:p>
-                      <a:pPr>
-                        <a:defRPr sz="900"/>
-                      </a:pPr>
-                      <a:r>
-                        <a:t>Blanco / Azul Neón</a:t>
-                      </a:r>
-                    </a:p>
-                  </a:txBody>
-                  <a:tcPr>
-                    <a:solidFill>
-                      <a:srgbClr val="FFFFFF"/>
-                    </a:solidFill>
-                  </a:tcPr>
-                </a:tc>
-                <a:tc>
-                  <a:txBody>
-                    <a:bodyPr/>
-                    <a:lstStyle/>
-                    <a:p>
-                      <a:pPr>
-                        <a:defRPr sz="900"/>
-                      </a:pPr>
-                      <a:r>
-                        <a:t>545</a:t>
-                      </a:r>
-                    </a:p>
-                  </a:txBody>
-                  <a:tcPr>
-                    <a:solidFill>
-                      <a:srgbClr val="FFFFFF"/>
-                    </a:solidFill>
-                  </a:tcPr>
-                </a:tc>
-              </a:tr>
-              <a:tr h="180000">
-                <a:tc>
-                  <a:txBody>
-                    <a:bodyPr/>
-                    <a:lstStyle/>
-                    <a:p>
-                      <a:pPr>
-                        <a:defRPr sz="900"/>
-                      </a:pPr>
-                      <a:r>
-                        <a:t>Blanco / Azul Neón</a:t>
-                      </a:r>
-                    </a:p>
-                  </a:txBody>
-                  <a:tcPr>
-                    <a:solidFill>
-                      <a:srgbClr val="FFFFFF"/>
-                    </a:solidFill>
-                  </a:tcPr>
-                </a:tc>
-                <a:tc>
-                  <a:txBody>
-                    <a:bodyPr/>
-                    <a:lstStyle/>
-                    <a:p>
-                      <a:pPr>
-                        <a:defRPr sz="900"/>
-                      </a:pPr>
-                      <a:r>
-                        <a:t>545</a:t>
-                      </a:r>
-                    </a:p>
-                  </a:txBody>
-                  <a:tcPr>
-                    <a:solidFill>
-                      <a:srgbClr val="FFFFFF"/>
-                    </a:solidFill>
-                  </a:tcPr>
-                </a:tc>
-              </a:tr>
-              <a:tr h="180000">
-                <a:tc>
-                  <a:txBody>
-                    <a:bodyPr/>
-                    <a:lstStyle/>
-                    <a:p>
-                      <a:pPr>
-                        <a:defRPr sz="900"/>
-                      </a:pPr>
-                      <a:r>
-                        <a:t>Blanco / Azul Neón</a:t>
-                      </a:r>
-                    </a:p>
-                  </a:txBody>
-                  <a:tcPr>
-                    <a:solidFill>
-                      <a:srgbClr val="FFFFFF"/>
-                    </a:solidFill>
-                  </a:tcPr>
-                </a:tc>
-                <a:tc>
-                  <a:txBody>
-                    <a:bodyPr/>
-                    <a:lstStyle/>
-                    <a:p>
-                      <a:pPr>
-                        <a:defRPr sz="900"/>
-                      </a:pPr>
-                      <a:r>
-                        <a:t>545</a:t>
-                      </a:r>
-                    </a:p>
-                  </a:txBody>
-                  <a:tcPr>
-                    <a:solidFill>
-                      <a:srgbClr val="FFFFFF"/>
-                    </a:solidFill>
-                  </a:tcPr>
-                </a:tc>
-              </a:tr>
-              <a:tr h="180000">
-                <a:tc>
-                  <a:txBody>
-                    <a:bodyPr/>
-                    <a:lstStyle/>
-                    <a:p>
-                      <a:pPr>
-                        <a:defRPr sz="900"/>
-                      </a:pPr>
-                      <a:r>
-                        <a:t>Blanco / Azul Neón</a:t>
-                      </a:r>
-                    </a:p>
-                  </a:txBody>
-                  <a:tcPr>
-                    <a:solidFill>
-                      <a:srgbClr val="FFFFFF"/>
-                    </a:solidFill>
-                  </a:tcPr>
-                </a:tc>
-                <a:tc>
-                  <a:txBody>
-                    <a:bodyPr/>
-                    <a:lstStyle/>
-                    <a:p>
-                      <a:pPr>
-                        <a:defRPr sz="900"/>
-                      </a:pPr>
-                      <a:r>
-                        <a:t>545</a:t>
-                      </a:r>
-                    </a:p>
-                  </a:txBody>
-                  <a:tcPr>
-                    <a:solidFill>
-                      <a:srgbClr val="FFFFFF"/>
-                    </a:solidFill>
-                  </a:tcPr>
-                </a:tc>
-              </a:tr>
-              <a:tr h="180000">
-                <a:tc>
-                  <a:txBody>
-                    <a:bodyPr/>
-                    <a:lstStyle/>
-                    <a:p>
-                      <a:pPr>
-                        <a:defRPr sz="900"/>
-                      </a:pPr>
-                      <a:r>
-                        <a:t>Blanco / Azul Neón</a:t>
-                      </a:r>
-                    </a:p>
-                  </a:txBody>
-                  <a:tcPr>
-                    <a:solidFill>
-                      <a:srgbClr val="FFFFFF"/>
-                    </a:solidFill>
-                  </a:tcPr>
-                </a:tc>
-                <a:tc>
-                  <a:txBody>
-                    <a:bodyPr/>
-                    <a:lstStyle/>
-                    <a:p>
-                      <a:pPr>
-                        <a:defRPr sz="900"/>
-                      </a:pPr>
-                      <a:r>
-                        <a:t>545</a:t>
-                      </a:r>
-                    </a:p>
-                  </a:txBody>
-                  <a:tcPr>
-                    <a:solidFill>
-                      <a:srgbClr val="FFFFFF"/>
-                    </a:solidFill>
-                  </a:tcPr>
-                </a:tc>
-              </a:tr>
-              <a:tr h="180000">
-                <a:tc>
-                  <a:txBody>
-                    <a:bodyPr/>
-                    <a:lstStyle/>
-                    <a:p>
-                      <a:pPr>
-                        <a:defRPr sz="900"/>
-                      </a:pPr>
-                      <a:r>
-                        <a:t>Blanco / Azul Neón</a:t>
-                      </a:r>
-                    </a:p>
-                  </a:txBody>
-                  <a:tcPr>
-                    <a:solidFill>
-                      <a:srgbClr val="FFFFFF"/>
-                    </a:solidFill>
-                  </a:tcPr>
-                </a:tc>
-                <a:tc>
-                  <a:txBody>
-                    <a:bodyPr/>
-                    <a:lstStyle/>
-                    <a:p>
-                      <a:pPr>
-                        <a:defRPr sz="900"/>
-                      </a:pPr>
-                      <a:r>
-                        <a:t>545</a:t>
-                      </a:r>
-                    </a:p>
-                  </a:txBody>
-                  <a:tcPr>
-                    <a:solidFill>
-                      <a:srgbClr val="FFFFFF"/>
-                    </a:solidFill>
-                  </a:tcPr>
-                </a:tc>
-              </a:tr>
-              <a:tr h="180000">
-                <a:tc>
-                  <a:txBody>
-                    <a:bodyPr/>
-                    <a:lstStyle/>
-                    <a:p>
-                      <a:pPr>
-                        <a:defRPr sz="900"/>
-                      </a:pPr>
-                      <a:r>
-                        <a:t>Blanco / Azul Neón</a:t>
-                      </a:r>
-                    </a:p>
-                  </a:txBody>
-                  <a:tcPr>
-                    <a:solidFill>
-                      <a:srgbClr val="FFFFFF"/>
-                    </a:solidFill>
-                  </a:tcPr>
-                </a:tc>
-                <a:tc>
-                  <a:txBody>
-                    <a:bodyPr/>
-                    <a:lstStyle/>
-                    <a:p>
-                      <a:pPr>
-                        <a:defRPr sz="900"/>
-                      </a:pPr>
-                      <a:r>
-                        <a:t>545</a:t>
+                        <a:t>2</a:t>
                       </a:r>
                     </a:p>
                   </a:txBody>
@@ -4642,514 +3615,6 @@
           </a:graphicData>
         </a:graphic>
       </p:graphicFrame>
-      <p:pic>
-        <p:nvPicPr>
-          <p:cNvPr id="9" name="Picture 8" descr="sample_image.jpg"/>
-          <p:cNvPicPr>
-            <a:picLocks noChangeAspect="1"/>
-          </p:cNvPicPr>
-          <p:nvPr/>
-        </p:nvPicPr>
-        <p:blipFill>
-          <a:blip r:embed="rId3"/>
-          <a:stretch>
-            <a:fillRect/>
-          </a:stretch>
-        </p:blipFill>
-        <p:spPr>
-          <a:xfrm>
-            <a:off x="3060000" y="5400000"/>
-            <a:ext cx="3564000" cy="2556000"/>
-          </a:xfrm>
-          <a:prstGeom prst="rect">
-            <a:avLst/>
-          </a:prstGeom>
-        </p:spPr>
-      </p:pic>
-    </p:spTree>
-  </p:cSld>
-  <p:clrMapOvr>
-    <a:masterClrMapping/>
-  </p:clrMapOvr>
-</p:sld>
-</file>
-
-<file path=ppt/slides/slide3.xml><?xml version="1.0" encoding="utf-8"?>
-<p:sld xmlns:a="http://schemas.openxmlformats.org/drawingml/2006/main" xmlns:p="http://schemas.openxmlformats.org/presentationml/2006/main" xmlns:r="http://schemas.openxmlformats.org/officeDocument/2006/relationships">
-  <p:cSld>
-    <p:spTree>
-      <p:nvGrpSpPr>
-        <p:cNvPr id="1" name=""/>
-        <p:cNvGrpSpPr/>
-        <p:nvPr/>
-      </p:nvGrpSpPr>
-      <p:grpSpPr/>
-      <p:pic>
-        <p:nvPicPr>
-          <p:cNvPr id="2" name="Picture 1" descr="logo.jpg"/>
-          <p:cNvPicPr>
-            <a:picLocks noChangeAspect="1"/>
-          </p:cNvPicPr>
-          <p:nvPr/>
-        </p:nvPicPr>
-        <p:blipFill>
-          <a:blip r:embed="rId2"/>
-          <a:stretch>
-            <a:fillRect/>
-          </a:stretch>
-        </p:blipFill>
-        <p:spPr>
-          <a:xfrm>
-            <a:off x="360000" y="180000"/>
-            <a:ext cx="3204000" cy="612000"/>
-          </a:xfrm>
-          <a:prstGeom prst="rect">
-            <a:avLst/>
-          </a:prstGeom>
-        </p:spPr>
-      </p:pic>
-      <p:sp>
-        <p:nvSpPr>
-          <p:cNvPr id="3" name="TextBox 2"/>
-          <p:cNvSpPr txBox="1"/>
-          <p:nvPr/>
-        </p:nvSpPr>
-        <p:spPr>
-          <a:xfrm>
-            <a:off x="2700000" y="8028000"/>
-            <a:ext cx="5040000" cy="1080000"/>
-          </a:xfrm>
-          <a:prstGeom prst="rect">
-            <a:avLst/>
-          </a:prstGeom>
-          <a:noFill/>
-        </p:spPr>
-        <p:txBody>
-          <a:bodyPr wrap="none">
-            <a:spAutoFit/>
-          </a:bodyPr>
-          <a:lstStyle/>
-          <a:p/>
-          <a:p>
-            <a:pPr>
-              <a:spcBef>
-                <a:spcPts val="0"/>
-              </a:spcBef>
-              <a:defRPr sz="1100" b="0"/>
-            </a:pPr>
-            <a:r>
-              <a:t>Calle 6 sur #50 - 30, Medellin</a:t>
-            </a:r>
-            <a:br/>
-            <a:r>
-              <a:t> 316 324 05 27 / (4) 322 3662 ext.106</a:t>
-            </a:r>
-            <a:br/>
-            <a:r>
-              <a:t> curibe@magicmedios.com</a:t>
-            </a:r>
-            <a:br/>
-            <a:r>
-              <a:t> www.magicmedios.com</a:t>
-            </a:r>
-          </a:p>
-        </p:txBody>
-      </p:sp>
-      <p:graphicFrame>
-        <p:nvGraphicFramePr>
-          <p:cNvPr id="4" name="Table 3"/>
-          <p:cNvGraphicFramePr>
-            <a:graphicFrameLocks noGrp="1"/>
-          </p:cNvGraphicFramePr>
-          <p:nvPr/>
-        </p:nvGraphicFramePr>
-        <p:xfrm>
-          <a:off x="1080000" y="4320000"/>
-          <a:ext cx="4500000" cy="540000"/>
-        </p:xfrm>
-        <a:graphic>
-          <a:graphicData uri="http://schemas.openxmlformats.org/drawingml/2006/table">
-            <a:tbl>
-              <a:tblPr firstRow="1">
-                <a:tableStyleId>{5C22544A-7EE6-4342-B048-85BDC9FD1C3A}</a:tableStyleId>
-              </a:tblPr>
-              <a:tblGrid>
-                <a:gridCol w="1080000"/>
-                <a:gridCol w="3420000"/>
-              </a:tblGrid>
-              <a:tr h="180000">
-                <a:tc>
-                  <a:txBody>
-                    <a:bodyPr/>
-                    <a:lstStyle/>
-                    <a:p>
-                      <a:r>
-                        <a:t>Cantidad (und)</a:t>
-                      </a:r>
-                    </a:p>
-                  </a:txBody>
-                  <a:tcPr/>
-                </a:tc>
-                <a:tc>
-                  <a:txBody>
-                    <a:bodyPr/>
-                    <a:lstStyle/>
-                    <a:p>
-                      <a:r>
-                        <a:t>Valor unitario</a:t>
-                      </a:r>
-                    </a:p>
-                  </a:txBody>
-                  <a:tcPr/>
-                </a:tc>
-              </a:tr>
-              <a:tr h="180000">
-                <a:tc>
-                  <a:txBody>
-                    <a:bodyPr/>
-                    <a:lstStyle/>
-                    <a:p/>
-                  </a:txBody>
-                  <a:tcPr>
-                    <a:solidFill>
-                      <a:srgbClr val="FFFFFF"/>
-                    </a:solidFill>
-                  </a:tcPr>
-                </a:tc>
-                <a:tc>
-                  <a:txBody>
-                    <a:bodyPr/>
-                    <a:lstStyle/>
-                    <a:p/>
-                  </a:txBody>
-                  <a:tcPr>
-                    <a:solidFill>
-                      <a:srgbClr val="FFFFFF"/>
-                    </a:solidFill>
-                  </a:tcPr>
-                </a:tc>
-              </a:tr>
-              <a:tr h="180000">
-                <a:tc>
-                  <a:txBody>
-                    <a:bodyPr/>
-                    <a:lstStyle/>
-                    <a:p/>
-                  </a:txBody>
-                  <a:tcPr>
-                    <a:solidFill>
-                      <a:srgbClr val="FFFFFF"/>
-                    </a:solidFill>
-                  </a:tcPr>
-                </a:tc>
-                <a:tc>
-                  <a:txBody>
-                    <a:bodyPr/>
-                    <a:lstStyle/>
-                    <a:p/>
-                  </a:txBody>
-                  <a:tcPr>
-                    <a:solidFill>
-                      <a:srgbClr val="FFFFFF"/>
-                    </a:solidFill>
-                  </a:tcPr>
-                </a:tc>
-              </a:tr>
-            </a:tbl>
-          </a:graphicData>
-        </a:graphic>
-      </p:graphicFrame>
-      <p:sp>
-        <p:nvSpPr>
-          <p:cNvPr id="5" name="TextBox 4"/>
-          <p:cNvSpPr txBox="1"/>
-          <p:nvPr/>
-        </p:nvSpPr>
-        <p:spPr>
-          <a:xfrm>
-            <a:off x="288000" y="1440000"/>
-            <a:ext cx="6263999" cy="360000"/>
-          </a:xfrm>
-          <a:prstGeom prst="rect">
-            <a:avLst/>
-          </a:prstGeom>
-          <a:noFill/>
-        </p:spPr>
-        <p:txBody>
-          <a:bodyPr wrap="none">
-            <a:spAutoFit/>
-          </a:bodyPr>
-          <a:lstStyle/>
-          <a:p/>
-          <a:p>
-            <a:pPr>
-              <a:spcBef>
-                <a:spcPts val="0"/>
-              </a:spcBef>
-              <a:defRPr sz="1200" b="1"/>
-            </a:pPr>
-            <a:r>
-              <a:t>3.AGENDA DIARIA TERRA 2022 AZUL REY AGTC 022 AR</a:t>
-            </a:r>
-          </a:p>
-        </p:txBody>
-      </p:sp>
-      <p:sp>
-        <p:nvSpPr>
-          <p:cNvPr id="6" name="TextBox 5"/>
-          <p:cNvSpPr txBox="1"/>
-          <p:nvPr/>
-        </p:nvSpPr>
-        <p:spPr>
-          <a:xfrm>
-            <a:off x="288000" y="1620000"/>
-            <a:ext cx="6263999" cy="720000"/>
-          </a:xfrm>
-          <a:prstGeom prst="rect">
-            <a:avLst/>
-          </a:prstGeom>
-          <a:noFill/>
-        </p:spPr>
-        <p:txBody>
-          <a:bodyPr wrap="square">
-            <a:spAutoFit/>
-          </a:bodyPr>
-          <a:lstStyle/>
-          <a:p/>
-          <a:p>
-            <a:pPr>
-              <a:spcBef>
-                <a:spcPts val="0"/>
-              </a:spcBef>
-              <a:defRPr sz="1100" b="1"/>
-            </a:pPr>
-            <a:r>
-              <a:t>AGENDA DIARIA TERRA (Agenda con 186 hojas. Contiene calendarios 2021-2023, calendario 2022, planeador 2022, planificador semanal, planificador de proyecto, agenda diaria. Incluye caja individual.)</a:t>
-            </a:r>
-          </a:p>
-        </p:txBody>
-      </p:sp>
-      <p:sp>
-        <p:nvSpPr>
-          <p:cNvPr id="7" name="TextBox 6"/>
-          <p:cNvSpPr txBox="1"/>
-          <p:nvPr/>
-        </p:nvSpPr>
-        <p:spPr>
-          <a:xfrm>
-            <a:off x="288000" y="2160000"/>
-            <a:ext cx="6263999" cy="1800000"/>
-          </a:xfrm>
-          <a:prstGeom prst="rect">
-            <a:avLst/>
-          </a:prstGeom>
-          <a:noFill/>
-        </p:spPr>
-        <p:txBody>
-          <a:bodyPr wrap="square">
-            <a:spAutoFit/>
-          </a:bodyPr>
-          <a:lstStyle/>
-          <a:p/>
-          <a:p>
-            <a:pPr>
-              <a:spcBef>
-                <a:spcPts val="0"/>
-              </a:spcBef>
-              <a:defRPr sz="1100" b="0"/>
-            </a:pPr>
-            <a:r>
-              <a:t>INFORMACIÓN BASICA</a:t>
-            </a:r>
-          </a:p>
-          <a:p>
-            <a:pPr>
-              <a:spcBef>
-                <a:spcPts val="0"/>
-              </a:spcBef>
-              <a:defRPr sz="1100" b="0"/>
-            </a:pPr>
-            <a:r>
-              <a:t>CATEGORÍA: AGENDAS</a:t>
-            </a:r>
-          </a:p>
-          <a:p>
-            <a:pPr>
-              <a:spcBef>
-                <a:spcPts val="0"/>
-              </a:spcBef>
-              <a:defRPr sz="1100" b="0"/>
-            </a:pPr>
-            <a:r>
-              <a:t>MATERIAL: Curpiel</a:t>
-            </a:r>
-          </a:p>
-          <a:p>
-            <a:pPr>
-              <a:spcBef>
-                <a:spcPts val="0"/>
-              </a:spcBef>
-              <a:defRPr sz="1100" b="0"/>
-            </a:pPr>
-            <a:r>
-              <a:t>TAMAÑO: 14 x 21 cm</a:t>
-            </a:r>
-          </a:p>
-          <a:p>
-            <a:pPr>
-              <a:spcBef>
-                <a:spcPts val="0"/>
-              </a:spcBef>
-              <a:defRPr sz="1100" b="0"/>
-            </a:pPr>
-          </a:p>
-          <a:p>
-            <a:pPr>
-              <a:spcBef>
-                <a:spcPts val="0"/>
-              </a:spcBef>
-              <a:defRPr sz="1100" b="0"/>
-            </a:pPr>
-            <a:r>
-              <a:t>COLORES: AR/P/R</a:t>
-            </a:r>
-          </a:p>
-          <a:p>
-            <a:pPr>
-              <a:spcBef>
-                <a:spcPts val="0"/>
-              </a:spcBef>
-              <a:defRPr sz="1100" b="0"/>
-            </a:pPr>
-            <a:r>
-              <a:t>CAPACIDAD:</a:t>
-            </a:r>
-          </a:p>
-          <a:p>
-            <a:pPr>
-              <a:spcBef>
-                <a:spcPts val="0"/>
-              </a:spcBef>
-              <a:defRPr sz="1100" b="0"/>
-            </a:pPr>
-            <a:r>
-              <a:t>COLOR DE TINTA:</a:t>
-            </a:r>
-          </a:p>
-          <a:p>
-            <a:pPr>
-              <a:spcBef>
-                <a:spcPts val="0"/>
-              </a:spcBef>
-              <a:defRPr sz="1100" b="0"/>
-            </a:pPr>
-            <a:r>
-              <a:t>INFORMACIÓN DE IMPRESIÓN</a:t>
-            </a:r>
-          </a:p>
-          <a:p>
-            <a:pPr>
-              <a:spcBef>
-                <a:spcPts val="0"/>
-              </a:spcBef>
-              <a:defRPr sz="1100" b="0"/>
-            </a:pPr>
-            <a:r>
-              <a:t>TÉCNICA: Láser / Serigrafía / Termograbado</a:t>
-            </a:r>
-          </a:p>
-          <a:p>
-            <a:pPr>
-              <a:spcBef>
-                <a:spcPts val="0"/>
-              </a:spcBef>
-              <a:defRPr sz="1100" b="0"/>
-            </a:pPr>
-            <a:r>
-              <a:t>AREA: 9 x 16 cm</a:t>
-            </a:r>
-          </a:p>
-          <a:p>
-            <a:pPr>
-              <a:spcBef>
-                <a:spcPts val="0"/>
-              </a:spcBef>
-              <a:defRPr sz="1100" b="0"/>
-            </a:pPr>
-            <a:r>
-              <a:t>INFORMACIÓN DE EMPAQUE</a:t>
-            </a:r>
-          </a:p>
-          <a:p>
-            <a:pPr>
-              <a:spcBef>
-                <a:spcPts val="0"/>
-              </a:spcBef>
-              <a:defRPr sz="1100" b="0"/>
-            </a:pPr>
-            <a:r>
-              <a:t>MEDIDA: 47 x 38 x 33 cm.</a:t>
-            </a:r>
-          </a:p>
-          <a:p>
-            <a:pPr>
-              <a:spcBef>
-                <a:spcPts val="0"/>
-              </a:spcBef>
-              <a:defRPr sz="1100" b="0"/>
-            </a:pPr>
-            <a:r>
-              <a:t>PESO: 26.30 kgs.</a:t>
-            </a:r>
-          </a:p>
-          <a:p>
-            <a:pPr>
-              <a:spcBef>
-                <a:spcPts val="0"/>
-              </a:spcBef>
-              <a:defRPr sz="1100" b="0"/>
-            </a:pPr>
-            <a:r>
-              <a:t>CANTIDAD: 48 pza(s).</a:t>
-            </a:r>
-          </a:p>
-          <a:p>
-            <a:pPr>
-              <a:spcBef>
-                <a:spcPts val="0"/>
-              </a:spcBef>
-              <a:defRPr sz="1100" b="0"/>
-            </a:pPr>
-            <a:r>
-              <a:t>INDIVIDUAL BOX: Si</a:t>
-            </a:r>
-          </a:p>
-        </p:txBody>
-      </p:sp>
-      <p:pic>
-        <p:nvPicPr>
-          <p:cNvPr id="8" name="Picture 7" descr="sample_image.jpg"/>
-          <p:cNvPicPr>
-            <a:picLocks noChangeAspect="1"/>
-          </p:cNvPicPr>
-          <p:nvPr/>
-        </p:nvPicPr>
-        <p:blipFill>
-          <a:blip r:embed="rId3"/>
-          <a:stretch>
-            <a:fillRect/>
-          </a:stretch>
-        </p:blipFill>
-        <p:spPr>
-          <a:xfrm>
-            <a:off x="3060000" y="5400000"/>
-            <a:ext cx="3564000" cy="2556000"/>
-          </a:xfrm>
-          <a:prstGeom prst="rect">
-            <a:avLst/>
-          </a:prstGeom>
-        </p:spPr>
-      </p:pic>
     </p:spTree>
   </p:cSld>
   <p:clrMapOvr>

</xml_diff>

<commit_message>
add production api for cdo
</commit_message>
<xml_diff>
--- a/cotizaciones/cotización_Test1.pptx
+++ b/cotizaciones/cotización_Test1.pptx
@@ -3069,7 +3069,7 @@
               <a:defRPr sz="1400" b="0"/>
             </a:pPr>
             <a:r>
-              <a:t>Cot N°368</a:t>
+              <a:t>Cot N°375</a:t>
             </a:r>
           </a:p>
           <a:p>
@@ -3189,7 +3189,7 @@
               <a:defRPr sz="1200" b="1"/>
             </a:pPr>
             <a:r>
-              <a:t>1.GORRA DE POLYESTER G213</a:t>
+              <a:t>1.PARAGUAS "LAMBARDA" U315</a:t>
             </a:r>
           </a:p>
         </p:txBody>
@@ -3328,7 +3328,7 @@
               <a:defRPr sz="1100" b="1"/>
             </a:pPr>
             <a:r>
-              <a:t>Gorra de 6 paneles con frente libre (sin costura). Cierre de velcro. Con visera "Sandwich".</a:t>
+              <a:t>Paraguas de poliéster pongee de 26" Aprox. Mango siliconado, varillas metálicas, apertura automática. Largo total 89 cm. 8 cascos. Medida de cascos 38x59 cm. Cobertura de 100 cm. Ancho de vara de 1 cm. Tiene un mecanismo de apertura de botón. Con cierre de velcro.</a:t>
             </a:r>
           </a:p>
         </p:txBody>
@@ -3367,7 +3367,7 @@
         </p:nvGraphicFramePr>
         <p:xfrm>
           <a:off x="288000" y="5400000"/>
-          <a:ext cx="2160000" cy="1080000"/>
+          <a:ext cx="2160000" cy="1260000"/>
         </p:xfrm>
         <a:graphic>
           <a:graphicData uri="http://schemas.openxmlformats.org/drawingml/2006/table">
@@ -3421,46 +3421,6 @@
                         <a:defRPr sz="900"/>
                       </a:pPr>
                       <a:r>
-                        <a:t>Blanco</a:t>
-                      </a:r>
-                    </a:p>
-                  </a:txBody>
-                  <a:tcPr>
-                    <a:solidFill>
-                      <a:srgbClr val="FFFFFF"/>
-                    </a:solidFill>
-                  </a:tcPr>
-                </a:tc>
-                <a:tc>
-                  <a:txBody>
-                    <a:bodyPr/>
-                    <a:lstStyle/>
-                    <a:p>
-                      <a:pPr>
-                        <a:defRPr sz="900"/>
-                      </a:pPr>
-                      <a:r>
-                        <a:t>0</a:t>
-                      </a:r>
-                    </a:p>
-                  </a:txBody>
-                  <a:tcPr>
-                    <a:solidFill>
-                      <a:srgbClr val="FFFFFF"/>
-                    </a:solidFill>
-                  </a:tcPr>
-                </a:tc>
-              </a:tr>
-              <a:tr h="180000">
-                <a:tc>
-                  <a:txBody>
-                    <a:bodyPr/>
-                    <a:lstStyle/>
-                    <a:p>
-                      <a:pPr>
-                        <a:defRPr sz="900"/>
-                      </a:pPr>
-                      <a:r>
                         <a:t>Negro</a:t>
                       </a:r>
                     </a:p>
@@ -3480,47 +3440,7 @@
                         <a:defRPr sz="900"/>
                       </a:pPr>
                       <a:r>
-                        <a:t>2</a:t>
-                      </a:r>
-                    </a:p>
-                  </a:txBody>
-                  <a:tcPr>
-                    <a:solidFill>
-                      <a:srgbClr val="FFFFFF"/>
-                    </a:solidFill>
-                  </a:tcPr>
-                </a:tc>
-              </a:tr>
-              <a:tr h="180000">
-                <a:tc>
-                  <a:txBody>
-                    <a:bodyPr/>
-                    <a:lstStyle/>
-                    <a:p>
-                      <a:pPr>
-                        <a:defRPr sz="900"/>
-                      </a:pPr>
-                      <a:r>
-                        <a:t>Verde</a:t>
-                      </a:r>
-                    </a:p>
-                  </a:txBody>
-                  <a:tcPr>
-                    <a:solidFill>
-                      <a:srgbClr val="FFFFFF"/>
-                    </a:solidFill>
-                  </a:tcPr>
-                </a:tc>
-                <a:tc>
-                  <a:txBody>
-                    <a:bodyPr/>
-                    <a:lstStyle/>
-                    <a:p>
-                      <a:pPr>
-                        <a:defRPr sz="900"/>
-                      </a:pPr>
-                      <a:r>
-                        <a:t>2</a:t>
+                        <a:t>20</a:t>
                       </a:r>
                     </a:p>
                   </a:txBody>
@@ -3560,7 +3480,47 @@
                         <a:defRPr sz="900"/>
                       </a:pPr>
                       <a:r>
-                        <a:t>0</a:t>
+                        <a:t>3550</a:t>
+                      </a:r>
+                    </a:p>
+                  </a:txBody>
+                  <a:tcPr>
+                    <a:solidFill>
+                      <a:srgbClr val="FFFFFF"/>
+                    </a:solidFill>
+                  </a:tcPr>
+                </a:tc>
+              </a:tr>
+              <a:tr h="180000">
+                <a:tc>
+                  <a:txBody>
+                    <a:bodyPr/>
+                    <a:lstStyle/>
+                    <a:p>
+                      <a:pPr>
+                        <a:defRPr sz="900"/>
+                      </a:pPr>
+                      <a:r>
+                        <a:t>Azul Petróleo </a:t>
+                      </a:r>
+                    </a:p>
+                  </a:txBody>
+                  <a:tcPr>
+                    <a:solidFill>
+                      <a:srgbClr val="FFFFFF"/>
+                    </a:solidFill>
+                  </a:tcPr>
+                </a:tc>
+                <a:tc>
+                  <a:txBody>
+                    <a:bodyPr/>
+                    <a:lstStyle/>
+                    <a:p>
+                      <a:pPr>
+                        <a:defRPr sz="900"/>
+                      </a:pPr>
+                      <a:r>
+                        <a:t>702</a:t>
                       </a:r>
                     </a:p>
                   </a:txBody>
@@ -3600,7 +3560,87 @@
                         <a:defRPr sz="900"/>
                       </a:pPr>
                       <a:r>
-                        <a:t>2</a:t>
+                        <a:t>409</a:t>
+                      </a:r>
+                    </a:p>
+                  </a:txBody>
+                  <a:tcPr>
+                    <a:solidFill>
+                      <a:srgbClr val="FFFFFF"/>
+                    </a:solidFill>
+                  </a:tcPr>
+                </a:tc>
+              </a:tr>
+              <a:tr h="180000">
+                <a:tc>
+                  <a:txBody>
+                    <a:bodyPr/>
+                    <a:lstStyle/>
+                    <a:p>
+                      <a:pPr>
+                        <a:defRPr sz="900"/>
+                      </a:pPr>
+                      <a:r>
+                        <a:t>Verde Manzana</a:t>
+                      </a:r>
+                    </a:p>
+                  </a:txBody>
+                  <a:tcPr>
+                    <a:solidFill>
+                      <a:srgbClr val="FFFFFF"/>
+                    </a:solidFill>
+                  </a:tcPr>
+                </a:tc>
+                <a:tc>
+                  <a:txBody>
+                    <a:bodyPr/>
+                    <a:lstStyle/>
+                    <a:p>
+                      <a:pPr>
+                        <a:defRPr sz="900"/>
+                      </a:pPr>
+                      <a:r>
+                        <a:t>394</a:t>
+                      </a:r>
+                    </a:p>
+                  </a:txBody>
+                  <a:tcPr>
+                    <a:solidFill>
+                      <a:srgbClr val="FFFFFF"/>
+                    </a:solidFill>
+                  </a:tcPr>
+                </a:tc>
+              </a:tr>
+              <a:tr h="180000">
+                <a:tc>
+                  <a:txBody>
+                    <a:bodyPr/>
+                    <a:lstStyle/>
+                    <a:p>
+                      <a:pPr>
+                        <a:defRPr sz="900"/>
+                      </a:pPr>
+                      <a:r>
+                        <a:t>Royal Blue</a:t>
+                      </a:r>
+                    </a:p>
+                  </a:txBody>
+                  <a:tcPr>
+                    <a:solidFill>
+                      <a:srgbClr val="FFFFFF"/>
+                    </a:solidFill>
+                  </a:tcPr>
+                </a:tc>
+                <a:tc>
+                  <a:txBody>
+                    <a:bodyPr/>
+                    <a:lstStyle/>
+                    <a:p>
+                      <a:pPr>
+                        <a:defRPr sz="900"/>
+                      </a:pPr>
+                      <a:r>
+                        <a:t>4767</a:t>
                       </a:r>
                     </a:p>
                   </a:txBody>

</xml_diff>